<commit_message>
Adding FG ppt info and changes to pathway analysis
</commit_message>
<xml_diff>
--- a/assets/lectures/cshl/2020/mini/RNASeq_MiniLecture_02_03_SAM_BAM_BED.pptx
+++ b/assets/lectures/cshl/2020/mini/RNASeq_MiniLecture_02_03_SAM_BAM_BED.pptx
@@ -5,26 +5,30 @@
     <p:sldMasterId id="2147483674" r:id="rId1"/>
   </p:sldMasterIdLst>
   <p:notesMasterIdLst>
-    <p:notesMasterId r:id="rId19"/>
+    <p:notesMasterId r:id="rId23"/>
   </p:notesMasterIdLst>
   <p:sldIdLst>
     <p:sldId id="515" r:id="rId2"/>
-    <p:sldId id="528" r:id="rId3"/>
-    <p:sldId id="529" r:id="rId4"/>
+    <p:sldId id="529" r:id="rId3"/>
+    <p:sldId id="528" r:id="rId4"/>
     <p:sldId id="530" r:id="rId5"/>
-    <p:sldId id="531" r:id="rId6"/>
-    <p:sldId id="532" r:id="rId7"/>
-    <p:sldId id="533" r:id="rId8"/>
-    <p:sldId id="538" r:id="rId9"/>
-    <p:sldId id="534" r:id="rId10"/>
-    <p:sldId id="540" r:id="rId11"/>
-    <p:sldId id="535" r:id="rId12"/>
-    <p:sldId id="269" r:id="rId13"/>
-    <p:sldId id="310" r:id="rId14"/>
-    <p:sldId id="539" r:id="rId15"/>
-    <p:sldId id="309" r:id="rId16"/>
-    <p:sldId id="536" r:id="rId17"/>
-    <p:sldId id="267" r:id="rId18"/>
+    <p:sldId id="307" r:id="rId6"/>
+    <p:sldId id="261" r:id="rId7"/>
+    <p:sldId id="531" r:id="rId8"/>
+    <p:sldId id="274" r:id="rId9"/>
+    <p:sldId id="532" r:id="rId10"/>
+    <p:sldId id="541" r:id="rId11"/>
+    <p:sldId id="542" r:id="rId12"/>
+    <p:sldId id="538" r:id="rId13"/>
+    <p:sldId id="534" r:id="rId14"/>
+    <p:sldId id="540" r:id="rId15"/>
+    <p:sldId id="535" r:id="rId16"/>
+    <p:sldId id="269" r:id="rId17"/>
+    <p:sldId id="310" r:id="rId18"/>
+    <p:sldId id="539" r:id="rId19"/>
+    <p:sldId id="309" r:id="rId20"/>
+    <p:sldId id="536" r:id="rId21"/>
+    <p:sldId id="267" r:id="rId22"/>
   </p:sldIdLst>
   <p:sldSz cx="12192000" cy="6858000"/>
   <p:notesSz cx="6858000" cy="9144000"/>
@@ -213,7 +217,7 @@
           <a:p>
             <a:fld id="{3F074802-55CA-9B40-9191-B744CF71FA91}" type="datetimeFigureOut">
               <a:rPr lang="en-US" smtClean="0"/>
-              <a:t>11/9/20</a:t>
+              <a:t>11/17/20</a:t>
             </a:fld>
             <a:endParaRPr lang="en-US"/>
           </a:p>
@@ -632,7 +636,7 @@
           <a:p>
             <a:fld id="{099D50AF-F628-504F-B99D-05BB4C0BF79D}" type="slidenum">
               <a:rPr lang="en-US" smtClean="0"/>
-              <a:t>15</a:t>
+              <a:t>19</a:t>
             </a:fld>
             <a:endParaRPr lang="en-US"/>
           </a:p>
@@ -801,7 +805,7 @@
             </a:pPr>
             <a:fld id="{00000000-1234-1234-1234-123412341234}" type="slidenum">
               <a:rPr lang="en-US"/>
-              <a:t>17</a:t>
+              <a:t>21</a:t>
             </a:fld>
             <a:endParaRPr/>
           </a:p>
@@ -1931,6 +1935,88 @@
   <p:clrMapOvr>
     <a:masterClrMapping/>
   </p:clrMapOvr>
+</p:sldLayout>
+</file>
+
+<file path=ppt/slideLayouts/slideLayout16.xml><?xml version="1.0" encoding="utf-8"?>
+<p:sldLayout xmlns:a="http://schemas.openxmlformats.org/drawingml/2006/main" xmlns:r="http://schemas.openxmlformats.org/officeDocument/2006/relationships" xmlns:p="http://schemas.openxmlformats.org/presentationml/2006/main" type="tx">
+  <p:cSld name="Title - Top">
+    <p:spTree>
+      <p:nvGrpSpPr>
+        <p:cNvPr id="1" name=""/>
+        <p:cNvGrpSpPr/>
+        <p:nvPr/>
+      </p:nvGrpSpPr>
+      <p:grpSpPr>
+        <a:xfrm>
+          <a:off x="0" y="0"/>
+          <a:ext cx="0" cy="0"/>
+          <a:chOff x="0" y="0"/>
+          <a:chExt cx="0" cy="0"/>
+        </a:xfrm>
+      </p:grpSpPr>
+      <p:sp>
+        <p:nvSpPr>
+          <p:cNvPr id="48" name="Title Text"/>
+          <p:cNvSpPr txBox="1">
+            <a:spLocks noGrp="1"/>
+          </p:cNvSpPr>
+          <p:nvPr>
+            <p:ph type="title"/>
+          </p:nvPr>
+        </p:nvSpPr>
+        <p:spPr>
+          <a:prstGeom prst="rect">
+            <a:avLst/>
+          </a:prstGeom>
+        </p:spPr>
+        <p:txBody>
+          <a:bodyPr/>
+          <a:lstStyle/>
+          <a:p>
+            <a:r>
+              <a:t>Title Text</a:t>
+            </a:r>
+          </a:p>
+        </p:txBody>
+      </p:sp>
+      <p:sp>
+        <p:nvSpPr>
+          <p:cNvPr id="49" name="Slide Number"/>
+          <p:cNvSpPr txBox="1">
+            <a:spLocks noGrp="1"/>
+          </p:cNvSpPr>
+          <p:nvPr>
+            <p:ph type="sldNum" sz="quarter" idx="2"/>
+          </p:nvPr>
+        </p:nvSpPr>
+        <p:spPr>
+          <a:prstGeom prst="rect">
+            <a:avLst/>
+          </a:prstGeom>
+        </p:spPr>
+        <p:txBody>
+          <a:bodyPr/>
+          <a:lstStyle/>
+          <a:p>
+            <a:fld id="{86CB4B4D-7CA3-9044-876B-883B54F8677D}" type="slidenum">
+              <a:t>‹#›</a:t>
+            </a:fld>
+            <a:endParaRPr/>
+          </a:p>
+        </p:txBody>
+      </p:sp>
+    </p:spTree>
+    <p:extLst>
+      <p:ext uri="{BB962C8B-B14F-4D97-AF65-F5344CB8AC3E}">
+        <p14:creationId xmlns:p14="http://schemas.microsoft.com/office/powerpoint/2010/main" val="1441259870"/>
+      </p:ext>
+    </p:extLst>
+  </p:cSld>
+  <p:clrMapOvr>
+    <a:masterClrMapping/>
+  </p:clrMapOvr>
+  <p:transition spd="med"/>
 </p:sldLayout>
 </file>
 
@@ -4000,6 +4086,7 @@
     <p:sldLayoutId id="2147483687" r:id="rId13"/>
     <p:sldLayoutId id="2147483672" r:id="rId14"/>
     <p:sldLayoutId id="2147483673" r:id="rId15"/>
+    <p:sldLayoutId id="2147483688" r:id="rId16"/>
   </p:sldLayoutIdLst>
   <p:txStyles>
     <p:titleStyle>
@@ -4739,6 +4826,1565 @@
       </p:grpSpPr>
       <p:sp>
         <p:nvSpPr>
+          <p:cNvPr id="405" name="SAM format"/>
+          <p:cNvSpPr txBox="1">
+            <a:spLocks noGrp="1"/>
+          </p:cNvSpPr>
+          <p:nvPr>
+            <p:ph type="title"/>
+          </p:nvPr>
+        </p:nvSpPr>
+        <p:spPr>
+          <a:xfrm>
+            <a:off x="457199" y="27005"/>
+            <a:ext cx="11277600" cy="609601"/>
+          </a:xfrm>
+          <a:prstGeom prst="rect">
+            <a:avLst/>
+          </a:prstGeom>
+        </p:spPr>
+        <p:txBody>
+          <a:bodyPr>
+            <a:noAutofit/>
+          </a:bodyPr>
+          <a:lstStyle>
+            <a:lvl1pPr>
+              <a:defRPr sz="6000"/>
+            </a:lvl1pPr>
+          </a:lstStyle>
+          <a:p>
+            <a:r>
+              <a:rPr sz="4800" dirty="0"/>
+              <a:t>SAM </a:t>
+            </a:r>
+            <a:r>
+              <a:rPr lang="en-US" sz="4800" dirty="0"/>
+              <a:t>F</a:t>
+            </a:r>
+            <a:r>
+              <a:rPr sz="4800" dirty="0"/>
+              <a:t>ormat</a:t>
+            </a:r>
+            <a:r>
+              <a:rPr lang="en-US" sz="4800" dirty="0"/>
+              <a:t> – Information Fields</a:t>
+            </a:r>
+            <a:endParaRPr sz="4800" dirty="0"/>
+          </a:p>
+        </p:txBody>
+      </p:sp>
+      <p:pic>
+        <p:nvPicPr>
+          <p:cNvPr id="409" name="Screen Shot 2014-11-14 at 8.32.21 AM.png" descr="Screen Shot 2014-11-14 at 8.32.21 AM.png"/>
+          <p:cNvPicPr>
+            <a:picLocks noChangeAspect="1"/>
+          </p:cNvPicPr>
+          <p:nvPr/>
+        </p:nvPicPr>
+        <p:blipFill>
+          <a:blip r:embed="rId2"/>
+          <a:stretch>
+            <a:fillRect/>
+          </a:stretch>
+        </p:blipFill>
+        <p:spPr>
+          <a:xfrm>
+            <a:off x="974901" y="1003765"/>
+            <a:ext cx="9194139" cy="3082999"/>
+          </a:xfrm>
+          <a:prstGeom prst="rect">
+            <a:avLst/>
+          </a:prstGeom>
+          <a:ln w="12700">
+            <a:miter lim="400000"/>
+          </a:ln>
+        </p:spPr>
+      </p:pic>
+      <p:grpSp>
+        <p:nvGrpSpPr>
+          <p:cNvPr id="3" name="Group 2">
+            <a:extLst>
+              <a:ext uri="{FF2B5EF4-FFF2-40B4-BE49-F238E27FC236}">
+                <a16:creationId xmlns:a16="http://schemas.microsoft.com/office/drawing/2014/main" id="{194ED37F-E3F3-3B4C-9947-32EFC1395793}"/>
+              </a:ext>
+            </a:extLst>
+          </p:cNvPr>
+          <p:cNvGrpSpPr/>
+          <p:nvPr/>
+        </p:nvGrpSpPr>
+        <p:grpSpPr>
+          <a:xfrm>
+            <a:off x="165401" y="4453923"/>
+            <a:ext cx="12026599" cy="1091087"/>
+            <a:chOff x="82700" y="4932393"/>
+            <a:chExt cx="12026599" cy="1091087"/>
+          </a:xfrm>
+        </p:grpSpPr>
+        <p:pic>
+          <p:nvPicPr>
+            <p:cNvPr id="410" name="Screen Shot 2014-11-14 at 8.34.08 AM.png" descr="Screen Shot 2014-11-14 at 8.34.08 AM.png"/>
+            <p:cNvPicPr>
+              <a:picLocks noChangeAspect="1"/>
+            </p:cNvPicPr>
+            <p:nvPr/>
+          </p:nvPicPr>
+          <p:blipFill>
+            <a:blip r:embed="rId3"/>
+            <a:stretch>
+              <a:fillRect/>
+            </a:stretch>
+          </p:blipFill>
+          <p:spPr>
+            <a:xfrm>
+              <a:off x="82700" y="5286821"/>
+              <a:ext cx="12026599" cy="191116"/>
+            </a:xfrm>
+            <a:prstGeom prst="rect">
+              <a:avLst/>
+            </a:prstGeom>
+            <a:ln w="12700">
+              <a:miter lim="400000"/>
+            </a:ln>
+          </p:spPr>
+        </p:pic>
+        <p:grpSp>
+          <p:nvGrpSpPr>
+            <p:cNvPr id="2" name="Group 1">
+              <a:extLst>
+                <a:ext uri="{FF2B5EF4-FFF2-40B4-BE49-F238E27FC236}">
+                  <a16:creationId xmlns:a16="http://schemas.microsoft.com/office/drawing/2014/main" id="{CF3EE22F-0334-A347-BE4D-A9740AB0D68D}"/>
+                </a:ext>
+              </a:extLst>
+            </p:cNvPr>
+            <p:cNvGrpSpPr/>
+            <p:nvPr/>
+          </p:nvGrpSpPr>
+          <p:grpSpPr>
+            <a:xfrm>
+              <a:off x="705685" y="4932393"/>
+              <a:ext cx="8285962" cy="1091087"/>
+              <a:chOff x="747693" y="4953397"/>
+              <a:chExt cx="8285962" cy="1091087"/>
+            </a:xfrm>
+          </p:grpSpPr>
+          <p:sp>
+            <p:nvSpPr>
+              <p:cNvPr id="408" name="3"/>
+              <p:cNvSpPr txBox="1"/>
+              <p:nvPr/>
+            </p:nvSpPr>
+            <p:spPr>
+              <a:xfrm>
+                <a:off x="3249767" y="4988273"/>
+                <a:ext cx="239119" cy="310214"/>
+              </a:xfrm>
+              <a:prstGeom prst="rect">
+                <a:avLst/>
+              </a:prstGeom>
+              <a:ln w="12700">
+                <a:miter lim="400000"/>
+              </a:ln>
+              <a:extLst>
+                <a:ext uri="{C572A759-6A51-4108-AA02-DFA0A04FC94B}">
+                  <ma14:wrappingTextBoxFlag xmlns="" xmlns:m="http://schemas.openxmlformats.org/officeDocument/2006/math" xmlns:a14="http://schemas.microsoft.com/office/drawing/2010/main" xmlns:ma14="http://schemas.microsoft.com/office/mac/drawingml/2011/main" val="1"/>
+                </a:ext>
+              </a:extLst>
+            </p:spPr>
+            <p:txBody>
+              <a:bodyPr lIns="35719" tIns="35719" rIns="35719" bIns="35719" anchor="ctr">
+                <a:spAutoFit/>
+              </a:bodyPr>
+              <a:lstStyle>
+                <a:lvl1pPr>
+                  <a:defRPr sz="2200"/>
+                </a:lvl1pPr>
+              </a:lstStyle>
+              <a:p>
+                <a:r>
+                  <a:rPr sz="1547" dirty="0"/>
+                  <a:t>3</a:t>
+                </a:r>
+              </a:p>
+            </p:txBody>
+          </p:sp>
+          <p:sp>
+            <p:nvSpPr>
+              <p:cNvPr id="411" name="2"/>
+              <p:cNvSpPr txBox="1"/>
+              <p:nvPr/>
+            </p:nvSpPr>
+            <p:spPr>
+              <a:xfrm>
+                <a:off x="2516017" y="4989430"/>
+                <a:ext cx="239119" cy="310214"/>
+              </a:xfrm>
+              <a:prstGeom prst="rect">
+                <a:avLst/>
+              </a:prstGeom>
+              <a:ln w="12700">
+                <a:miter lim="400000"/>
+              </a:ln>
+              <a:extLst>
+                <a:ext uri="{C572A759-6A51-4108-AA02-DFA0A04FC94B}">
+                  <ma14:wrappingTextBoxFlag xmlns="" xmlns:m="http://schemas.openxmlformats.org/officeDocument/2006/math" xmlns:a14="http://schemas.microsoft.com/office/drawing/2010/main" xmlns:ma14="http://schemas.microsoft.com/office/mac/drawingml/2011/main" val="1"/>
+                </a:ext>
+              </a:extLst>
+            </p:spPr>
+            <p:txBody>
+              <a:bodyPr lIns="35719" tIns="35719" rIns="35719" bIns="35719" anchor="ctr">
+                <a:spAutoFit/>
+              </a:bodyPr>
+              <a:lstStyle>
+                <a:lvl1pPr>
+                  <a:defRPr sz="2200"/>
+                </a:lvl1pPr>
+              </a:lstStyle>
+              <a:p>
+                <a:r>
+                  <a:rPr sz="1547" dirty="0"/>
+                  <a:t>2</a:t>
+                </a:r>
+              </a:p>
+            </p:txBody>
+          </p:sp>
+          <p:sp>
+            <p:nvSpPr>
+              <p:cNvPr id="412" name="1"/>
+              <p:cNvSpPr txBox="1"/>
+              <p:nvPr/>
+            </p:nvSpPr>
+            <p:spPr>
+              <a:xfrm>
+                <a:off x="747693" y="4953397"/>
+                <a:ext cx="239119" cy="310214"/>
+              </a:xfrm>
+              <a:prstGeom prst="rect">
+                <a:avLst/>
+              </a:prstGeom>
+              <a:ln w="12700">
+                <a:miter lim="400000"/>
+              </a:ln>
+              <a:extLst>
+                <a:ext uri="{C572A759-6A51-4108-AA02-DFA0A04FC94B}">
+                  <ma14:wrappingTextBoxFlag xmlns="" xmlns:m="http://schemas.openxmlformats.org/officeDocument/2006/math" xmlns:a14="http://schemas.microsoft.com/office/drawing/2010/main" xmlns:ma14="http://schemas.microsoft.com/office/mac/drawingml/2011/main" val="1"/>
+                </a:ext>
+              </a:extLst>
+            </p:spPr>
+            <p:txBody>
+              <a:bodyPr wrap="square" lIns="35719" tIns="35719" rIns="35719" bIns="35719" anchor="ctr">
+                <a:spAutoFit/>
+              </a:bodyPr>
+              <a:lstStyle>
+                <a:lvl1pPr>
+                  <a:defRPr sz="2200"/>
+                </a:lvl1pPr>
+              </a:lstStyle>
+              <a:p>
+                <a:r>
+                  <a:rPr sz="1547" dirty="0"/>
+                  <a:t>1</a:t>
+                </a:r>
+              </a:p>
+            </p:txBody>
+          </p:sp>
+          <p:sp>
+            <p:nvSpPr>
+              <p:cNvPr id="413" name="5"/>
+              <p:cNvSpPr txBox="1"/>
+              <p:nvPr/>
+            </p:nvSpPr>
+            <p:spPr>
+              <a:xfrm>
+                <a:off x="4778973" y="4989430"/>
+                <a:ext cx="239119" cy="310214"/>
+              </a:xfrm>
+              <a:prstGeom prst="rect">
+                <a:avLst/>
+              </a:prstGeom>
+              <a:ln w="12700">
+                <a:miter lim="400000"/>
+              </a:ln>
+              <a:extLst>
+                <a:ext uri="{C572A759-6A51-4108-AA02-DFA0A04FC94B}">
+                  <ma14:wrappingTextBoxFlag xmlns="" xmlns:m="http://schemas.openxmlformats.org/officeDocument/2006/math" xmlns:a14="http://schemas.microsoft.com/office/drawing/2010/main" xmlns:ma14="http://schemas.microsoft.com/office/mac/drawingml/2011/main" val="1"/>
+                </a:ext>
+              </a:extLst>
+            </p:spPr>
+            <p:txBody>
+              <a:bodyPr lIns="35719" tIns="35719" rIns="35719" bIns="35719" anchor="ctr">
+                <a:spAutoFit/>
+              </a:bodyPr>
+              <a:lstStyle>
+                <a:lvl1pPr>
+                  <a:defRPr sz="2200"/>
+                </a:lvl1pPr>
+              </a:lstStyle>
+              <a:p>
+                <a:r>
+                  <a:rPr sz="1547" dirty="0"/>
+                  <a:t>5</a:t>
+                </a:r>
+              </a:p>
+            </p:txBody>
+          </p:sp>
+          <p:sp>
+            <p:nvSpPr>
+              <p:cNvPr id="414" name="4"/>
+              <p:cNvSpPr txBox="1"/>
+              <p:nvPr/>
+            </p:nvSpPr>
+            <p:spPr>
+              <a:xfrm>
+                <a:off x="4167369" y="4979922"/>
+                <a:ext cx="239119" cy="310214"/>
+              </a:xfrm>
+              <a:prstGeom prst="rect">
+                <a:avLst/>
+              </a:prstGeom>
+              <a:ln w="12700">
+                <a:miter lim="400000"/>
+              </a:ln>
+              <a:extLst>
+                <a:ext uri="{C572A759-6A51-4108-AA02-DFA0A04FC94B}">
+                  <ma14:wrappingTextBoxFlag xmlns="" xmlns:m="http://schemas.openxmlformats.org/officeDocument/2006/math" xmlns:a14="http://schemas.microsoft.com/office/drawing/2010/main" xmlns:ma14="http://schemas.microsoft.com/office/mac/drawingml/2011/main" val="1"/>
+                </a:ext>
+              </a:extLst>
+            </p:spPr>
+            <p:txBody>
+              <a:bodyPr lIns="35719" tIns="35719" rIns="35719" bIns="35719" anchor="ctr">
+                <a:spAutoFit/>
+              </a:bodyPr>
+              <a:lstStyle>
+                <a:lvl1pPr>
+                  <a:defRPr sz="2200"/>
+                </a:lvl1pPr>
+              </a:lstStyle>
+              <a:p>
+                <a:r>
+                  <a:rPr sz="1547" dirty="0"/>
+                  <a:t>4</a:t>
+                </a:r>
+              </a:p>
+            </p:txBody>
+          </p:sp>
+          <p:sp>
+            <p:nvSpPr>
+              <p:cNvPr id="415" name="8"/>
+              <p:cNvSpPr txBox="1"/>
+              <p:nvPr/>
+            </p:nvSpPr>
+            <p:spPr>
+              <a:xfrm>
+                <a:off x="7158279" y="4988931"/>
+                <a:ext cx="239119" cy="310214"/>
+              </a:xfrm>
+              <a:prstGeom prst="rect">
+                <a:avLst/>
+              </a:prstGeom>
+              <a:ln w="12700">
+                <a:miter lim="400000"/>
+              </a:ln>
+              <a:extLst>
+                <a:ext uri="{C572A759-6A51-4108-AA02-DFA0A04FC94B}">
+                  <ma14:wrappingTextBoxFlag xmlns="" xmlns:m="http://schemas.openxmlformats.org/officeDocument/2006/math" xmlns:a14="http://schemas.microsoft.com/office/drawing/2010/main" xmlns:ma14="http://schemas.microsoft.com/office/mac/drawingml/2011/main" val="1"/>
+                </a:ext>
+              </a:extLst>
+            </p:spPr>
+            <p:txBody>
+              <a:bodyPr lIns="35719" tIns="35719" rIns="35719" bIns="35719" anchor="ctr">
+                <a:spAutoFit/>
+              </a:bodyPr>
+              <a:lstStyle>
+                <a:lvl1pPr>
+                  <a:defRPr sz="2200"/>
+                </a:lvl1pPr>
+              </a:lstStyle>
+              <a:p>
+                <a:r>
+                  <a:rPr sz="1547" dirty="0"/>
+                  <a:t>8</a:t>
+                </a:r>
+              </a:p>
+            </p:txBody>
+          </p:sp>
+          <p:sp>
+            <p:nvSpPr>
+              <p:cNvPr id="416" name="6"/>
+              <p:cNvSpPr txBox="1"/>
+              <p:nvPr/>
+            </p:nvSpPr>
+            <p:spPr>
+              <a:xfrm>
+                <a:off x="5613979" y="4962687"/>
+                <a:ext cx="239119" cy="310214"/>
+              </a:xfrm>
+              <a:prstGeom prst="rect">
+                <a:avLst/>
+              </a:prstGeom>
+              <a:ln w="12700">
+                <a:miter lim="400000"/>
+              </a:ln>
+              <a:extLst>
+                <a:ext uri="{C572A759-6A51-4108-AA02-DFA0A04FC94B}">
+                  <ma14:wrappingTextBoxFlag xmlns="" xmlns:m="http://schemas.openxmlformats.org/officeDocument/2006/math" xmlns:a14="http://schemas.microsoft.com/office/drawing/2010/main" xmlns:ma14="http://schemas.microsoft.com/office/mac/drawingml/2011/main" val="1"/>
+                </a:ext>
+              </a:extLst>
+            </p:spPr>
+            <p:txBody>
+              <a:bodyPr lIns="35719" tIns="35719" rIns="35719" bIns="35719" anchor="ctr">
+                <a:spAutoFit/>
+              </a:bodyPr>
+              <a:lstStyle>
+                <a:lvl1pPr>
+                  <a:defRPr sz="2200"/>
+                </a:lvl1pPr>
+              </a:lstStyle>
+              <a:p>
+                <a:r>
+                  <a:rPr sz="1547" dirty="0"/>
+                  <a:t>6</a:t>
+                </a:r>
+              </a:p>
+            </p:txBody>
+          </p:sp>
+          <p:sp>
+            <p:nvSpPr>
+              <p:cNvPr id="417" name="7"/>
+              <p:cNvSpPr txBox="1"/>
+              <p:nvPr/>
+            </p:nvSpPr>
+            <p:spPr>
+              <a:xfrm>
+                <a:off x="6228170" y="4971414"/>
+                <a:ext cx="239119" cy="310214"/>
+              </a:xfrm>
+              <a:prstGeom prst="rect">
+                <a:avLst/>
+              </a:prstGeom>
+              <a:ln w="12700">
+                <a:miter lim="400000"/>
+              </a:ln>
+              <a:extLst>
+                <a:ext uri="{C572A759-6A51-4108-AA02-DFA0A04FC94B}">
+                  <ma14:wrappingTextBoxFlag xmlns="" xmlns:m="http://schemas.openxmlformats.org/officeDocument/2006/math" xmlns:a14="http://schemas.microsoft.com/office/drawing/2010/main" xmlns:ma14="http://schemas.microsoft.com/office/mac/drawingml/2011/main" val="1"/>
+                </a:ext>
+              </a:extLst>
+            </p:spPr>
+            <p:txBody>
+              <a:bodyPr lIns="35719" tIns="35719" rIns="35719" bIns="35719" anchor="ctr">
+                <a:spAutoFit/>
+              </a:bodyPr>
+              <a:lstStyle>
+                <a:lvl1pPr>
+                  <a:defRPr sz="2200"/>
+                </a:lvl1pPr>
+              </a:lstStyle>
+              <a:p>
+                <a:r>
+                  <a:rPr sz="1547" dirty="0"/>
+                  <a:t>7</a:t>
+                </a:r>
+              </a:p>
+            </p:txBody>
+          </p:sp>
+          <p:sp>
+            <p:nvSpPr>
+              <p:cNvPr id="418" name="10"/>
+              <p:cNvSpPr txBox="1"/>
+              <p:nvPr/>
+            </p:nvSpPr>
+            <p:spPr>
+              <a:xfrm>
+                <a:off x="8642732" y="4971166"/>
+                <a:ext cx="390923" cy="310214"/>
+              </a:xfrm>
+              <a:prstGeom prst="rect">
+                <a:avLst/>
+              </a:prstGeom>
+              <a:ln w="12700">
+                <a:miter lim="400000"/>
+              </a:ln>
+              <a:extLst>
+                <a:ext uri="{C572A759-6A51-4108-AA02-DFA0A04FC94B}">
+                  <ma14:wrappingTextBoxFlag xmlns="" xmlns:m="http://schemas.openxmlformats.org/officeDocument/2006/math" xmlns:a14="http://schemas.microsoft.com/office/drawing/2010/main" xmlns:ma14="http://schemas.microsoft.com/office/mac/drawingml/2011/main" val="1"/>
+                </a:ext>
+              </a:extLst>
+            </p:spPr>
+            <p:txBody>
+              <a:bodyPr lIns="35719" tIns="35719" rIns="35719" bIns="35719" anchor="ctr">
+                <a:spAutoFit/>
+              </a:bodyPr>
+              <a:lstStyle>
+                <a:lvl1pPr>
+                  <a:defRPr sz="2200"/>
+                </a:lvl1pPr>
+              </a:lstStyle>
+              <a:p>
+                <a:r>
+                  <a:rPr sz="1547" dirty="0"/>
+                  <a:t>10</a:t>
+                </a:r>
+              </a:p>
+            </p:txBody>
+          </p:sp>
+          <p:sp>
+            <p:nvSpPr>
+              <p:cNvPr id="419" name="9"/>
+              <p:cNvSpPr txBox="1"/>
+              <p:nvPr/>
+            </p:nvSpPr>
+            <p:spPr>
+              <a:xfrm>
+                <a:off x="7858631" y="4988931"/>
+                <a:ext cx="239119" cy="310214"/>
+              </a:xfrm>
+              <a:prstGeom prst="rect">
+                <a:avLst/>
+              </a:prstGeom>
+              <a:ln w="12700">
+                <a:miter lim="400000"/>
+              </a:ln>
+              <a:extLst>
+                <a:ext uri="{C572A759-6A51-4108-AA02-DFA0A04FC94B}">
+                  <ma14:wrappingTextBoxFlag xmlns="" xmlns:m="http://schemas.openxmlformats.org/officeDocument/2006/math" xmlns:a14="http://schemas.microsoft.com/office/drawing/2010/main" xmlns:ma14="http://schemas.microsoft.com/office/mac/drawingml/2011/main" val="1"/>
+                </a:ext>
+              </a:extLst>
+            </p:spPr>
+            <p:txBody>
+              <a:bodyPr lIns="35719" tIns="35719" rIns="35719" bIns="35719" anchor="ctr">
+                <a:spAutoFit/>
+              </a:bodyPr>
+              <a:lstStyle>
+                <a:lvl1pPr>
+                  <a:defRPr sz="2200"/>
+                </a:lvl1pPr>
+              </a:lstStyle>
+              <a:p>
+                <a:r>
+                  <a:rPr sz="1547" dirty="0"/>
+                  <a:t>9</a:t>
+                </a:r>
+              </a:p>
+            </p:txBody>
+          </p:sp>
+          <p:pic>
+            <p:nvPicPr>
+              <p:cNvPr id="420" name="Question mark - red.png" descr="Question mark - red.png"/>
+              <p:cNvPicPr>
+                <a:picLocks noChangeAspect="1"/>
+              </p:cNvPicPr>
+              <p:nvPr/>
+            </p:nvPicPr>
+            <p:blipFill>
+              <a:blip r:embed="rId4"/>
+              <a:stretch>
+                <a:fillRect/>
+              </a:stretch>
+            </p:blipFill>
+            <p:spPr>
+              <a:xfrm>
+                <a:off x="5566288" y="5472140"/>
+                <a:ext cx="334499" cy="559280"/>
+              </a:xfrm>
+              <a:prstGeom prst="rect">
+                <a:avLst/>
+              </a:prstGeom>
+              <a:ln w="12700">
+                <a:miter lim="400000"/>
+              </a:ln>
+            </p:spPr>
+          </p:pic>
+          <p:pic>
+            <p:nvPicPr>
+              <p:cNvPr id="421" name="Question mark - red.png" descr="Question mark - red.png"/>
+              <p:cNvPicPr>
+                <a:picLocks noChangeAspect="1"/>
+              </p:cNvPicPr>
+              <p:nvPr/>
+            </p:nvPicPr>
+            <p:blipFill>
+              <a:blip r:embed="rId4"/>
+              <a:stretch>
+                <a:fillRect/>
+              </a:stretch>
+            </p:blipFill>
+            <p:spPr>
+              <a:xfrm>
+                <a:off x="2430949" y="5485204"/>
+                <a:ext cx="334499" cy="559280"/>
+              </a:xfrm>
+              <a:prstGeom prst="rect">
+                <a:avLst/>
+              </a:prstGeom>
+              <a:ln w="12700">
+                <a:miter lim="400000"/>
+              </a:ln>
+            </p:spPr>
+          </p:pic>
+        </p:grpSp>
+      </p:grpSp>
+      <p:sp>
+        <p:nvSpPr>
+          <p:cNvPr id="19" name="TextBox 18">
+            <a:extLst>
+              <a:ext uri="{FF2B5EF4-FFF2-40B4-BE49-F238E27FC236}">
+                <a16:creationId xmlns:a16="http://schemas.microsoft.com/office/drawing/2014/main" id="{04B37314-351D-8543-A3A5-53F9090FE0CA}"/>
+              </a:ext>
+            </a:extLst>
+          </p:cNvPr>
+          <p:cNvSpPr txBox="1"/>
+          <p:nvPr/>
+        </p:nvSpPr>
+        <p:spPr>
+          <a:xfrm>
+            <a:off x="1268775" y="6497956"/>
+            <a:ext cx="5994400" cy="318100"/>
+          </a:xfrm>
+          <a:prstGeom prst="rect">
+            <a:avLst/>
+          </a:prstGeom>
+          <a:noFill/>
+        </p:spPr>
+        <p:txBody>
+          <a:bodyPr wrap="square" rtlCol="0">
+            <a:spAutoFit/>
+          </a:bodyPr>
+          <a:lstStyle/>
+          <a:p>
+            <a:r>
+              <a:rPr lang="en-US" sz="1467" dirty="0"/>
+              <a:t>Slide courtesy of Andrew Farrell </a:t>
+            </a:r>
+          </a:p>
+        </p:txBody>
+      </p:sp>
+    </p:spTree>
+    <p:extLst>
+      <p:ext uri="{BB962C8B-B14F-4D97-AF65-F5344CB8AC3E}">
+        <p14:creationId xmlns:p14="http://schemas.microsoft.com/office/powerpoint/2010/main" val="23673212"/>
+      </p:ext>
+    </p:extLst>
+  </p:cSld>
+  <p:clrMapOvr>
+    <a:masterClrMapping/>
+  </p:clrMapOvr>
+  <p:transition spd="med"/>
+</p:sld>
+</file>
+
+<file path=ppt/slides/slide11.xml><?xml version="1.0" encoding="utf-8"?>
+<p:sld xmlns:a="http://schemas.openxmlformats.org/drawingml/2006/main" xmlns:r="http://schemas.openxmlformats.org/officeDocument/2006/relationships" xmlns:p="http://schemas.openxmlformats.org/presentationml/2006/main">
+  <p:cSld>
+    <p:spTree>
+      <p:nvGrpSpPr>
+        <p:cNvPr id="1" name=""/>
+        <p:cNvGrpSpPr/>
+        <p:nvPr/>
+      </p:nvGrpSpPr>
+      <p:grpSpPr>
+        <a:xfrm>
+          <a:off x="0" y="0"/>
+          <a:ext cx="0" cy="0"/>
+          <a:chOff x="0" y="0"/>
+          <a:chExt cx="0" cy="0"/>
+        </a:xfrm>
+      </p:grpSpPr>
+      <p:sp>
+        <p:nvSpPr>
+          <p:cNvPr id="28673" name="Title 1"/>
+          <p:cNvSpPr>
+            <a:spLocks noGrp="1"/>
+          </p:cNvSpPr>
+          <p:nvPr>
+            <p:ph type="title"/>
+          </p:nvPr>
+        </p:nvSpPr>
+        <p:spPr>
+          <a:xfrm>
+            <a:off x="1676400" y="-267731"/>
+            <a:ext cx="8839200" cy="1143001"/>
+          </a:xfrm>
+        </p:spPr>
+        <p:txBody>
+          <a:bodyPr/>
+          <a:lstStyle/>
+          <a:p>
+            <a:pPr algn="ctr"/>
+            <a:r>
+              <a:rPr lang="en-US" b="1" dirty="0">
+                <a:latin typeface="Calibri" charset="0"/>
+                <a:ea typeface="ＭＳ Ｐゴシック" charset="0"/>
+              </a:rPr>
+              <a:t>CIGAR strings explained</a:t>
+            </a:r>
+          </a:p>
+        </p:txBody>
+      </p:sp>
+      <p:sp>
+        <p:nvSpPr>
+          <p:cNvPr id="3" name="Content Placeholder 2"/>
+          <p:cNvSpPr>
+            <a:spLocks noGrp="1"/>
+          </p:cNvSpPr>
+          <p:nvPr>
+            <p:ph idx="1"/>
+          </p:nvPr>
+        </p:nvSpPr>
+        <p:spPr>
+          <a:xfrm>
+            <a:off x="1179854" y="4964377"/>
+            <a:ext cx="8839200" cy="1728788"/>
+          </a:xfrm>
+        </p:spPr>
+        <p:txBody>
+          <a:bodyPr>
+            <a:noAutofit/>
+          </a:bodyPr>
+          <a:lstStyle/>
+          <a:p>
+            <a:pPr indent="0">
+              <a:lnSpc>
+                <a:spcPct val="120000"/>
+              </a:lnSpc>
+              <a:defRPr/>
+            </a:pPr>
+            <a:r>
+              <a:rPr lang="en-US" sz="2000" dirty="0">
+                <a:latin typeface="Calibri" panose="020F0502020204030204" pitchFamily="34" charset="0"/>
+                <a:cs typeface="Calibri" panose="020F0502020204030204" pitchFamily="34" charset="0"/>
+              </a:rPr>
+              <a:t>e.g. 81M859N19M</a:t>
+            </a:r>
+          </a:p>
+          <a:p>
+            <a:pPr lvl="1" indent="0">
+              <a:lnSpc>
+                <a:spcPct val="120000"/>
+              </a:lnSpc>
+              <a:defRPr/>
+            </a:pPr>
+            <a:r>
+              <a:rPr lang="en-US" sz="2000" dirty="0">
+                <a:latin typeface="Calibri" panose="020F0502020204030204" pitchFamily="34" charset="0"/>
+                <a:cs typeface="Calibri" panose="020F0502020204030204" pitchFamily="34" charset="0"/>
+              </a:rPr>
+              <a:t>A 100 bp read consists of:  81 bases of alignment to reference, 859 bases skipped (an intron), 19 bases of alignment</a:t>
+            </a:r>
+          </a:p>
+        </p:txBody>
+      </p:sp>
+      <p:pic>
+        <p:nvPicPr>
+          <p:cNvPr id="28675" name="Picture 4" descr="CIGAR operations.png"/>
+          <p:cNvPicPr>
+            <a:picLocks noChangeAspect="1"/>
+          </p:cNvPicPr>
+          <p:nvPr/>
+        </p:nvPicPr>
+        <p:blipFill>
+          <a:blip r:embed="rId2">
+            <a:extLst>
+              <a:ext uri="{28A0092B-C50C-407E-A947-70E740481C1C}">
+                <a14:useLocalDpi xmlns:a14="http://schemas.microsoft.com/office/drawing/2010/main" val="0"/>
+              </a:ext>
+            </a:extLst>
+          </a:blip>
+          <a:srcRect/>
+          <a:stretch>
+            <a:fillRect/>
+          </a:stretch>
+        </p:blipFill>
+        <p:spPr bwMode="auto">
+          <a:xfrm>
+            <a:off x="1231232" y="1992392"/>
+            <a:ext cx="7649917" cy="2856699"/>
+          </a:xfrm>
+          <a:prstGeom prst="rect">
+            <a:avLst/>
+          </a:prstGeom>
+          <a:noFill/>
+          <a:ln>
+            <a:noFill/>
+          </a:ln>
+          <a:extLst>
+            <a:ext uri="{909E8E84-426E-40dd-AFC4-6F175D3DCCD1}">
+              <a14:hiddenFill xmlns:a14="http://schemas.microsoft.com/office/drawing/2010/main" xmlns="">
+                <a:solidFill>
+                  <a:srgbClr val="FFFFFF"/>
+                </a:solidFill>
+              </a14:hiddenFill>
+            </a:ext>
+            <a:ext uri="{91240B29-F687-4f45-9708-019B960494DF}">
+              <a14:hiddenLine xmlns:a14="http://schemas.microsoft.com/office/drawing/2010/main" xmlns="" w="9525">
+                <a:solidFill>
+                  <a:srgbClr val="000000"/>
+                </a:solidFill>
+                <a:miter lim="800000"/>
+                <a:headEnd/>
+                <a:tailEnd/>
+              </a14:hiddenLine>
+            </a:ext>
+          </a:extLst>
+        </p:spPr>
+      </p:pic>
+      <p:sp>
+        <p:nvSpPr>
+          <p:cNvPr id="5" name="Content Placeholder 2">
+            <a:extLst>
+              <a:ext uri="{FF2B5EF4-FFF2-40B4-BE49-F238E27FC236}">
+                <a16:creationId xmlns:a16="http://schemas.microsoft.com/office/drawing/2014/main" id="{60648E99-9DA9-9644-9BCB-1340C971E48B}"/>
+              </a:ext>
+            </a:extLst>
+          </p:cNvPr>
+          <p:cNvSpPr txBox="1">
+            <a:spLocks/>
+          </p:cNvSpPr>
+          <p:nvPr/>
+        </p:nvSpPr>
+        <p:spPr>
+          <a:xfrm>
+            <a:off x="0" y="677083"/>
+            <a:ext cx="11899142" cy="1230762"/>
+          </a:xfrm>
+          <a:prstGeom prst="rect">
+            <a:avLst/>
+          </a:prstGeom>
+        </p:spPr>
+        <p:txBody>
+          <a:bodyPr vert="horz" lIns="91440" tIns="45720" rIns="91440" bIns="45720" rtlCol="0">
+            <a:noAutofit/>
+          </a:bodyPr>
+          <a:lstStyle>
+            <a:lvl1pPr marL="228600" indent="-228600" algn="l" defTabSz="914400" rtl="0" eaLnBrk="1" latinLnBrk="0" hangingPunct="1">
+              <a:lnSpc>
+                <a:spcPct val="90000"/>
+              </a:lnSpc>
+              <a:spcBef>
+                <a:spcPts val="1000"/>
+              </a:spcBef>
+              <a:buFont typeface="Arial" panose="020B0604020202020204" pitchFamily="34" charset="0"/>
+              <a:buChar char="•"/>
+              <a:defRPr sz="2800" kern="1200">
+                <a:solidFill>
+                  <a:schemeClr val="tx1"/>
+                </a:solidFill>
+                <a:latin typeface="+mn-lt"/>
+                <a:ea typeface="+mn-ea"/>
+                <a:cs typeface="+mn-cs"/>
+              </a:defRPr>
+            </a:lvl1pPr>
+            <a:lvl2pPr marL="685800" indent="-228600" algn="l" defTabSz="914400" rtl="0" eaLnBrk="1" latinLnBrk="0" hangingPunct="1">
+              <a:lnSpc>
+                <a:spcPct val="90000"/>
+              </a:lnSpc>
+              <a:spcBef>
+                <a:spcPts val="500"/>
+              </a:spcBef>
+              <a:buFont typeface="Arial" panose="020B0604020202020204" pitchFamily="34" charset="0"/>
+              <a:buChar char="•"/>
+              <a:defRPr sz="2400" kern="1200">
+                <a:solidFill>
+                  <a:schemeClr val="tx1"/>
+                </a:solidFill>
+                <a:latin typeface="+mn-lt"/>
+                <a:ea typeface="+mn-ea"/>
+                <a:cs typeface="+mn-cs"/>
+              </a:defRPr>
+            </a:lvl2pPr>
+            <a:lvl3pPr marL="1143000" indent="-228600" algn="l" defTabSz="914400" rtl="0" eaLnBrk="1" latinLnBrk="0" hangingPunct="1">
+              <a:lnSpc>
+                <a:spcPct val="90000"/>
+              </a:lnSpc>
+              <a:spcBef>
+                <a:spcPts val="500"/>
+              </a:spcBef>
+              <a:buFont typeface="Arial" panose="020B0604020202020204" pitchFamily="34" charset="0"/>
+              <a:buChar char="•"/>
+              <a:defRPr sz="2000" kern="1200">
+                <a:solidFill>
+                  <a:schemeClr val="tx1"/>
+                </a:solidFill>
+                <a:latin typeface="+mn-lt"/>
+                <a:ea typeface="+mn-ea"/>
+                <a:cs typeface="+mn-cs"/>
+              </a:defRPr>
+            </a:lvl3pPr>
+            <a:lvl4pPr marL="1600200" indent="-228600" algn="l" defTabSz="914400" rtl="0" eaLnBrk="1" latinLnBrk="0" hangingPunct="1">
+              <a:lnSpc>
+                <a:spcPct val="90000"/>
+              </a:lnSpc>
+              <a:spcBef>
+                <a:spcPts val="500"/>
+              </a:spcBef>
+              <a:buFont typeface="Arial" panose="020B0604020202020204" pitchFamily="34" charset="0"/>
+              <a:buChar char="•"/>
+              <a:defRPr sz="1800" kern="1200">
+                <a:solidFill>
+                  <a:schemeClr val="tx1"/>
+                </a:solidFill>
+                <a:latin typeface="+mn-lt"/>
+                <a:ea typeface="+mn-ea"/>
+                <a:cs typeface="+mn-cs"/>
+              </a:defRPr>
+            </a:lvl4pPr>
+            <a:lvl5pPr marL="2057400" indent="-228600" algn="l" defTabSz="914400" rtl="0" eaLnBrk="1" latinLnBrk="0" hangingPunct="1">
+              <a:lnSpc>
+                <a:spcPct val="90000"/>
+              </a:lnSpc>
+              <a:spcBef>
+                <a:spcPts val="500"/>
+              </a:spcBef>
+              <a:buFont typeface="Arial" panose="020B0604020202020204" pitchFamily="34" charset="0"/>
+              <a:buChar char="•"/>
+              <a:defRPr sz="1800" kern="1200">
+                <a:solidFill>
+                  <a:schemeClr val="tx1"/>
+                </a:solidFill>
+                <a:latin typeface="+mn-lt"/>
+                <a:ea typeface="+mn-ea"/>
+                <a:cs typeface="+mn-cs"/>
+              </a:defRPr>
+            </a:lvl5pPr>
+            <a:lvl6pPr marL="2514600" indent="-228600" algn="l" defTabSz="914400" rtl="0" eaLnBrk="1" latinLnBrk="0" hangingPunct="1">
+              <a:lnSpc>
+                <a:spcPct val="90000"/>
+              </a:lnSpc>
+              <a:spcBef>
+                <a:spcPts val="500"/>
+              </a:spcBef>
+              <a:buFont typeface="Arial" panose="020B0604020202020204" pitchFamily="34" charset="0"/>
+              <a:buChar char="•"/>
+              <a:defRPr sz="1800" kern="1200">
+                <a:solidFill>
+                  <a:schemeClr val="tx1"/>
+                </a:solidFill>
+                <a:latin typeface="+mn-lt"/>
+                <a:ea typeface="+mn-ea"/>
+                <a:cs typeface="+mn-cs"/>
+              </a:defRPr>
+            </a:lvl6pPr>
+            <a:lvl7pPr marL="2971800" indent="-228600" algn="l" defTabSz="914400" rtl="0" eaLnBrk="1" latinLnBrk="0" hangingPunct="1">
+              <a:lnSpc>
+                <a:spcPct val="90000"/>
+              </a:lnSpc>
+              <a:spcBef>
+                <a:spcPts val="500"/>
+              </a:spcBef>
+              <a:buFont typeface="Arial" panose="020B0604020202020204" pitchFamily="34" charset="0"/>
+              <a:buChar char="•"/>
+              <a:defRPr sz="1800" kern="1200">
+                <a:solidFill>
+                  <a:schemeClr val="tx1"/>
+                </a:solidFill>
+                <a:latin typeface="+mn-lt"/>
+                <a:ea typeface="+mn-ea"/>
+                <a:cs typeface="+mn-cs"/>
+              </a:defRPr>
+            </a:lvl7pPr>
+            <a:lvl8pPr marL="3429000" indent="-228600" algn="l" defTabSz="914400" rtl="0" eaLnBrk="1" latinLnBrk="0" hangingPunct="1">
+              <a:lnSpc>
+                <a:spcPct val="90000"/>
+              </a:lnSpc>
+              <a:spcBef>
+                <a:spcPts val="500"/>
+              </a:spcBef>
+              <a:buFont typeface="Arial" panose="020B0604020202020204" pitchFamily="34" charset="0"/>
+              <a:buChar char="•"/>
+              <a:defRPr sz="1800" kern="1200">
+                <a:solidFill>
+                  <a:schemeClr val="tx1"/>
+                </a:solidFill>
+                <a:latin typeface="+mn-lt"/>
+                <a:ea typeface="+mn-ea"/>
+                <a:cs typeface="+mn-cs"/>
+              </a:defRPr>
+            </a:lvl8pPr>
+            <a:lvl9pPr marL="3886200" indent="-228600" algn="l" defTabSz="914400" rtl="0" eaLnBrk="1" latinLnBrk="0" hangingPunct="1">
+              <a:lnSpc>
+                <a:spcPct val="90000"/>
+              </a:lnSpc>
+              <a:spcBef>
+                <a:spcPts val="500"/>
+              </a:spcBef>
+              <a:buFont typeface="Arial" panose="020B0604020202020204" pitchFamily="34" charset="0"/>
+              <a:buChar char="•"/>
+              <a:defRPr sz="1800" kern="1200">
+                <a:solidFill>
+                  <a:schemeClr val="tx1"/>
+                </a:solidFill>
+                <a:latin typeface="+mn-lt"/>
+                <a:ea typeface="+mn-ea"/>
+                <a:cs typeface="+mn-cs"/>
+              </a:defRPr>
+            </a:lvl9pPr>
+          </a:lstStyle>
+          <a:p>
+            <a:pPr indent="0">
+              <a:lnSpc>
+                <a:spcPct val="120000"/>
+              </a:lnSpc>
+              <a:defRPr/>
+            </a:pPr>
+            <a:r>
+              <a:rPr lang="en-US" sz="1800" dirty="0">
+                <a:cs typeface="Calibri" panose="020F0502020204030204" pitchFamily="34" charset="0"/>
+              </a:rPr>
+              <a:t>The ‘CIGAR’ (</a:t>
+            </a:r>
+            <a:r>
+              <a:rPr lang="en-US" sz="1800" b="1" u="sng" dirty="0">
+                <a:cs typeface="Calibri" panose="020F0502020204030204" pitchFamily="34" charset="0"/>
+              </a:rPr>
+              <a:t>C</a:t>
+            </a:r>
+            <a:r>
+              <a:rPr lang="en-US" sz="1800" dirty="0">
+                <a:cs typeface="Calibri" panose="020F0502020204030204" pitchFamily="34" charset="0"/>
+              </a:rPr>
+              <a:t>ompact </a:t>
+            </a:r>
+            <a:r>
+              <a:rPr lang="en-US" sz="1800" b="1" u="sng" dirty="0">
+                <a:cs typeface="Calibri" panose="020F0502020204030204" pitchFamily="34" charset="0"/>
+              </a:rPr>
+              <a:t>I</a:t>
+            </a:r>
+            <a:r>
+              <a:rPr lang="en-US" sz="1800" dirty="0">
+                <a:cs typeface="Calibri" panose="020F0502020204030204" pitchFamily="34" charset="0"/>
+              </a:rPr>
+              <a:t>diosyncratic </a:t>
+            </a:r>
+            <a:r>
+              <a:rPr lang="en-US" sz="1800" b="1" u="sng" dirty="0">
+                <a:cs typeface="Calibri" panose="020F0502020204030204" pitchFamily="34" charset="0"/>
+              </a:rPr>
+              <a:t>G</a:t>
+            </a:r>
+            <a:r>
+              <a:rPr lang="en-US" sz="1800" dirty="0">
+                <a:cs typeface="Calibri" panose="020F0502020204030204" pitchFamily="34" charset="0"/>
+              </a:rPr>
+              <a:t>apped </a:t>
+            </a:r>
+            <a:r>
+              <a:rPr lang="en-US" sz="1800" b="1" u="sng" dirty="0">
+                <a:cs typeface="Calibri" panose="020F0502020204030204" pitchFamily="34" charset="0"/>
+              </a:rPr>
+              <a:t>A</a:t>
+            </a:r>
+            <a:r>
+              <a:rPr lang="en-US" sz="1800" dirty="0">
+                <a:cs typeface="Calibri" panose="020F0502020204030204" pitchFamily="34" charset="0"/>
+              </a:rPr>
+              <a:t>lignment </a:t>
+            </a:r>
+            <a:r>
+              <a:rPr lang="en-US" sz="1800" b="1" u="sng" dirty="0">
+                <a:cs typeface="Calibri" panose="020F0502020204030204" pitchFamily="34" charset="0"/>
+              </a:rPr>
+              <a:t>R</a:t>
+            </a:r>
+            <a:r>
+              <a:rPr lang="en-US" sz="1800" dirty="0">
+                <a:cs typeface="Calibri" panose="020F0502020204030204" pitchFamily="34" charset="0"/>
+              </a:rPr>
+              <a:t>eport)</a:t>
+            </a:r>
+          </a:p>
+          <a:p>
+            <a:pPr indent="0">
+              <a:lnSpc>
+                <a:spcPct val="120000"/>
+              </a:lnSpc>
+              <a:defRPr/>
+            </a:pPr>
+            <a:r>
+              <a:rPr lang="en-US" sz="1800" dirty="0">
+                <a:cs typeface="Calibri" panose="020F0502020204030204" pitchFamily="34" charset="0"/>
+              </a:rPr>
+              <a:t>The CIGAR string is a sequence of base lengths and associated ‘operations’ indicating which bases align to the reference (either a match or mismatch), are deleted, are inserted, represent introns, etc.</a:t>
+            </a:r>
+          </a:p>
+        </p:txBody>
+      </p:sp>
+    </p:spTree>
+    <p:extLst>
+      <p:ext uri="{BB962C8B-B14F-4D97-AF65-F5344CB8AC3E}">
+        <p14:creationId xmlns:p14="http://schemas.microsoft.com/office/powerpoint/2010/main" val="481067082"/>
+      </p:ext>
+    </p:extLst>
+  </p:cSld>
+  <p:clrMapOvr>
+    <a:masterClrMapping/>
+  </p:clrMapOvr>
+</p:sld>
+</file>
+
+<file path=ppt/slides/slide12.xml><?xml version="1.0" encoding="utf-8"?>
+<p:sld xmlns:a="http://schemas.openxmlformats.org/drawingml/2006/main" xmlns:r="http://schemas.openxmlformats.org/officeDocument/2006/relationships" xmlns:p="http://schemas.openxmlformats.org/presentationml/2006/main">
+  <p:cSld>
+    <p:spTree>
+      <p:nvGrpSpPr>
+        <p:cNvPr id="1" name=""/>
+        <p:cNvGrpSpPr/>
+        <p:nvPr/>
+      </p:nvGrpSpPr>
+      <p:grpSpPr>
+        <a:xfrm>
+          <a:off x="0" y="0"/>
+          <a:ext cx="0" cy="0"/>
+          <a:chOff x="0" y="0"/>
+          <a:chExt cx="0" cy="0"/>
+        </a:xfrm>
+      </p:grpSpPr>
+      <p:sp>
+        <p:nvSpPr>
+          <p:cNvPr id="24577" name="Title 1"/>
+          <p:cNvSpPr>
+            <a:spLocks noGrp="1"/>
+          </p:cNvSpPr>
+          <p:nvPr>
+            <p:ph type="title"/>
+          </p:nvPr>
+        </p:nvSpPr>
+        <p:spPr>
+          <a:xfrm>
+            <a:off x="1676400" y="-26988"/>
+            <a:ext cx="8839200" cy="1143001"/>
+          </a:xfrm>
+        </p:spPr>
+        <p:txBody>
+          <a:bodyPr>
+            <a:normAutofit/>
+          </a:bodyPr>
+          <a:lstStyle/>
+          <a:p>
+            <a:pPr algn="ctr"/>
+            <a:r>
+              <a:rPr lang="en-US" b="1" dirty="0">
+                <a:latin typeface="Calibri" charset="0"/>
+                <a:ea typeface="ＭＳ Ｐゴシック" charset="0"/>
+              </a:rPr>
+              <a:t>CRAM files</a:t>
+            </a:r>
+          </a:p>
+        </p:txBody>
+      </p:sp>
+      <p:sp>
+        <p:nvSpPr>
+          <p:cNvPr id="28674" name="Content Placeholder 2"/>
+          <p:cNvSpPr>
+            <a:spLocks noGrp="1"/>
+          </p:cNvSpPr>
+          <p:nvPr>
+            <p:ph idx="1"/>
+          </p:nvPr>
+        </p:nvSpPr>
+        <p:spPr>
+          <a:xfrm>
+            <a:off x="659567" y="1116013"/>
+            <a:ext cx="6405601" cy="5021262"/>
+          </a:xfrm>
+        </p:spPr>
+        <p:txBody>
+          <a:bodyPr>
+            <a:normAutofit lnSpcReduction="10000"/>
+          </a:bodyPr>
+          <a:lstStyle/>
+          <a:p>
+            <a:pPr>
+              <a:defRPr/>
+            </a:pPr>
+            <a:r>
+              <a:rPr lang="en-US" dirty="0">
+                <a:latin typeface="Calibri" panose="020F0502020204030204" pitchFamily="34" charset="0"/>
+                <a:ea typeface="ＭＳ Ｐゴシック" charset="0"/>
+                <a:cs typeface="Calibri" panose="020F0502020204030204" pitchFamily="34" charset="0"/>
+              </a:rPr>
+              <a:t>CRAM is an ultra-compressed version of a BAM file</a:t>
+            </a:r>
+          </a:p>
+          <a:p>
+            <a:pPr lvl="1">
+              <a:defRPr/>
+            </a:pPr>
+            <a:r>
+              <a:rPr lang="en-US" dirty="0">
+                <a:latin typeface="Calibri" panose="020F0502020204030204" pitchFamily="34" charset="0"/>
+                <a:ea typeface="ＭＳ Ｐゴシック" charset="0"/>
+                <a:cs typeface="Calibri" panose="020F0502020204030204" pitchFamily="34" charset="0"/>
+              </a:rPr>
+              <a:t>Usually between 30-60% smaller than the corresponding BAM</a:t>
+            </a:r>
+          </a:p>
+          <a:p>
+            <a:pPr lvl="1">
+              <a:defRPr/>
+            </a:pPr>
+            <a:endParaRPr lang="en-US" dirty="0">
+              <a:latin typeface="Calibri" panose="020F0502020204030204" pitchFamily="34" charset="0"/>
+              <a:ea typeface="ＭＳ Ｐゴシック" charset="0"/>
+              <a:cs typeface="Calibri" panose="020F0502020204030204" pitchFamily="34" charset="0"/>
+            </a:endParaRPr>
+          </a:p>
+          <a:p>
+            <a:pPr>
+              <a:defRPr/>
+            </a:pPr>
+            <a:r>
+              <a:rPr lang="en-US" dirty="0">
+                <a:latin typeface="Calibri" panose="020F0502020204030204" pitchFamily="34" charset="0"/>
+                <a:ea typeface="ＭＳ Ｐゴシック" charset="0"/>
+                <a:cs typeface="Calibri" panose="020F0502020204030204" pitchFamily="34" charset="0"/>
+              </a:rPr>
+              <a:t>Stores “diffs” from the reference genome </a:t>
+            </a:r>
+          </a:p>
+          <a:p>
+            <a:pPr lvl="1">
+              <a:defRPr/>
+            </a:pPr>
+            <a:r>
+              <a:rPr lang="en-US" dirty="0">
+                <a:latin typeface="Calibri" panose="020F0502020204030204" pitchFamily="34" charset="0"/>
+                <a:ea typeface="ＭＳ Ｐゴシック" charset="0"/>
+                <a:cs typeface="Calibri" panose="020F0502020204030204" pitchFamily="34" charset="0"/>
+              </a:rPr>
+              <a:t>requires the matching reference genome to restore original data!</a:t>
+            </a:r>
+          </a:p>
+          <a:p>
+            <a:pPr lvl="1">
+              <a:defRPr/>
+            </a:pPr>
+            <a:endParaRPr lang="en-US" dirty="0">
+              <a:latin typeface="Calibri" panose="020F0502020204030204" pitchFamily="34" charset="0"/>
+              <a:ea typeface="ＭＳ Ｐゴシック" charset="0"/>
+              <a:cs typeface="Calibri" panose="020F0502020204030204" pitchFamily="34" charset="0"/>
+            </a:endParaRPr>
+          </a:p>
+          <a:p>
+            <a:pPr>
+              <a:defRPr/>
+            </a:pPr>
+            <a:r>
+              <a:rPr lang="en-US" dirty="0">
+                <a:latin typeface="Calibri" panose="020F0502020204030204" pitchFamily="34" charset="0"/>
+                <a:ea typeface="ＭＳ Ｐゴシック" charset="0"/>
+                <a:cs typeface="Calibri" panose="020F0502020204030204" pitchFamily="34" charset="0"/>
+              </a:rPr>
+              <a:t>Base quality binning may be used as well</a:t>
+            </a:r>
+          </a:p>
+          <a:p>
+            <a:pPr>
+              <a:defRPr/>
+            </a:pPr>
+            <a:endParaRPr lang="en-US" dirty="0">
+              <a:latin typeface="Calibri" panose="020F0502020204030204" pitchFamily="34" charset="0"/>
+              <a:ea typeface="ＭＳ Ｐゴシック" charset="0"/>
+              <a:cs typeface="Calibri" panose="020F0502020204030204" pitchFamily="34" charset="0"/>
+            </a:endParaRPr>
+          </a:p>
+          <a:p>
+            <a:pPr>
+              <a:defRPr/>
+            </a:pPr>
+            <a:r>
+              <a:rPr lang="en-US" dirty="0">
+                <a:latin typeface="Calibri" panose="020F0502020204030204" pitchFamily="34" charset="0"/>
+                <a:ea typeface="ＭＳ Ｐゴシック" charset="0"/>
+                <a:cs typeface="Calibri" panose="020F0502020204030204" pitchFamily="34" charset="0"/>
+              </a:rPr>
+              <a:t>Some tools still require conversion back to bam</a:t>
+            </a:r>
+          </a:p>
+          <a:p>
+            <a:pPr lvl="1">
+              <a:defRPr/>
+            </a:pPr>
+            <a:endParaRPr lang="en-US" dirty="0">
+              <a:latin typeface="Calibri" panose="020F0502020204030204" pitchFamily="34" charset="0"/>
+              <a:ea typeface="ＭＳ Ｐゴシック" charset="0"/>
+              <a:cs typeface="Calibri" panose="020F0502020204030204" pitchFamily="34" charset="0"/>
+            </a:endParaRPr>
+          </a:p>
+        </p:txBody>
+      </p:sp>
+      <p:pic>
+        <p:nvPicPr>
+          <p:cNvPr id="3" name="Picture 2">
+            <a:extLst>
+              <a:ext uri="{FF2B5EF4-FFF2-40B4-BE49-F238E27FC236}">
+                <a16:creationId xmlns:a16="http://schemas.microsoft.com/office/drawing/2014/main" id="{E45101BB-88E9-BF42-96BB-482587C21F3A}"/>
+              </a:ext>
+            </a:extLst>
+          </p:cNvPr>
+          <p:cNvPicPr>
+            <a:picLocks noChangeAspect="1"/>
+          </p:cNvPicPr>
+          <p:nvPr/>
+        </p:nvPicPr>
+        <p:blipFill>
+          <a:blip r:embed="rId2"/>
+          <a:stretch>
+            <a:fillRect/>
+          </a:stretch>
+        </p:blipFill>
+        <p:spPr>
+          <a:xfrm>
+            <a:off x="7281069" y="1323182"/>
+            <a:ext cx="4816725" cy="4095750"/>
+          </a:xfrm>
+          <a:prstGeom prst="rect">
+            <a:avLst/>
+          </a:prstGeom>
+        </p:spPr>
+      </p:pic>
+    </p:spTree>
+    <p:extLst>
+      <p:ext uri="{BB962C8B-B14F-4D97-AF65-F5344CB8AC3E}">
+        <p14:creationId xmlns:p14="http://schemas.microsoft.com/office/powerpoint/2010/main" val="3943815810"/>
+      </p:ext>
+    </p:extLst>
+  </p:cSld>
+  <p:clrMapOvr>
+    <a:masterClrMapping/>
+  </p:clrMapOvr>
+</p:sld>
+</file>
+
+<file path=ppt/slides/slide13.xml><?xml version="1.0" encoding="utf-8"?>
+<p:sld xmlns:a="http://schemas.openxmlformats.org/drawingml/2006/main" xmlns:r="http://schemas.openxmlformats.org/officeDocument/2006/relationships" xmlns:p="http://schemas.openxmlformats.org/presentationml/2006/main">
+  <p:cSld>
+    <p:spTree>
+      <p:nvGrpSpPr>
+        <p:cNvPr id="1" name=""/>
+        <p:cNvGrpSpPr/>
+        <p:nvPr/>
+      </p:nvGrpSpPr>
+      <p:grpSpPr>
+        <a:xfrm>
+          <a:off x="0" y="0"/>
+          <a:ext cx="0" cy="0"/>
+          <a:chOff x="0" y="0"/>
+          <a:chExt cx="0" cy="0"/>
+        </a:xfrm>
+      </p:grpSpPr>
+      <p:sp>
+        <p:nvSpPr>
+          <p:cNvPr id="29697" name="Title 1"/>
+          <p:cNvSpPr>
+            <a:spLocks noGrp="1"/>
+          </p:cNvSpPr>
+          <p:nvPr>
+            <p:ph type="title"/>
+          </p:nvPr>
+        </p:nvSpPr>
+        <p:spPr>
+          <a:xfrm>
+            <a:off x="1676400" y="-17463"/>
+            <a:ext cx="8839200" cy="1143001"/>
+          </a:xfrm>
+        </p:spPr>
+        <p:txBody>
+          <a:bodyPr/>
+          <a:lstStyle/>
+          <a:p>
+            <a:pPr algn="ctr"/>
+            <a:r>
+              <a:rPr lang="en-US" b="1" dirty="0">
+                <a:latin typeface="Calibri" charset="0"/>
+                <a:ea typeface="ＭＳ Ｐゴシック" charset="0"/>
+              </a:rPr>
+              <a:t>Introduction to the BED format</a:t>
+            </a:r>
+          </a:p>
+        </p:txBody>
+      </p:sp>
+      <p:sp>
+        <p:nvSpPr>
+          <p:cNvPr id="28674" name="Content Placeholder 2"/>
+          <p:cNvSpPr>
+            <a:spLocks noGrp="1"/>
+          </p:cNvSpPr>
+          <p:nvPr>
+            <p:ph idx="1"/>
+          </p:nvPr>
+        </p:nvSpPr>
+        <p:spPr>
+          <a:xfrm>
+            <a:off x="1676400" y="1218405"/>
+            <a:ext cx="8839200" cy="4984431"/>
+          </a:xfrm>
+        </p:spPr>
+        <p:txBody>
+          <a:bodyPr>
+            <a:normAutofit lnSpcReduction="10000"/>
+          </a:bodyPr>
+          <a:lstStyle/>
+          <a:p>
+            <a:pPr>
+              <a:defRPr/>
+            </a:pPr>
+            <a:r>
+              <a:rPr lang="en-US" dirty="0">
+                <a:latin typeface="Calibri" charset="0"/>
+                <a:ea typeface="ＭＳ Ｐゴシック" charset="0"/>
+              </a:rPr>
+              <a:t>When working with BAM files, it is very common to want to examine a focused subset of the reference genome</a:t>
+            </a:r>
+          </a:p>
+          <a:p>
+            <a:pPr lvl="1">
+              <a:defRPr/>
+            </a:pPr>
+            <a:r>
+              <a:rPr lang="en-US" dirty="0">
+                <a:latin typeface="Calibri" charset="0"/>
+                <a:ea typeface="ＭＳ Ｐゴシック" charset="0"/>
+              </a:rPr>
+              <a:t>e.g. the exons of a gene</a:t>
+            </a:r>
+            <a:br>
+              <a:rPr lang="en-US" dirty="0">
+                <a:latin typeface="Calibri" charset="0"/>
+                <a:ea typeface="ＭＳ Ｐゴシック" charset="0"/>
+              </a:rPr>
+            </a:br>
+            <a:endParaRPr lang="en-US" dirty="0">
+              <a:latin typeface="Calibri" charset="0"/>
+              <a:ea typeface="ＭＳ Ｐゴシック" charset="0"/>
+            </a:endParaRPr>
+          </a:p>
+          <a:p>
+            <a:pPr>
+              <a:defRPr/>
+            </a:pPr>
+            <a:r>
+              <a:rPr lang="en-US" dirty="0">
+                <a:latin typeface="Calibri" charset="0"/>
+                <a:ea typeface="ＭＳ Ｐゴシック" charset="0"/>
+              </a:rPr>
+              <a:t>These subsets are commonly specified in ‘BED’ files</a:t>
+            </a:r>
+          </a:p>
+          <a:p>
+            <a:pPr lvl="1">
+              <a:defRPr/>
+            </a:pPr>
+            <a:r>
+              <a:rPr lang="en-US" dirty="0">
+                <a:latin typeface="Calibri" charset="0"/>
+                <a:ea typeface="ＭＳ Ｐゴシック" charset="0"/>
+                <a:hlinkClick r:id="rId2"/>
+              </a:rPr>
+              <a:t>https://genome.ucsc.edu/FAQ/FAQformat.html#format1</a:t>
+            </a:r>
+            <a:br>
+              <a:rPr lang="en-US" dirty="0">
+                <a:latin typeface="Calibri" charset="0"/>
+                <a:ea typeface="ＭＳ Ｐゴシック" charset="0"/>
+              </a:rPr>
+            </a:br>
+            <a:endParaRPr lang="en-US" dirty="0">
+              <a:latin typeface="Calibri" charset="0"/>
+              <a:ea typeface="ＭＳ Ｐゴシック" charset="0"/>
+            </a:endParaRPr>
+          </a:p>
+          <a:p>
+            <a:pPr>
+              <a:defRPr/>
+            </a:pPr>
+            <a:r>
+              <a:rPr lang="en-US" dirty="0">
+                <a:latin typeface="Calibri" charset="0"/>
+                <a:ea typeface="ＭＳ Ｐゴシック" charset="0"/>
+              </a:rPr>
+              <a:t>Many BAM manipulation tools accept regions of interest in BED format</a:t>
+            </a:r>
+            <a:br>
+              <a:rPr lang="en-US" dirty="0">
+                <a:latin typeface="Calibri" charset="0"/>
+                <a:ea typeface="ＭＳ Ｐゴシック" charset="0"/>
+              </a:rPr>
+            </a:br>
+            <a:endParaRPr lang="en-US" dirty="0">
+              <a:latin typeface="Calibri" charset="0"/>
+              <a:ea typeface="ＭＳ Ｐゴシック" charset="0"/>
+            </a:endParaRPr>
+          </a:p>
+          <a:p>
+            <a:pPr>
+              <a:defRPr/>
+            </a:pPr>
+            <a:r>
+              <a:rPr lang="en-US" dirty="0">
+                <a:latin typeface="Calibri" charset="0"/>
+                <a:ea typeface="ＭＳ Ｐゴシック" charset="0"/>
+              </a:rPr>
+              <a:t>Basic BED format (tab separated):</a:t>
+            </a:r>
+          </a:p>
+          <a:p>
+            <a:pPr lvl="1">
+              <a:defRPr/>
+            </a:pPr>
+            <a:r>
+              <a:rPr lang="en-US" dirty="0">
+                <a:latin typeface="Calibri" charset="0"/>
+                <a:ea typeface="ＭＳ Ｐゴシック" charset="0"/>
+              </a:rPr>
+              <a:t>Chromosome name, start position, end position (BED3)</a:t>
+            </a:r>
+          </a:p>
+          <a:p>
+            <a:pPr lvl="1">
+              <a:defRPr/>
+            </a:pPr>
+            <a:r>
+              <a:rPr lang="en-US" dirty="0">
+                <a:latin typeface="Calibri" charset="0"/>
+                <a:ea typeface="ＭＳ Ｐゴシック" charset="0"/>
+              </a:rPr>
+              <a:t>Coordinates in BED format are 0 based</a:t>
+            </a:r>
+          </a:p>
+        </p:txBody>
+      </p:sp>
+    </p:spTree>
+    <p:extLst>
+      <p:ext uri="{BB962C8B-B14F-4D97-AF65-F5344CB8AC3E}">
+        <p14:creationId xmlns:p14="http://schemas.microsoft.com/office/powerpoint/2010/main" val="1626480069"/>
+      </p:ext>
+    </p:extLst>
+  </p:cSld>
+  <p:clrMapOvr>
+    <a:masterClrMapping/>
+  </p:clrMapOvr>
+</p:sld>
+</file>
+
+<file path=ppt/slides/slide14.xml><?xml version="1.0" encoding="utf-8"?>
+<p:sld xmlns:a="http://schemas.openxmlformats.org/drawingml/2006/main" xmlns:r="http://schemas.openxmlformats.org/officeDocument/2006/relationships" xmlns:p="http://schemas.openxmlformats.org/presentationml/2006/main">
+  <p:cSld>
+    <p:spTree>
+      <p:nvGrpSpPr>
+        <p:cNvPr id="1" name=""/>
+        <p:cNvGrpSpPr/>
+        <p:nvPr/>
+      </p:nvGrpSpPr>
+      <p:grpSpPr>
+        <a:xfrm>
+          <a:off x="0" y="0"/>
+          <a:ext cx="0" cy="0"/>
+          <a:chOff x="0" y="0"/>
+          <a:chExt cx="0" cy="0"/>
+        </a:xfrm>
+      </p:grpSpPr>
+      <p:sp>
+        <p:nvSpPr>
           <p:cNvPr id="29697" name="Title 1"/>
           <p:cNvSpPr>
             <a:spLocks noGrp="1"/>
@@ -4975,7 +6621,7 @@
 </p:sld>
 </file>
 
-<file path=ppt/slides/slide11.xml><?xml version="1.0" encoding="utf-8"?>
+<file path=ppt/slides/slide15.xml><?xml version="1.0" encoding="utf-8"?>
 <p:sld xmlns:a="http://schemas.openxmlformats.org/drawingml/2006/main" xmlns:r="http://schemas.openxmlformats.org/officeDocument/2006/relationships" xmlns:p="http://schemas.openxmlformats.org/presentationml/2006/main">
   <p:cSld>
     <p:spTree>
@@ -5198,7 +6844,7 @@
 </p:sld>
 </file>
 
-<file path=ppt/slides/slide12.xml><?xml version="1.0" encoding="utf-8"?>
+<file path=ppt/slides/slide16.xml><?xml version="1.0" encoding="utf-8"?>
 <p:sld xmlns:a="http://schemas.openxmlformats.org/drawingml/2006/main" xmlns:r="http://schemas.openxmlformats.org/officeDocument/2006/relationships" xmlns:p="http://schemas.openxmlformats.org/presentationml/2006/main">
   <p:cSld>
     <p:spTree>
@@ -5331,7 +6977,7 @@
 </p:sld>
 </file>
 
-<file path=ppt/slides/slide13.xml><?xml version="1.0" encoding="utf-8"?>
+<file path=ppt/slides/slide17.xml><?xml version="1.0" encoding="utf-8"?>
 <p:sld xmlns:a="http://schemas.openxmlformats.org/drawingml/2006/main" xmlns:r="http://schemas.openxmlformats.org/officeDocument/2006/relationships" xmlns:p="http://schemas.openxmlformats.org/presentationml/2006/main">
   <p:cSld>
     <p:spTree>
@@ -8755,7 +10401,7 @@
 </p:sld>
 </file>
 
-<file path=ppt/slides/slide14.xml><?xml version="1.0" encoding="utf-8"?>
+<file path=ppt/slides/slide18.xml><?xml version="1.0" encoding="utf-8"?>
 <p:sld xmlns:a="http://schemas.openxmlformats.org/drawingml/2006/main" xmlns:r="http://schemas.openxmlformats.org/officeDocument/2006/relationships" xmlns:p="http://schemas.openxmlformats.org/presentationml/2006/main">
   <p:cSld>
     <p:spTree>
@@ -9136,7 +10782,7 @@
 </p:sld>
 </file>
 
-<file path=ppt/slides/slide15.xml><?xml version="1.0" encoding="utf-8"?>
+<file path=ppt/slides/slide19.xml><?xml version="1.0" encoding="utf-8"?>
 <p:sld xmlns:a="http://schemas.openxmlformats.org/drawingml/2006/main" xmlns:r="http://schemas.openxmlformats.org/officeDocument/2006/relationships" xmlns:p="http://schemas.openxmlformats.org/presentationml/2006/main">
   <p:cSld>
     <p:spTree>
@@ -9302,7 +10948,212 @@
 </p:sld>
 </file>
 
-<file path=ppt/slides/slide16.xml><?xml version="1.0" encoding="utf-8"?>
+<file path=ppt/slides/slide2.xml><?xml version="1.0" encoding="utf-8"?>
+<p:sld xmlns:a="http://schemas.openxmlformats.org/drawingml/2006/main" xmlns:r="http://schemas.openxmlformats.org/officeDocument/2006/relationships" xmlns:p="http://schemas.openxmlformats.org/presentationml/2006/main">
+  <p:cSld>
+    <p:spTree>
+      <p:nvGrpSpPr>
+        <p:cNvPr id="1" name=""/>
+        <p:cNvGrpSpPr/>
+        <p:nvPr/>
+      </p:nvGrpSpPr>
+      <p:grpSpPr>
+        <a:xfrm>
+          <a:off x="0" y="0"/>
+          <a:ext cx="0" cy="0"/>
+          <a:chOff x="0" y="0"/>
+          <a:chExt cx="0" cy="0"/>
+        </a:xfrm>
+      </p:grpSpPr>
+      <p:sp>
+        <p:nvSpPr>
+          <p:cNvPr id="24577" name="Title 1"/>
+          <p:cNvSpPr>
+            <a:spLocks noGrp="1"/>
+          </p:cNvSpPr>
+          <p:nvPr>
+            <p:ph type="title"/>
+          </p:nvPr>
+        </p:nvSpPr>
+        <p:spPr>
+          <a:xfrm>
+            <a:off x="1676400" y="-26988"/>
+            <a:ext cx="8839200" cy="1143001"/>
+          </a:xfrm>
+        </p:spPr>
+        <p:txBody>
+          <a:bodyPr>
+            <a:normAutofit fontScale="90000"/>
+          </a:bodyPr>
+          <a:lstStyle/>
+          <a:p>
+            <a:pPr algn="ctr"/>
+            <a:r>
+              <a:rPr lang="en-US" b="1" dirty="0">
+                <a:latin typeface="Calibri" charset="0"/>
+                <a:ea typeface="ＭＳ Ｐゴシック" charset="0"/>
+              </a:rPr>
+              <a:t>Introduction to the SAM/BAM format</a:t>
+            </a:r>
+          </a:p>
+        </p:txBody>
+      </p:sp>
+      <p:sp>
+        <p:nvSpPr>
+          <p:cNvPr id="28674" name="Content Placeholder 2"/>
+          <p:cNvSpPr>
+            <a:spLocks noGrp="1"/>
+          </p:cNvSpPr>
+          <p:nvPr>
+            <p:ph idx="1"/>
+          </p:nvPr>
+        </p:nvSpPr>
+        <p:spPr>
+          <a:xfrm>
+            <a:off x="659567" y="1116013"/>
+            <a:ext cx="11002781" cy="5021262"/>
+          </a:xfrm>
+        </p:spPr>
+        <p:txBody>
+          <a:bodyPr>
+            <a:normAutofit/>
+          </a:bodyPr>
+          <a:lstStyle/>
+          <a:p>
+            <a:pPr>
+              <a:defRPr/>
+            </a:pPr>
+            <a:r>
+              <a:rPr lang="en-US" dirty="0">
+                <a:latin typeface="Calibri" panose="020F0502020204030204" pitchFamily="34" charset="0"/>
+                <a:ea typeface="ＭＳ Ｐゴシック" charset="0"/>
+                <a:cs typeface="Calibri" panose="020F0502020204030204" pitchFamily="34" charset="0"/>
+              </a:rPr>
+              <a:t>The specification</a:t>
+            </a:r>
+          </a:p>
+          <a:p>
+            <a:pPr lvl="1">
+              <a:defRPr/>
+            </a:pPr>
+            <a:r>
+              <a:rPr lang="en-US" dirty="0">
+                <a:latin typeface="Calibri" panose="020F0502020204030204" pitchFamily="34" charset="0"/>
+                <a:ea typeface="ＭＳ Ｐゴシック" charset="0"/>
+                <a:cs typeface="Calibri" panose="020F0502020204030204" pitchFamily="34" charset="0"/>
+                <a:hlinkClick r:id="rId2"/>
+              </a:rPr>
+              <a:t>http://samtools.sourceforge.net/SAM1.pdf</a:t>
+            </a:r>
+            <a:endParaRPr lang="en-US" dirty="0">
+              <a:latin typeface="Calibri" panose="020F0502020204030204" pitchFamily="34" charset="0"/>
+              <a:ea typeface="ＭＳ Ｐゴシック" charset="0"/>
+              <a:cs typeface="Calibri" panose="020F0502020204030204" pitchFamily="34" charset="0"/>
+            </a:endParaRPr>
+          </a:p>
+          <a:p>
+            <a:pPr>
+              <a:defRPr/>
+            </a:pPr>
+            <a:r>
+              <a:rPr lang="en-US" dirty="0">
+                <a:latin typeface="Calibri" panose="020F0502020204030204" pitchFamily="34" charset="0"/>
+                <a:ea typeface="ＭＳ Ｐゴシック" charset="0"/>
+                <a:cs typeface="Calibri" panose="020F0502020204030204" pitchFamily="34" charset="0"/>
+              </a:rPr>
+              <a:t>SAM is uncompressed text data</a:t>
+            </a:r>
+          </a:p>
+          <a:p>
+            <a:pPr>
+              <a:defRPr/>
+            </a:pPr>
+            <a:r>
+              <a:rPr lang="en-US" dirty="0">
+                <a:latin typeface="Calibri" panose="020F0502020204030204" pitchFamily="34" charset="0"/>
+                <a:ea typeface="ＭＳ Ｐゴシック" charset="0"/>
+                <a:cs typeface="Calibri" panose="020F0502020204030204" pitchFamily="34" charset="0"/>
+              </a:rPr>
+              <a:t>BAM is a compressed version of SAM</a:t>
+            </a:r>
+          </a:p>
+          <a:p>
+            <a:pPr lvl="1">
+              <a:defRPr/>
+            </a:pPr>
+            <a:r>
+              <a:rPr lang="en-US" dirty="0">
+                <a:latin typeface="Calibri" panose="020F0502020204030204" pitchFamily="34" charset="0"/>
+                <a:ea typeface="ＭＳ Ｐゴシック" charset="0"/>
+                <a:cs typeface="Calibri" panose="020F0502020204030204" pitchFamily="34" charset="0"/>
+              </a:rPr>
+              <a:t>lossless BGZF format</a:t>
+            </a:r>
+          </a:p>
+          <a:p>
+            <a:pPr>
+              <a:defRPr/>
+            </a:pPr>
+            <a:r>
+              <a:rPr lang="en-US" dirty="0">
+                <a:latin typeface="Calibri" panose="020F0502020204030204" pitchFamily="34" charset="0"/>
+                <a:cs typeface="Calibri" panose="020F0502020204030204" pitchFamily="34" charset="0"/>
+              </a:rPr>
+              <a:t>BAM files are usually ‘indexed’</a:t>
+            </a:r>
+          </a:p>
+          <a:p>
+            <a:pPr lvl="1">
+              <a:defRPr/>
+            </a:pPr>
+            <a:r>
+              <a:rPr lang="en-US" dirty="0">
+                <a:latin typeface="Calibri" panose="020F0502020204030204" pitchFamily="34" charset="0"/>
+                <a:cs typeface="Calibri" panose="020F0502020204030204" pitchFamily="34" charset="0"/>
+              </a:rPr>
+              <a:t>A ‘.bai’ file will be found beside the ‘.bam’ file </a:t>
+            </a:r>
+          </a:p>
+          <a:p>
+            <a:pPr lvl="1">
+              <a:defRPr/>
+            </a:pPr>
+            <a:r>
+              <a:rPr lang="en-US" dirty="0">
+                <a:latin typeface="Calibri" panose="020F0502020204030204" pitchFamily="34" charset="0"/>
+                <a:cs typeface="Calibri" panose="020F0502020204030204" pitchFamily="34" charset="0"/>
+              </a:rPr>
+              <a:t>Indexing provides fast retrieval of alignments overlapping a specified region without going through all alignments. </a:t>
+            </a:r>
+          </a:p>
+          <a:p>
+            <a:pPr lvl="1">
+              <a:defRPr/>
+            </a:pPr>
+            <a:r>
+              <a:rPr lang="en-US" dirty="0">
+                <a:latin typeface="Calibri" panose="020F0502020204030204" pitchFamily="34" charset="0"/>
+                <a:cs typeface="Calibri" panose="020F0502020204030204" pitchFamily="34" charset="0"/>
+              </a:rPr>
+              <a:t>BAM must be sorted by the reference ID and then the leftmost coordinate before indexing</a:t>
+            </a:r>
+          </a:p>
+        </p:txBody>
+      </p:sp>
+    </p:spTree>
+    <p:extLst>
+      <p:ext uri="{BB962C8B-B14F-4D97-AF65-F5344CB8AC3E}">
+        <p14:creationId xmlns:p14="http://schemas.microsoft.com/office/powerpoint/2010/main" val="3821907458"/>
+      </p:ext>
+    </p:extLst>
+  </p:cSld>
+  <p:clrMapOvr>
+    <a:masterClrMapping/>
+  </p:clrMapOvr>
+</p:sld>
+</file>
+
+<file path=ppt/slides/slide20.xml><?xml version="1.0" encoding="utf-8"?>
 <p:sld xmlns:a="http://schemas.openxmlformats.org/drawingml/2006/main" xmlns:r="http://schemas.openxmlformats.org/officeDocument/2006/relationships" xmlns:p="http://schemas.openxmlformats.org/presentationml/2006/main">
   <p:cSld>
     <p:spTree>
@@ -9476,7 +11327,7 @@
 </p:sld>
 </file>
 
-<file path=ppt/slides/slide17.xml><?xml version="1.0" encoding="utf-8"?>
+<file path=ppt/slides/slide21.xml><?xml version="1.0" encoding="utf-8"?>
 <p:sld xmlns:a="http://schemas.openxmlformats.org/drawingml/2006/main" xmlns:r="http://schemas.openxmlformats.org/officeDocument/2006/relationships" xmlns:p="http://schemas.openxmlformats.org/presentationml/2006/main">
   <p:cSld>
     <p:spTree>
@@ -9560,7 +11411,7 @@
 </p:sld>
 </file>
 
-<file path=ppt/slides/slide2.xml><?xml version="1.0" encoding="utf-8"?>
+<file path=ppt/slides/slide3.xml><?xml version="1.0" encoding="utf-8"?>
 <p:sld xmlns:a="http://schemas.openxmlformats.org/drawingml/2006/main" xmlns:r="http://schemas.openxmlformats.org/officeDocument/2006/relationships" xmlns:p="http://schemas.openxmlformats.org/presentationml/2006/main">
   <p:cSld>
     <p:spTree>
@@ -10017,212 +11868,7 @@
     </p:spTree>
     <p:extLst>
       <p:ext uri="{BB962C8B-B14F-4D97-AF65-F5344CB8AC3E}">
-        <p14:creationId xmlns:p14="http://schemas.microsoft.com/office/powerpoint/2010/main" val="125152649"/>
-      </p:ext>
-    </p:extLst>
-  </p:cSld>
-  <p:clrMapOvr>
-    <a:masterClrMapping/>
-  </p:clrMapOvr>
-</p:sld>
-</file>
-
-<file path=ppt/slides/slide3.xml><?xml version="1.0" encoding="utf-8"?>
-<p:sld xmlns:a="http://schemas.openxmlformats.org/drawingml/2006/main" xmlns:r="http://schemas.openxmlformats.org/officeDocument/2006/relationships" xmlns:p="http://schemas.openxmlformats.org/presentationml/2006/main">
-  <p:cSld>
-    <p:spTree>
-      <p:nvGrpSpPr>
-        <p:cNvPr id="1" name=""/>
-        <p:cNvGrpSpPr/>
-        <p:nvPr/>
-      </p:nvGrpSpPr>
-      <p:grpSpPr>
-        <a:xfrm>
-          <a:off x="0" y="0"/>
-          <a:ext cx="0" cy="0"/>
-          <a:chOff x="0" y="0"/>
-          <a:chExt cx="0" cy="0"/>
-        </a:xfrm>
-      </p:grpSpPr>
-      <p:sp>
-        <p:nvSpPr>
-          <p:cNvPr id="24577" name="Title 1"/>
-          <p:cNvSpPr>
-            <a:spLocks noGrp="1"/>
-          </p:cNvSpPr>
-          <p:nvPr>
-            <p:ph type="title"/>
-          </p:nvPr>
-        </p:nvSpPr>
-        <p:spPr>
-          <a:xfrm>
-            <a:off x="1676400" y="-26988"/>
-            <a:ext cx="8839200" cy="1143001"/>
-          </a:xfrm>
-        </p:spPr>
-        <p:txBody>
-          <a:bodyPr>
-            <a:normAutofit fontScale="90000"/>
-          </a:bodyPr>
-          <a:lstStyle/>
-          <a:p>
-            <a:pPr algn="ctr"/>
-            <a:r>
-              <a:rPr lang="en-US" b="1" dirty="0">
-                <a:latin typeface="Calibri" charset="0"/>
-                <a:ea typeface="ＭＳ Ｐゴシック" charset="0"/>
-              </a:rPr>
-              <a:t>Introduction to the SAM/BAM format</a:t>
-            </a:r>
-          </a:p>
-        </p:txBody>
-      </p:sp>
-      <p:sp>
-        <p:nvSpPr>
-          <p:cNvPr id="28674" name="Content Placeholder 2"/>
-          <p:cNvSpPr>
-            <a:spLocks noGrp="1"/>
-          </p:cNvSpPr>
-          <p:nvPr>
-            <p:ph idx="1"/>
-          </p:nvPr>
-        </p:nvSpPr>
-        <p:spPr>
-          <a:xfrm>
-            <a:off x="659567" y="1116013"/>
-            <a:ext cx="11002781" cy="5021262"/>
-          </a:xfrm>
-        </p:spPr>
-        <p:txBody>
-          <a:bodyPr>
-            <a:normAutofit/>
-          </a:bodyPr>
-          <a:lstStyle/>
-          <a:p>
-            <a:pPr>
-              <a:defRPr/>
-            </a:pPr>
-            <a:r>
-              <a:rPr lang="en-US" dirty="0">
-                <a:latin typeface="Calibri" panose="020F0502020204030204" pitchFamily="34" charset="0"/>
-                <a:ea typeface="ＭＳ Ｐゴシック" charset="0"/>
-                <a:cs typeface="Calibri" panose="020F0502020204030204" pitchFamily="34" charset="0"/>
-              </a:rPr>
-              <a:t>The specification</a:t>
-            </a:r>
-          </a:p>
-          <a:p>
-            <a:pPr lvl="1">
-              <a:defRPr/>
-            </a:pPr>
-            <a:r>
-              <a:rPr lang="en-US" dirty="0">
-                <a:latin typeface="Calibri" panose="020F0502020204030204" pitchFamily="34" charset="0"/>
-                <a:ea typeface="ＭＳ Ｐゴシック" charset="0"/>
-                <a:cs typeface="Calibri" panose="020F0502020204030204" pitchFamily="34" charset="0"/>
-                <a:hlinkClick r:id="rId2"/>
-              </a:rPr>
-              <a:t>http://samtools.sourceforge.net/SAM1.pdf</a:t>
-            </a:r>
-            <a:endParaRPr lang="en-US" dirty="0">
-              <a:latin typeface="Calibri" panose="020F0502020204030204" pitchFamily="34" charset="0"/>
-              <a:ea typeface="ＭＳ Ｐゴシック" charset="0"/>
-              <a:cs typeface="Calibri" panose="020F0502020204030204" pitchFamily="34" charset="0"/>
-            </a:endParaRPr>
-          </a:p>
-          <a:p>
-            <a:pPr>
-              <a:defRPr/>
-            </a:pPr>
-            <a:r>
-              <a:rPr lang="en-US" dirty="0">
-                <a:latin typeface="Calibri" panose="020F0502020204030204" pitchFamily="34" charset="0"/>
-                <a:ea typeface="ＭＳ Ｐゴシック" charset="0"/>
-                <a:cs typeface="Calibri" panose="020F0502020204030204" pitchFamily="34" charset="0"/>
-              </a:rPr>
-              <a:t>SAM is uncompressed text data</a:t>
-            </a:r>
-          </a:p>
-          <a:p>
-            <a:pPr>
-              <a:defRPr/>
-            </a:pPr>
-            <a:r>
-              <a:rPr lang="en-US" dirty="0">
-                <a:latin typeface="Calibri" panose="020F0502020204030204" pitchFamily="34" charset="0"/>
-                <a:ea typeface="ＭＳ Ｐゴシック" charset="0"/>
-                <a:cs typeface="Calibri" panose="020F0502020204030204" pitchFamily="34" charset="0"/>
-              </a:rPr>
-              <a:t>BAM is a compressed version of SAM</a:t>
-            </a:r>
-          </a:p>
-          <a:p>
-            <a:pPr lvl="1">
-              <a:defRPr/>
-            </a:pPr>
-            <a:r>
-              <a:rPr lang="en-US" dirty="0">
-                <a:latin typeface="Calibri" panose="020F0502020204030204" pitchFamily="34" charset="0"/>
-                <a:ea typeface="ＭＳ Ｐゴシック" charset="0"/>
-                <a:cs typeface="Calibri" panose="020F0502020204030204" pitchFamily="34" charset="0"/>
-              </a:rPr>
-              <a:t>lossless BGZF format</a:t>
-            </a:r>
-          </a:p>
-          <a:p>
-            <a:pPr>
-              <a:defRPr/>
-            </a:pPr>
-            <a:r>
-              <a:rPr lang="en-US" dirty="0">
-                <a:latin typeface="Calibri" panose="020F0502020204030204" pitchFamily="34" charset="0"/>
-                <a:cs typeface="Calibri" panose="020F0502020204030204" pitchFamily="34" charset="0"/>
-              </a:rPr>
-              <a:t>BAM files are usually ‘indexed’</a:t>
-            </a:r>
-          </a:p>
-          <a:p>
-            <a:pPr lvl="1">
-              <a:defRPr/>
-            </a:pPr>
-            <a:r>
-              <a:rPr lang="en-US" dirty="0">
-                <a:latin typeface="Calibri" panose="020F0502020204030204" pitchFamily="34" charset="0"/>
-                <a:cs typeface="Calibri" panose="020F0502020204030204" pitchFamily="34" charset="0"/>
-              </a:rPr>
-              <a:t>A ‘.bai’ file will be found beside the ‘.bam’ file </a:t>
-            </a:r>
-          </a:p>
-          <a:p>
-            <a:pPr lvl="1">
-              <a:defRPr/>
-            </a:pPr>
-            <a:r>
-              <a:rPr lang="en-US" dirty="0">
-                <a:latin typeface="Calibri" panose="020F0502020204030204" pitchFamily="34" charset="0"/>
-                <a:cs typeface="Calibri" panose="020F0502020204030204" pitchFamily="34" charset="0"/>
-              </a:rPr>
-              <a:t>Indexing provides fast retrieval of alignments overlapping a specified region without going through all alignments. </a:t>
-            </a:r>
-          </a:p>
-          <a:p>
-            <a:pPr lvl="1">
-              <a:defRPr/>
-            </a:pPr>
-            <a:r>
-              <a:rPr lang="en-US" dirty="0">
-                <a:latin typeface="Calibri" panose="020F0502020204030204" pitchFamily="34" charset="0"/>
-                <a:cs typeface="Calibri" panose="020F0502020204030204" pitchFamily="34" charset="0"/>
-              </a:rPr>
-              <a:t>BAM must be sorted by the reference ID and then the leftmost coordinate before indexing</a:t>
-            </a:r>
-          </a:p>
-        </p:txBody>
-      </p:sp>
-    </p:spTree>
-    <p:extLst>
-      <p:ext uri="{BB962C8B-B14F-4D97-AF65-F5344CB8AC3E}">
-        <p14:creationId xmlns:p14="http://schemas.microsoft.com/office/powerpoint/2010/main" val="3821907458"/>
+        <p14:creationId xmlns:p14="http://schemas.microsoft.com/office/powerpoint/2010/main" val="2968155359"/>
       </p:ext>
     </p:extLst>
   </p:cSld>
@@ -10943,6 +12589,1026 @@
           <a:chExt cx="0" cy="0"/>
         </a:xfrm>
       </p:grpSpPr>
+      <p:pic>
+        <p:nvPicPr>
+          <p:cNvPr id="5" name="Picture 4" descr="BAM File Example Header Section.png">
+            <a:extLst>
+              <a:ext uri="{FF2B5EF4-FFF2-40B4-BE49-F238E27FC236}">
+                <a16:creationId xmlns:a16="http://schemas.microsoft.com/office/drawing/2014/main" id="{1E18477F-246E-B140-AD68-75D89EF9802A}"/>
+              </a:ext>
+            </a:extLst>
+          </p:cNvPr>
+          <p:cNvPicPr>
+            <a:picLocks noChangeAspect="1"/>
+          </p:cNvPicPr>
+          <p:nvPr/>
+        </p:nvPicPr>
+        <p:blipFill>
+          <a:blip r:embed="rId2">
+            <a:extLst>
+              <a:ext uri="{28A0092B-C50C-407E-A947-70E740481C1C}">
+                <a14:useLocalDpi xmlns:a14="http://schemas.microsoft.com/office/drawing/2010/main" val="0"/>
+              </a:ext>
+            </a:extLst>
+          </a:blip>
+          <a:srcRect/>
+          <a:stretch>
+            <a:fillRect/>
+          </a:stretch>
+        </p:blipFill>
+        <p:spPr bwMode="auto">
+          <a:xfrm>
+            <a:off x="55780" y="1415302"/>
+            <a:ext cx="11277600" cy="2252546"/>
+          </a:xfrm>
+          <a:prstGeom prst="rect">
+            <a:avLst/>
+          </a:prstGeom>
+          <a:noFill/>
+          <a:ln>
+            <a:noFill/>
+          </a:ln>
+          <a:extLst>
+            <a:ext uri="{909E8E84-426E-40dd-AFC4-6F175D3DCCD1}">
+              <a14:hiddenFill xmlns="" xmlns:a14="http://schemas.microsoft.com/office/drawing/2010/main">
+                <a:solidFill>
+                  <a:srgbClr val="FFFFFF"/>
+                </a:solidFill>
+              </a14:hiddenFill>
+            </a:ext>
+            <a:ext uri="{91240B29-F687-4f45-9708-019B960494DF}">
+              <a14:hiddenLine xmlns="" xmlns:a14="http://schemas.microsoft.com/office/drawing/2010/main" w="9525">
+                <a:solidFill>
+                  <a:srgbClr val="000000"/>
+                </a:solidFill>
+                <a:miter lim="800000"/>
+                <a:headEnd/>
+                <a:tailEnd/>
+              </a14:hiddenLine>
+            </a:ext>
+          </a:extLst>
+        </p:spPr>
+      </p:pic>
+      <p:sp>
+        <p:nvSpPr>
+          <p:cNvPr id="6" name="Title 1">
+            <a:extLst>
+              <a:ext uri="{FF2B5EF4-FFF2-40B4-BE49-F238E27FC236}">
+                <a16:creationId xmlns:a16="http://schemas.microsoft.com/office/drawing/2014/main" id="{3CF0B8FA-F35E-CB47-A451-66A311B3085A}"/>
+              </a:ext>
+            </a:extLst>
+          </p:cNvPr>
+          <p:cNvSpPr>
+            <a:spLocks noGrp="1"/>
+          </p:cNvSpPr>
+          <p:nvPr>
+            <p:ph type="title"/>
+          </p:nvPr>
+        </p:nvSpPr>
+        <p:spPr>
+          <a:xfrm>
+            <a:off x="203200" y="177801"/>
+            <a:ext cx="11277600" cy="609601"/>
+          </a:xfrm>
+        </p:spPr>
+        <p:txBody>
+          <a:bodyPr>
+            <a:normAutofit fontScale="90000"/>
+          </a:bodyPr>
+          <a:lstStyle/>
+          <a:p>
+            <a:r>
+              <a:rPr lang="en-US" dirty="0">
+                <a:latin typeface="Calibri" charset="0"/>
+                <a:ea typeface="ＭＳ Ｐゴシック" charset="0"/>
+              </a:rPr>
+              <a:t>A BAM file is divided in header and alignment sections</a:t>
+            </a:r>
+          </a:p>
+        </p:txBody>
+      </p:sp>
+      <p:sp>
+        <p:nvSpPr>
+          <p:cNvPr id="7" name="TextBox 5">
+            <a:extLst>
+              <a:ext uri="{FF2B5EF4-FFF2-40B4-BE49-F238E27FC236}">
+                <a16:creationId xmlns:a16="http://schemas.microsoft.com/office/drawing/2014/main" id="{3A4E477C-F7F5-4740-B274-9A10E9939DB5}"/>
+              </a:ext>
+            </a:extLst>
+          </p:cNvPr>
+          <p:cNvSpPr txBox="1">
+            <a:spLocks noChangeArrowheads="1"/>
+          </p:cNvSpPr>
+          <p:nvPr/>
+        </p:nvSpPr>
+        <p:spPr bwMode="auto">
+          <a:xfrm>
+            <a:off x="203201" y="889000"/>
+            <a:ext cx="10423951" cy="584775"/>
+          </a:xfrm>
+          <a:prstGeom prst="rect">
+            <a:avLst/>
+          </a:prstGeom>
+          <a:noFill/>
+          <a:ln>
+            <a:noFill/>
+          </a:ln>
+          <a:extLst>
+            <a:ext uri="{909E8E84-426E-40dd-AFC4-6F175D3DCCD1}">
+              <a14:hiddenFill xmlns="" xmlns:a14="http://schemas.microsoft.com/office/drawing/2010/main">
+                <a:solidFill>
+                  <a:srgbClr val="FFFFFF"/>
+                </a:solidFill>
+              </a14:hiddenFill>
+            </a:ext>
+            <a:ext uri="{91240B29-F687-4f45-9708-019B960494DF}">
+              <a14:hiddenLine xmlns="" xmlns:a14="http://schemas.microsoft.com/office/drawing/2010/main" w="9525">
+                <a:solidFill>
+                  <a:srgbClr val="000000"/>
+                </a:solidFill>
+                <a:miter lim="800000"/>
+                <a:headEnd/>
+                <a:tailEnd/>
+              </a14:hiddenLine>
+            </a:ext>
+          </a:extLst>
+        </p:spPr>
+        <p:txBody>
+          <a:bodyPr wrap="square">
+            <a:spAutoFit/>
+          </a:bodyPr>
+          <a:lstStyle>
+            <a:lvl1pPr eaLnBrk="0" hangingPunct="0">
+              <a:defRPr sz="2400">
+                <a:solidFill>
+                  <a:schemeClr val="tx1"/>
+                </a:solidFill>
+                <a:latin typeface="Arial" charset="0"/>
+                <a:ea typeface="ＭＳ Ｐゴシック" charset="0"/>
+                <a:cs typeface="ＭＳ Ｐゴシック" charset="0"/>
+              </a:defRPr>
+            </a:lvl1pPr>
+            <a:lvl2pPr marL="742950" indent="-285750" eaLnBrk="0" hangingPunct="0">
+              <a:defRPr sz="2400">
+                <a:solidFill>
+                  <a:schemeClr val="tx1"/>
+                </a:solidFill>
+                <a:latin typeface="Arial" charset="0"/>
+                <a:ea typeface="ＭＳ Ｐゴシック" charset="0"/>
+              </a:defRPr>
+            </a:lvl2pPr>
+            <a:lvl3pPr marL="1143000" indent="-228600" eaLnBrk="0" hangingPunct="0">
+              <a:defRPr sz="2400">
+                <a:solidFill>
+                  <a:schemeClr val="tx1"/>
+                </a:solidFill>
+                <a:latin typeface="Arial" charset="0"/>
+                <a:ea typeface="ＭＳ Ｐゴシック" charset="0"/>
+              </a:defRPr>
+            </a:lvl3pPr>
+            <a:lvl4pPr marL="1600200" indent="-228600" eaLnBrk="0" hangingPunct="0">
+              <a:defRPr sz="2400">
+                <a:solidFill>
+                  <a:schemeClr val="tx1"/>
+                </a:solidFill>
+                <a:latin typeface="Arial" charset="0"/>
+                <a:ea typeface="ＭＳ Ｐゴシック" charset="0"/>
+              </a:defRPr>
+            </a:lvl4pPr>
+            <a:lvl5pPr marL="2057400" indent="-228600" eaLnBrk="0" hangingPunct="0">
+              <a:defRPr sz="2400">
+                <a:solidFill>
+                  <a:schemeClr val="tx1"/>
+                </a:solidFill>
+                <a:latin typeface="Arial" charset="0"/>
+                <a:ea typeface="ＭＳ Ｐゴシック" charset="0"/>
+              </a:defRPr>
+            </a:lvl5pPr>
+            <a:lvl6pPr marL="2514600" indent="-228600" eaLnBrk="0" fontAlgn="base" hangingPunct="0">
+              <a:spcBef>
+                <a:spcPct val="0"/>
+              </a:spcBef>
+              <a:spcAft>
+                <a:spcPct val="0"/>
+              </a:spcAft>
+              <a:defRPr sz="2400">
+                <a:solidFill>
+                  <a:schemeClr val="tx1"/>
+                </a:solidFill>
+                <a:latin typeface="Arial" charset="0"/>
+                <a:ea typeface="ＭＳ Ｐゴシック" charset="0"/>
+              </a:defRPr>
+            </a:lvl6pPr>
+            <a:lvl7pPr marL="2971800" indent="-228600" eaLnBrk="0" fontAlgn="base" hangingPunct="0">
+              <a:spcBef>
+                <a:spcPct val="0"/>
+              </a:spcBef>
+              <a:spcAft>
+                <a:spcPct val="0"/>
+              </a:spcAft>
+              <a:defRPr sz="2400">
+                <a:solidFill>
+                  <a:schemeClr val="tx1"/>
+                </a:solidFill>
+                <a:latin typeface="Arial" charset="0"/>
+                <a:ea typeface="ＭＳ Ｐゴシック" charset="0"/>
+              </a:defRPr>
+            </a:lvl7pPr>
+            <a:lvl8pPr marL="3429000" indent="-228600" eaLnBrk="0" fontAlgn="base" hangingPunct="0">
+              <a:spcBef>
+                <a:spcPct val="0"/>
+              </a:spcBef>
+              <a:spcAft>
+                <a:spcPct val="0"/>
+              </a:spcAft>
+              <a:defRPr sz="2400">
+                <a:solidFill>
+                  <a:schemeClr val="tx1"/>
+                </a:solidFill>
+                <a:latin typeface="Arial" charset="0"/>
+                <a:ea typeface="ＭＳ Ｐゴシック" charset="0"/>
+              </a:defRPr>
+            </a:lvl8pPr>
+            <a:lvl9pPr marL="3886200" indent="-228600" eaLnBrk="0" fontAlgn="base" hangingPunct="0">
+              <a:spcBef>
+                <a:spcPct val="0"/>
+              </a:spcBef>
+              <a:spcAft>
+                <a:spcPct val="0"/>
+              </a:spcAft>
+              <a:defRPr sz="2400">
+                <a:solidFill>
+                  <a:schemeClr val="tx1"/>
+                </a:solidFill>
+                <a:latin typeface="Arial" charset="0"/>
+                <a:ea typeface="ＭＳ Ｐゴシック" charset="0"/>
+              </a:defRPr>
+            </a:lvl9pPr>
+          </a:lstStyle>
+          <a:p>
+            <a:pPr eaLnBrk="1" hangingPunct="1"/>
+            <a:r>
+              <a:rPr lang="en-US" sz="3200" dirty="0"/>
+              <a:t>Example SAM/BAM header section (abbreviated)</a:t>
+            </a:r>
+          </a:p>
+        </p:txBody>
+      </p:sp>
+      <p:sp>
+        <p:nvSpPr>
+          <p:cNvPr id="9" name="TextBox 8">
+            <a:extLst>
+              <a:ext uri="{FF2B5EF4-FFF2-40B4-BE49-F238E27FC236}">
+                <a16:creationId xmlns:a16="http://schemas.microsoft.com/office/drawing/2014/main" id="{2523D4D9-CD6C-5E46-B51E-D8E69CB73B6C}"/>
+              </a:ext>
+            </a:extLst>
+          </p:cNvPr>
+          <p:cNvSpPr txBox="1"/>
+          <p:nvPr/>
+        </p:nvSpPr>
+        <p:spPr>
+          <a:xfrm>
+            <a:off x="-101600" y="6532803"/>
+            <a:ext cx="5994400" cy="318100"/>
+          </a:xfrm>
+          <a:prstGeom prst="rect">
+            <a:avLst/>
+          </a:prstGeom>
+          <a:noFill/>
+        </p:spPr>
+        <p:txBody>
+          <a:bodyPr wrap="square" rtlCol="0">
+            <a:spAutoFit/>
+          </a:bodyPr>
+          <a:lstStyle/>
+          <a:p>
+            <a:r>
+              <a:rPr lang="en-US" sz="1467" dirty="0"/>
+              <a:t>Slide courtesy of Obi and Malachi Griffith</a:t>
+            </a:r>
+          </a:p>
+        </p:txBody>
+      </p:sp>
+      <p:grpSp>
+        <p:nvGrpSpPr>
+          <p:cNvPr id="10" name="Group 9">
+            <a:extLst>
+              <a:ext uri="{FF2B5EF4-FFF2-40B4-BE49-F238E27FC236}">
+                <a16:creationId xmlns:a16="http://schemas.microsoft.com/office/drawing/2014/main" id="{0A0180E5-BFA4-7847-B0BC-BC1A929080C0}"/>
+              </a:ext>
+            </a:extLst>
+          </p:cNvPr>
+          <p:cNvGrpSpPr/>
+          <p:nvPr/>
+        </p:nvGrpSpPr>
+        <p:grpSpPr>
+          <a:xfrm>
+            <a:off x="1460339" y="3429000"/>
+            <a:ext cx="9072623" cy="2998319"/>
+            <a:chOff x="152400" y="1284501"/>
+            <a:chExt cx="7565657" cy="2211072"/>
+          </a:xfrm>
+        </p:grpSpPr>
+        <p:sp>
+          <p:nvSpPr>
+            <p:cNvPr id="11" name="Version (VN) and sort order (SO) - Important!">
+              <a:extLst>
+                <a:ext uri="{FF2B5EF4-FFF2-40B4-BE49-F238E27FC236}">
+                  <a16:creationId xmlns:a16="http://schemas.microsoft.com/office/drawing/2014/main" id="{73B184CA-CB4F-D342-AEF7-59DA5DB16614}"/>
+                </a:ext>
+              </a:extLst>
+            </p:cNvPr>
+            <p:cNvSpPr txBox="1"/>
+            <p:nvPr/>
+          </p:nvSpPr>
+          <p:spPr>
+            <a:xfrm>
+              <a:off x="1131049" y="1284501"/>
+              <a:ext cx="2069351" cy="411122"/>
+            </a:xfrm>
+            <a:prstGeom prst="rect">
+              <a:avLst/>
+            </a:prstGeom>
+            <a:ln w="12700">
+              <a:miter lim="400000"/>
+            </a:ln>
+            <a:extLst>
+              <a:ext uri="{C572A759-6A51-4108-AA02-DFA0A04FC94B}">
+                <ma14:wrappingTextBoxFlag xmlns="" xmlns:m="http://schemas.openxmlformats.org/officeDocument/2006/math" xmlns:a14="http://schemas.microsoft.com/office/drawing/2010/main" xmlns:ma14="http://schemas.microsoft.com/office/mac/drawingml/2011/main" val="1"/>
+              </a:ext>
+            </a:extLst>
+          </p:spPr>
+          <p:txBody>
+            <a:bodyPr wrap="square" lIns="26789" tIns="26789" rIns="26789" bIns="26789" anchor="ctr">
+              <a:spAutoFit/>
+            </a:bodyPr>
+            <a:lstStyle>
+              <a:lvl1pPr algn="l">
+                <a:defRPr sz="2200"/>
+              </a:lvl1pPr>
+            </a:lstStyle>
+            <a:p>
+              <a:r>
+                <a:rPr sz="1160" dirty="0"/>
+                <a:t>Version (VN) and sort order (SO) - Important!</a:t>
+              </a:r>
+            </a:p>
+          </p:txBody>
+        </p:sp>
+        <p:pic>
+          <p:nvPicPr>
+            <p:cNvPr id="12" name="Screen Shot 2014-11-15 at 7.40.05 AM.png" descr="Screen Shot 2014-11-15 at 7.40.05 AM.png">
+              <a:extLst>
+                <a:ext uri="{FF2B5EF4-FFF2-40B4-BE49-F238E27FC236}">
+                  <a16:creationId xmlns:a16="http://schemas.microsoft.com/office/drawing/2014/main" id="{6D780573-219E-6345-BB0A-B862E7C9AB02}"/>
+                </a:ext>
+              </a:extLst>
+            </p:cNvPr>
+            <p:cNvPicPr>
+              <a:picLocks noChangeAspect="1"/>
+            </p:cNvPicPr>
+            <p:nvPr/>
+          </p:nvPicPr>
+          <p:blipFill>
+            <a:blip r:embed="rId3"/>
+            <a:stretch>
+              <a:fillRect/>
+            </a:stretch>
+          </p:blipFill>
+          <p:spPr>
+            <a:xfrm>
+              <a:off x="152400" y="1943521"/>
+              <a:ext cx="7565657" cy="606531"/>
+            </a:xfrm>
+            <a:prstGeom prst="rect">
+              <a:avLst/>
+            </a:prstGeom>
+            <a:ln w="12700">
+              <a:miter lim="400000"/>
+            </a:ln>
+          </p:spPr>
+        </p:pic>
+        <p:sp>
+          <p:nvSpPr>
+            <p:cNvPr id="13" name="Line">
+              <a:extLst>
+                <a:ext uri="{FF2B5EF4-FFF2-40B4-BE49-F238E27FC236}">
+                  <a16:creationId xmlns:a16="http://schemas.microsoft.com/office/drawing/2014/main" id="{C414E3DC-B103-1F4F-A762-98D884448C24}"/>
+                </a:ext>
+              </a:extLst>
+            </p:cNvPr>
+            <p:cNvSpPr/>
+            <p:nvPr/>
+          </p:nvSpPr>
+          <p:spPr>
+            <a:xfrm flipH="1">
+              <a:off x="838200" y="1462463"/>
+              <a:ext cx="241493" cy="466321"/>
+            </a:xfrm>
+            <a:prstGeom prst="line">
+              <a:avLst/>
+            </a:prstGeom>
+            <a:ln w="25400">
+              <a:solidFill>
+                <a:srgbClr val="A6AAA9"/>
+              </a:solidFill>
+              <a:miter lim="400000"/>
+              <a:tailEnd type="triangle"/>
+            </a:ln>
+          </p:spPr>
+          <p:txBody>
+            <a:bodyPr lIns="26789" tIns="26789" rIns="26789" bIns="26789" anchor="ctr"/>
+            <a:lstStyle/>
+            <a:p>
+              <a:pPr>
+                <a:defRPr sz="2400"/>
+              </a:pPr>
+              <a:endParaRPr sz="1266"/>
+            </a:p>
+          </p:txBody>
+        </p:sp>
+        <p:sp>
+          <p:nvSpPr>
+            <p:cNvPr id="14" name="Reference sequence (SQ)…">
+              <a:extLst>
+                <a:ext uri="{FF2B5EF4-FFF2-40B4-BE49-F238E27FC236}">
+                  <a16:creationId xmlns:a16="http://schemas.microsoft.com/office/drawing/2014/main" id="{8B73CB10-31DA-474E-B010-149ECFCDC2E1}"/>
+                </a:ext>
+              </a:extLst>
+            </p:cNvPr>
+            <p:cNvSpPr txBox="1"/>
+            <p:nvPr/>
+          </p:nvSpPr>
+          <p:spPr>
+            <a:xfrm>
+              <a:off x="5633477" y="1439387"/>
+              <a:ext cx="1842746" cy="411122"/>
+            </a:xfrm>
+            <a:prstGeom prst="rect">
+              <a:avLst/>
+            </a:prstGeom>
+            <a:ln w="12700">
+              <a:miter lim="400000"/>
+            </a:ln>
+            <a:extLst>
+              <a:ext uri="{C572A759-6A51-4108-AA02-DFA0A04FC94B}">
+                <ma14:wrappingTextBoxFlag xmlns="" xmlns:m="http://schemas.openxmlformats.org/officeDocument/2006/math" xmlns:a14="http://schemas.microsoft.com/office/drawing/2010/main" xmlns:ma14="http://schemas.microsoft.com/office/mac/drawingml/2011/main" val="1"/>
+              </a:ext>
+            </a:extLst>
+          </p:spPr>
+          <p:txBody>
+            <a:bodyPr lIns="26789" tIns="26789" rIns="26789" bIns="26789" anchor="ctr">
+              <a:spAutoFit/>
+            </a:bodyPr>
+            <a:lstStyle/>
+            <a:p>
+              <a:pPr algn="l">
+                <a:defRPr sz="2200"/>
+              </a:pPr>
+              <a:r>
+                <a:rPr sz="1160" dirty="0"/>
+                <a:t>Reference sequence (SQ)</a:t>
+              </a:r>
+            </a:p>
+            <a:p>
+              <a:pPr algn="l">
+                <a:defRPr sz="2200"/>
+              </a:pPr>
+              <a:r>
+                <a:rPr sz="1160" dirty="0"/>
+                <a:t>and sequence length (LN)</a:t>
+              </a:r>
+            </a:p>
+          </p:txBody>
+        </p:sp>
+        <p:sp>
+          <p:nvSpPr>
+            <p:cNvPr id="15" name="Line">
+              <a:extLst>
+                <a:ext uri="{FF2B5EF4-FFF2-40B4-BE49-F238E27FC236}">
+                  <a16:creationId xmlns:a16="http://schemas.microsoft.com/office/drawing/2014/main" id="{1BEB538D-60ED-8243-ACFC-A86F2AB5EB0C}"/>
+                </a:ext>
+              </a:extLst>
+            </p:cNvPr>
+            <p:cNvSpPr/>
+            <p:nvPr/>
+          </p:nvSpPr>
+          <p:spPr>
+            <a:xfrm flipH="1">
+              <a:off x="2201111" y="1692875"/>
+              <a:ext cx="3432366" cy="447726"/>
+            </a:xfrm>
+            <a:prstGeom prst="line">
+              <a:avLst/>
+            </a:prstGeom>
+            <a:ln w="25400">
+              <a:solidFill>
+                <a:srgbClr val="A6AAA9"/>
+              </a:solidFill>
+              <a:miter lim="400000"/>
+              <a:tailEnd type="triangle"/>
+            </a:ln>
+          </p:spPr>
+          <p:txBody>
+            <a:bodyPr lIns="26789" tIns="26789" rIns="26789" bIns="26789" anchor="ctr"/>
+            <a:lstStyle/>
+            <a:p>
+              <a:pPr>
+                <a:defRPr sz="2400"/>
+              </a:pPr>
+              <a:endParaRPr sz="1266"/>
+            </a:p>
+          </p:txBody>
+        </p:sp>
+        <p:sp>
+          <p:nvSpPr>
+            <p:cNvPr id="16" name="Read group (RG) and sample (SM)">
+              <a:extLst>
+                <a:ext uri="{FF2B5EF4-FFF2-40B4-BE49-F238E27FC236}">
+                  <a16:creationId xmlns:a16="http://schemas.microsoft.com/office/drawing/2014/main" id="{AA75B9C7-6354-7E49-9234-BA2E8A0761DB}"/>
+                </a:ext>
+              </a:extLst>
+            </p:cNvPr>
+            <p:cNvSpPr txBox="1"/>
+            <p:nvPr/>
+          </p:nvSpPr>
+          <p:spPr>
+            <a:xfrm>
+              <a:off x="378072" y="3021308"/>
+              <a:ext cx="1898917" cy="411122"/>
+            </a:xfrm>
+            <a:prstGeom prst="rect">
+              <a:avLst/>
+            </a:prstGeom>
+            <a:ln w="12700">
+              <a:miter lim="400000"/>
+            </a:ln>
+            <a:extLst>
+              <a:ext uri="{C572A759-6A51-4108-AA02-DFA0A04FC94B}">
+                <ma14:wrappingTextBoxFlag xmlns="" xmlns:m="http://schemas.openxmlformats.org/officeDocument/2006/math" xmlns:a14="http://schemas.microsoft.com/office/drawing/2010/main" xmlns:ma14="http://schemas.microsoft.com/office/mac/drawingml/2011/main" val="1"/>
+              </a:ext>
+            </a:extLst>
+          </p:spPr>
+          <p:txBody>
+            <a:bodyPr lIns="26789" tIns="26789" rIns="26789" bIns="26789" anchor="ctr">
+              <a:spAutoFit/>
+            </a:bodyPr>
+            <a:lstStyle>
+              <a:lvl1pPr algn="l">
+                <a:defRPr sz="2200"/>
+              </a:lvl1pPr>
+            </a:lstStyle>
+            <a:p>
+              <a:r>
+                <a:rPr sz="1160" dirty="0"/>
+                <a:t>Read group (RG) and sample (SM)</a:t>
+              </a:r>
+            </a:p>
+          </p:txBody>
+        </p:sp>
+        <p:sp>
+          <p:nvSpPr>
+            <p:cNvPr id="17" name="Line">
+              <a:extLst>
+                <a:ext uri="{FF2B5EF4-FFF2-40B4-BE49-F238E27FC236}">
+                  <a16:creationId xmlns:a16="http://schemas.microsoft.com/office/drawing/2014/main" id="{2BCEDE19-D179-0044-A0F6-775571DD4E8C}"/>
+                </a:ext>
+              </a:extLst>
+            </p:cNvPr>
+            <p:cNvSpPr/>
+            <p:nvPr/>
+          </p:nvSpPr>
+          <p:spPr>
+            <a:xfrm flipH="1" flipV="1">
+              <a:off x="453834" y="2338438"/>
+              <a:ext cx="588478" cy="699075"/>
+            </a:xfrm>
+            <a:prstGeom prst="line">
+              <a:avLst/>
+            </a:prstGeom>
+            <a:ln w="25400">
+              <a:solidFill>
+                <a:srgbClr val="A6AAA9"/>
+              </a:solidFill>
+              <a:miter lim="400000"/>
+              <a:tailEnd type="triangle"/>
+            </a:ln>
+          </p:spPr>
+          <p:txBody>
+            <a:bodyPr lIns="26789" tIns="26789" rIns="26789" bIns="26789" anchor="ctr"/>
+            <a:lstStyle/>
+            <a:p>
+              <a:pPr>
+                <a:defRPr sz="2400"/>
+              </a:pPr>
+              <a:endParaRPr sz="1266"/>
+            </a:p>
+          </p:txBody>
+        </p:sp>
+        <p:sp>
+          <p:nvSpPr>
+            <p:cNvPr id="18" name="Programs (PG) that have been run on the data">
+              <a:extLst>
+                <a:ext uri="{FF2B5EF4-FFF2-40B4-BE49-F238E27FC236}">
+                  <a16:creationId xmlns:a16="http://schemas.microsoft.com/office/drawing/2014/main" id="{B98B5F03-B792-8640-99DA-57E3C66765C8}"/>
+                </a:ext>
+              </a:extLst>
+            </p:cNvPr>
+            <p:cNvSpPr txBox="1"/>
+            <p:nvPr/>
+          </p:nvSpPr>
+          <p:spPr>
+            <a:xfrm>
+              <a:off x="2553434" y="3084451"/>
+              <a:ext cx="1898918" cy="411122"/>
+            </a:xfrm>
+            <a:prstGeom prst="rect">
+              <a:avLst/>
+            </a:prstGeom>
+            <a:ln w="12700">
+              <a:miter lim="400000"/>
+            </a:ln>
+            <a:extLst>
+              <a:ext uri="{C572A759-6A51-4108-AA02-DFA0A04FC94B}">
+                <ma14:wrappingTextBoxFlag xmlns="" xmlns:m="http://schemas.openxmlformats.org/officeDocument/2006/math" xmlns:a14="http://schemas.microsoft.com/office/drawing/2010/main" xmlns:ma14="http://schemas.microsoft.com/office/mac/drawingml/2011/main" val="1"/>
+              </a:ext>
+            </a:extLst>
+          </p:spPr>
+          <p:txBody>
+            <a:bodyPr lIns="26789" tIns="26789" rIns="26789" bIns="26789" anchor="ctr">
+              <a:spAutoFit/>
+            </a:bodyPr>
+            <a:lstStyle>
+              <a:lvl1pPr algn="l">
+                <a:defRPr sz="2200"/>
+              </a:lvl1pPr>
+            </a:lstStyle>
+            <a:p>
+              <a:r>
+                <a:rPr sz="1160" dirty="0"/>
+                <a:t>Programs (PG) that have been run on the data</a:t>
+              </a:r>
+            </a:p>
+          </p:txBody>
+        </p:sp>
+        <p:sp>
+          <p:nvSpPr>
+            <p:cNvPr id="19" name="Line">
+              <a:extLst>
+                <a:ext uri="{FF2B5EF4-FFF2-40B4-BE49-F238E27FC236}">
+                  <a16:creationId xmlns:a16="http://schemas.microsoft.com/office/drawing/2014/main" id="{E61CFEFC-3905-8048-9066-7FC7A40CE998}"/>
+                </a:ext>
+              </a:extLst>
+            </p:cNvPr>
+            <p:cNvSpPr/>
+            <p:nvPr/>
+          </p:nvSpPr>
+          <p:spPr>
+            <a:xfrm flipH="1" flipV="1">
+              <a:off x="2053297" y="2576330"/>
+              <a:ext cx="1000274" cy="461183"/>
+            </a:xfrm>
+            <a:prstGeom prst="line">
+              <a:avLst/>
+            </a:prstGeom>
+            <a:ln w="25400">
+              <a:solidFill>
+                <a:srgbClr val="A6AAA9"/>
+              </a:solidFill>
+              <a:miter lim="400000"/>
+              <a:tailEnd type="triangle"/>
+            </a:ln>
+          </p:spPr>
+          <p:txBody>
+            <a:bodyPr lIns="26789" tIns="26789" rIns="26789" bIns="26789" anchor="ctr"/>
+            <a:lstStyle/>
+            <a:p>
+              <a:pPr>
+                <a:defRPr sz="2400"/>
+              </a:pPr>
+              <a:endParaRPr sz="1266"/>
+            </a:p>
+          </p:txBody>
+        </p:sp>
+      </p:grpSp>
+    </p:spTree>
+    <p:extLst>
+      <p:ext uri="{BB962C8B-B14F-4D97-AF65-F5344CB8AC3E}">
+        <p14:creationId xmlns:p14="http://schemas.microsoft.com/office/powerpoint/2010/main" val="3102077046"/>
+      </p:ext>
+    </p:extLst>
+  </p:cSld>
+  <p:clrMapOvr>
+    <a:masterClrMapping/>
+  </p:clrMapOvr>
+</p:sld>
+</file>
+
+<file path=ppt/slides/slide6.xml><?xml version="1.0" encoding="utf-8"?>
+<p:sld xmlns:a="http://schemas.openxmlformats.org/drawingml/2006/main" xmlns:r="http://schemas.openxmlformats.org/officeDocument/2006/relationships" xmlns:p="http://schemas.openxmlformats.org/presentationml/2006/main">
+  <p:cSld>
+    <p:spTree>
+      <p:nvGrpSpPr>
+        <p:cNvPr id="1" name=""/>
+        <p:cNvGrpSpPr/>
+        <p:nvPr/>
+      </p:nvGrpSpPr>
+      <p:grpSpPr>
+        <a:xfrm>
+          <a:off x="0" y="0"/>
+          <a:ext cx="0" cy="0"/>
+          <a:chOff x="0" y="0"/>
+          <a:chExt cx="0" cy="0"/>
+        </a:xfrm>
+      </p:grpSpPr>
+      <p:sp>
+        <p:nvSpPr>
+          <p:cNvPr id="23553" name="Title 1"/>
+          <p:cNvSpPr>
+            <a:spLocks noGrp="1"/>
+          </p:cNvSpPr>
+          <p:nvPr>
+            <p:ph type="title"/>
+          </p:nvPr>
+        </p:nvSpPr>
+        <p:spPr>
+          <a:xfrm>
+            <a:off x="203200" y="94721"/>
+            <a:ext cx="10287000" cy="814388"/>
+          </a:xfrm>
+        </p:spPr>
+        <p:txBody>
+          <a:bodyPr>
+            <a:normAutofit fontScale="90000"/>
+          </a:bodyPr>
+          <a:lstStyle/>
+          <a:p>
+            <a:r>
+              <a:rPr lang="en-US" dirty="0">
+                <a:latin typeface="Calibri" charset="0"/>
+                <a:ea typeface="ＭＳ Ｐゴシック" charset="0"/>
+              </a:rPr>
+              <a:t>A BAM file is divided in header and alignment sections</a:t>
+            </a:r>
+          </a:p>
+        </p:txBody>
+      </p:sp>
+      <p:pic>
+        <p:nvPicPr>
+          <p:cNvPr id="23554" name="Content Placeholder 3" descr="BAM File Example Alignment Section.png"/>
+          <p:cNvPicPr>
+            <a:picLocks noGrp="1" noChangeAspect="1"/>
+          </p:cNvPicPr>
+          <p:nvPr>
+            <p:ph idx="1"/>
+          </p:nvPr>
+        </p:nvPicPr>
+        <p:blipFill>
+          <a:blip r:embed="rId2">
+            <a:extLst>
+              <a:ext uri="{28A0092B-C50C-407E-A947-70E740481C1C}">
+                <a14:useLocalDpi xmlns:a14="http://schemas.microsoft.com/office/drawing/2010/main" val="0"/>
+              </a:ext>
+            </a:extLst>
+          </a:blip>
+          <a:srcRect t="-459" b="937"/>
+          <a:stretch>
+            <a:fillRect/>
+          </a:stretch>
+        </p:blipFill>
+        <p:spPr>
+          <a:xfrm>
+            <a:off x="203200" y="1606309"/>
+            <a:ext cx="11379200" cy="5074577"/>
+          </a:xfrm>
+        </p:spPr>
+      </p:pic>
+      <p:sp>
+        <p:nvSpPr>
+          <p:cNvPr id="23557" name="TextBox 6"/>
+          <p:cNvSpPr txBox="1">
+            <a:spLocks noChangeArrowheads="1"/>
+          </p:cNvSpPr>
+          <p:nvPr/>
+        </p:nvSpPr>
+        <p:spPr bwMode="auto">
+          <a:xfrm>
+            <a:off x="0" y="909109"/>
+            <a:ext cx="12801600" cy="584775"/>
+          </a:xfrm>
+          <a:prstGeom prst="rect">
+            <a:avLst/>
+          </a:prstGeom>
+          <a:noFill/>
+          <a:ln>
+            <a:noFill/>
+          </a:ln>
+          <a:extLst>
+            <a:ext uri="{909E8E84-426E-40dd-AFC4-6F175D3DCCD1}">
+              <a14:hiddenFill xmlns="" xmlns:a14="http://schemas.microsoft.com/office/drawing/2010/main">
+                <a:solidFill>
+                  <a:srgbClr val="FFFFFF"/>
+                </a:solidFill>
+              </a14:hiddenFill>
+            </a:ext>
+            <a:ext uri="{91240B29-F687-4f45-9708-019B960494DF}">
+              <a14:hiddenLine xmlns="" xmlns:a14="http://schemas.microsoft.com/office/drawing/2010/main" w="9525">
+                <a:solidFill>
+                  <a:srgbClr val="000000"/>
+                </a:solidFill>
+                <a:miter lim="800000"/>
+                <a:headEnd/>
+                <a:tailEnd/>
+              </a14:hiddenLine>
+            </a:ext>
+          </a:extLst>
+        </p:spPr>
+        <p:txBody>
+          <a:bodyPr wrap="square">
+            <a:spAutoFit/>
+          </a:bodyPr>
+          <a:lstStyle>
+            <a:lvl1pPr eaLnBrk="0" hangingPunct="0">
+              <a:defRPr sz="2400">
+                <a:solidFill>
+                  <a:schemeClr val="tx1"/>
+                </a:solidFill>
+                <a:latin typeface="Arial" charset="0"/>
+                <a:ea typeface="ＭＳ Ｐゴシック" charset="0"/>
+                <a:cs typeface="ＭＳ Ｐゴシック" charset="0"/>
+              </a:defRPr>
+            </a:lvl1pPr>
+            <a:lvl2pPr marL="742950" indent="-285750" eaLnBrk="0" hangingPunct="0">
+              <a:defRPr sz="2400">
+                <a:solidFill>
+                  <a:schemeClr val="tx1"/>
+                </a:solidFill>
+                <a:latin typeface="Arial" charset="0"/>
+                <a:ea typeface="ＭＳ Ｐゴシック" charset="0"/>
+              </a:defRPr>
+            </a:lvl2pPr>
+            <a:lvl3pPr marL="1143000" indent="-228600" eaLnBrk="0" hangingPunct="0">
+              <a:defRPr sz="2400">
+                <a:solidFill>
+                  <a:schemeClr val="tx1"/>
+                </a:solidFill>
+                <a:latin typeface="Arial" charset="0"/>
+                <a:ea typeface="ＭＳ Ｐゴシック" charset="0"/>
+              </a:defRPr>
+            </a:lvl3pPr>
+            <a:lvl4pPr marL="1600200" indent="-228600" eaLnBrk="0" hangingPunct="0">
+              <a:defRPr sz="2400">
+                <a:solidFill>
+                  <a:schemeClr val="tx1"/>
+                </a:solidFill>
+                <a:latin typeface="Arial" charset="0"/>
+                <a:ea typeface="ＭＳ Ｐゴシック" charset="0"/>
+              </a:defRPr>
+            </a:lvl4pPr>
+            <a:lvl5pPr marL="2057400" indent="-228600" eaLnBrk="0" hangingPunct="0">
+              <a:defRPr sz="2400">
+                <a:solidFill>
+                  <a:schemeClr val="tx1"/>
+                </a:solidFill>
+                <a:latin typeface="Arial" charset="0"/>
+                <a:ea typeface="ＭＳ Ｐゴシック" charset="0"/>
+              </a:defRPr>
+            </a:lvl5pPr>
+            <a:lvl6pPr marL="2514600" indent="-228600" eaLnBrk="0" fontAlgn="base" hangingPunct="0">
+              <a:spcBef>
+                <a:spcPct val="0"/>
+              </a:spcBef>
+              <a:spcAft>
+                <a:spcPct val="0"/>
+              </a:spcAft>
+              <a:defRPr sz="2400">
+                <a:solidFill>
+                  <a:schemeClr val="tx1"/>
+                </a:solidFill>
+                <a:latin typeface="Arial" charset="0"/>
+                <a:ea typeface="ＭＳ Ｐゴシック" charset="0"/>
+              </a:defRPr>
+            </a:lvl6pPr>
+            <a:lvl7pPr marL="2971800" indent="-228600" eaLnBrk="0" fontAlgn="base" hangingPunct="0">
+              <a:spcBef>
+                <a:spcPct val="0"/>
+              </a:spcBef>
+              <a:spcAft>
+                <a:spcPct val="0"/>
+              </a:spcAft>
+              <a:defRPr sz="2400">
+                <a:solidFill>
+                  <a:schemeClr val="tx1"/>
+                </a:solidFill>
+                <a:latin typeface="Arial" charset="0"/>
+                <a:ea typeface="ＭＳ Ｐゴシック" charset="0"/>
+              </a:defRPr>
+            </a:lvl7pPr>
+            <a:lvl8pPr marL="3429000" indent="-228600" eaLnBrk="0" fontAlgn="base" hangingPunct="0">
+              <a:spcBef>
+                <a:spcPct val="0"/>
+              </a:spcBef>
+              <a:spcAft>
+                <a:spcPct val="0"/>
+              </a:spcAft>
+              <a:defRPr sz="2400">
+                <a:solidFill>
+                  <a:schemeClr val="tx1"/>
+                </a:solidFill>
+                <a:latin typeface="Arial" charset="0"/>
+                <a:ea typeface="ＭＳ Ｐゴシック" charset="0"/>
+              </a:defRPr>
+            </a:lvl8pPr>
+            <a:lvl9pPr marL="3886200" indent="-228600" eaLnBrk="0" fontAlgn="base" hangingPunct="0">
+              <a:spcBef>
+                <a:spcPct val="0"/>
+              </a:spcBef>
+              <a:spcAft>
+                <a:spcPct val="0"/>
+              </a:spcAft>
+              <a:defRPr sz="2400">
+                <a:solidFill>
+                  <a:schemeClr val="tx1"/>
+                </a:solidFill>
+                <a:latin typeface="Arial" charset="0"/>
+                <a:ea typeface="ＭＳ Ｐゴシック" charset="0"/>
+              </a:defRPr>
+            </a:lvl9pPr>
+          </a:lstStyle>
+          <a:p>
+            <a:pPr eaLnBrk="1" hangingPunct="1"/>
+            <a:r>
+              <a:rPr lang="en-US" sz="3200" dirty="0"/>
+              <a:t>Example SAM/BAM alignment section (only 10 alignments shown)</a:t>
+            </a:r>
+          </a:p>
+        </p:txBody>
+      </p:sp>
+      <p:sp>
+        <p:nvSpPr>
+          <p:cNvPr id="5" name="TextBox 4">
+            <a:extLst>
+              <a:ext uri="{FF2B5EF4-FFF2-40B4-BE49-F238E27FC236}">
+                <a16:creationId xmlns:a16="http://schemas.microsoft.com/office/drawing/2014/main" id="{13BD4DD0-1533-9742-86C7-AC3E1F7E5BA5}"/>
+              </a:ext>
+            </a:extLst>
+          </p:cNvPr>
+          <p:cNvSpPr txBox="1"/>
+          <p:nvPr/>
+        </p:nvSpPr>
+        <p:spPr>
+          <a:xfrm>
+            <a:off x="4165600" y="6548442"/>
+            <a:ext cx="5486400" cy="318100"/>
+          </a:xfrm>
+          <a:prstGeom prst="rect">
+            <a:avLst/>
+          </a:prstGeom>
+          <a:noFill/>
+        </p:spPr>
+        <p:txBody>
+          <a:bodyPr wrap="square" rtlCol="0">
+            <a:spAutoFit/>
+          </a:bodyPr>
+          <a:lstStyle/>
+          <a:p>
+            <a:r>
+              <a:rPr lang="en-US" sz="1467" dirty="0"/>
+              <a:t>Slide courtesy of Obi and Malachi Griffith</a:t>
+            </a:r>
+          </a:p>
+        </p:txBody>
+      </p:sp>
+    </p:spTree>
+    <p:extLst>
+      <p:ext uri="{BB962C8B-B14F-4D97-AF65-F5344CB8AC3E}">
+        <p14:creationId xmlns:p14="http://schemas.microsoft.com/office/powerpoint/2010/main" val="1114049700"/>
+      </p:ext>
+    </p:extLst>
+  </p:cSld>
+  <p:clrMapOvr>
+    <a:masterClrMapping/>
+  </p:clrMapOvr>
+</p:sld>
+</file>
+
+<file path=ppt/slides/slide7.xml><?xml version="1.0" encoding="utf-8"?>
+<p:sld xmlns:a="http://schemas.openxmlformats.org/drawingml/2006/main" xmlns:r="http://schemas.openxmlformats.org/officeDocument/2006/relationships" xmlns:p="http://schemas.openxmlformats.org/presentationml/2006/main">
+  <p:cSld>
+    <p:spTree>
+      <p:nvGrpSpPr>
+        <p:cNvPr id="1" name=""/>
+        <p:cNvGrpSpPr/>
+        <p:nvPr/>
+      </p:nvGrpSpPr>
+      <p:grpSpPr>
+        <a:xfrm>
+          <a:off x="0" y="0"/>
+          <a:ext cx="0" cy="0"/>
+          <a:chOff x="0" y="0"/>
+          <a:chExt cx="0" cy="0"/>
+        </a:xfrm>
+      </p:grpSpPr>
       <p:sp>
         <p:nvSpPr>
           <p:cNvPr id="26625" name="Title 1"/>
@@ -11275,86 +13941,6 @@
       </p:pic>
       <p:sp>
         <p:nvSpPr>
-          <p:cNvPr id="5" name="5-Point Star 4"/>
-          <p:cNvSpPr/>
-          <p:nvPr/>
-        </p:nvSpPr>
-        <p:spPr>
-          <a:xfrm>
-            <a:off x="2050347" y="1268085"/>
-            <a:ext cx="144462" cy="144462"/>
-          </a:xfrm>
-          <a:prstGeom prst="star5">
-            <a:avLst/>
-          </a:prstGeom>
-        </p:spPr>
-        <p:style>
-          <a:lnRef idx="1">
-            <a:schemeClr val="accent2"/>
-          </a:lnRef>
-          <a:fillRef idx="3">
-            <a:schemeClr val="accent2"/>
-          </a:fillRef>
-          <a:effectRef idx="2">
-            <a:schemeClr val="accent2"/>
-          </a:effectRef>
-          <a:fontRef idx="minor">
-            <a:schemeClr val="lt1"/>
-          </a:fontRef>
-        </p:style>
-        <p:txBody>
-          <a:bodyPr anchor="ctr"/>
-          <a:lstStyle/>
-          <a:p>
-            <a:pPr algn="ctr">
-              <a:defRPr/>
-            </a:pPr>
-            <a:endParaRPr lang="en-US" dirty="0"/>
-          </a:p>
-        </p:txBody>
-      </p:sp>
-      <p:sp>
-        <p:nvSpPr>
-          <p:cNvPr id="6" name="5-Point Star 5"/>
-          <p:cNvSpPr/>
-          <p:nvPr/>
-        </p:nvSpPr>
-        <p:spPr>
-          <a:xfrm>
-            <a:off x="2050347" y="2133273"/>
-            <a:ext cx="144462" cy="142875"/>
-          </a:xfrm>
-          <a:prstGeom prst="star5">
-            <a:avLst/>
-          </a:prstGeom>
-        </p:spPr>
-        <p:style>
-          <a:lnRef idx="1">
-            <a:schemeClr val="accent2"/>
-          </a:lnRef>
-          <a:fillRef idx="3">
-            <a:schemeClr val="accent2"/>
-          </a:fillRef>
-          <a:effectRef idx="2">
-            <a:schemeClr val="accent2"/>
-          </a:effectRef>
-          <a:fontRef idx="minor">
-            <a:schemeClr val="lt1"/>
-          </a:fontRef>
-        </p:style>
-        <p:txBody>
-          <a:bodyPr anchor="ctr"/>
-          <a:lstStyle/>
-          <a:p>
-            <a:pPr algn="ctr">
-              <a:defRPr/>
-            </a:pPr>
-            <a:endParaRPr lang="en-US" dirty="0"/>
-          </a:p>
-        </p:txBody>
-      </p:sp>
-      <p:sp>
-        <p:nvSpPr>
           <p:cNvPr id="2" name="TextBox 1">
             <a:extLst>
               <a:ext uri="{FF2B5EF4-FFF2-40B4-BE49-F238E27FC236}">
@@ -11401,7 +13987,672 @@
 </p:sld>
 </file>
 
-<file path=ppt/slides/slide6.xml><?xml version="1.0" encoding="utf-8"?>
+<file path=ppt/slides/slide8.xml><?xml version="1.0" encoding="utf-8"?>
+<p:sld xmlns:a="http://schemas.openxmlformats.org/drawingml/2006/main" xmlns:r="http://schemas.openxmlformats.org/officeDocument/2006/relationships" xmlns:p="http://schemas.openxmlformats.org/presentationml/2006/main">
+  <p:cSld>
+    <p:spTree>
+      <p:nvGrpSpPr>
+        <p:cNvPr id="1" name=""/>
+        <p:cNvGrpSpPr/>
+        <p:nvPr/>
+      </p:nvGrpSpPr>
+      <p:grpSpPr>
+        <a:xfrm>
+          <a:off x="0" y="0"/>
+          <a:ext cx="0" cy="0"/>
+          <a:chOff x="0" y="0"/>
+          <a:chExt cx="0" cy="0"/>
+        </a:xfrm>
+      </p:grpSpPr>
+      <p:sp>
+        <p:nvSpPr>
+          <p:cNvPr id="405" name="SAM format"/>
+          <p:cNvSpPr txBox="1">
+            <a:spLocks noGrp="1"/>
+          </p:cNvSpPr>
+          <p:nvPr>
+            <p:ph type="title"/>
+          </p:nvPr>
+        </p:nvSpPr>
+        <p:spPr>
+          <a:xfrm>
+            <a:off x="457199" y="27005"/>
+            <a:ext cx="11277600" cy="609601"/>
+          </a:xfrm>
+          <a:prstGeom prst="rect">
+            <a:avLst/>
+          </a:prstGeom>
+        </p:spPr>
+        <p:txBody>
+          <a:bodyPr>
+            <a:noAutofit/>
+          </a:bodyPr>
+          <a:lstStyle>
+            <a:lvl1pPr>
+              <a:defRPr sz="6000"/>
+            </a:lvl1pPr>
+          </a:lstStyle>
+          <a:p>
+            <a:r>
+              <a:rPr sz="4800" dirty="0"/>
+              <a:t>SAM </a:t>
+            </a:r>
+            <a:r>
+              <a:rPr lang="en-US" sz="4800" dirty="0"/>
+              <a:t>F</a:t>
+            </a:r>
+            <a:r>
+              <a:rPr sz="4800" dirty="0"/>
+              <a:t>ormat</a:t>
+            </a:r>
+            <a:r>
+              <a:rPr lang="en-US" sz="4800" dirty="0"/>
+              <a:t> – Information Fields</a:t>
+            </a:r>
+            <a:endParaRPr sz="4800" dirty="0"/>
+          </a:p>
+        </p:txBody>
+      </p:sp>
+      <p:pic>
+        <p:nvPicPr>
+          <p:cNvPr id="409" name="Screen Shot 2014-11-14 at 8.32.21 AM.png" descr="Screen Shot 2014-11-14 at 8.32.21 AM.png"/>
+          <p:cNvPicPr>
+            <a:picLocks noChangeAspect="1"/>
+          </p:cNvPicPr>
+          <p:nvPr/>
+        </p:nvPicPr>
+        <p:blipFill>
+          <a:blip r:embed="rId2"/>
+          <a:stretch>
+            <a:fillRect/>
+          </a:stretch>
+        </p:blipFill>
+        <p:spPr>
+          <a:xfrm>
+            <a:off x="974901" y="1003765"/>
+            <a:ext cx="9194139" cy="3082999"/>
+          </a:xfrm>
+          <a:prstGeom prst="rect">
+            <a:avLst/>
+          </a:prstGeom>
+          <a:ln w="12700">
+            <a:miter lim="400000"/>
+          </a:ln>
+        </p:spPr>
+      </p:pic>
+      <p:grpSp>
+        <p:nvGrpSpPr>
+          <p:cNvPr id="3" name="Group 2">
+            <a:extLst>
+              <a:ext uri="{FF2B5EF4-FFF2-40B4-BE49-F238E27FC236}">
+                <a16:creationId xmlns:a16="http://schemas.microsoft.com/office/drawing/2014/main" id="{194ED37F-E3F3-3B4C-9947-32EFC1395793}"/>
+              </a:ext>
+            </a:extLst>
+          </p:cNvPr>
+          <p:cNvGrpSpPr/>
+          <p:nvPr/>
+        </p:nvGrpSpPr>
+        <p:grpSpPr>
+          <a:xfrm>
+            <a:off x="165401" y="4453923"/>
+            <a:ext cx="12026599" cy="1091087"/>
+            <a:chOff x="82700" y="4932393"/>
+            <a:chExt cx="12026599" cy="1091087"/>
+          </a:xfrm>
+        </p:grpSpPr>
+        <p:pic>
+          <p:nvPicPr>
+            <p:cNvPr id="410" name="Screen Shot 2014-11-14 at 8.34.08 AM.png" descr="Screen Shot 2014-11-14 at 8.34.08 AM.png"/>
+            <p:cNvPicPr>
+              <a:picLocks noChangeAspect="1"/>
+            </p:cNvPicPr>
+            <p:nvPr/>
+          </p:nvPicPr>
+          <p:blipFill>
+            <a:blip r:embed="rId3"/>
+            <a:stretch>
+              <a:fillRect/>
+            </a:stretch>
+          </p:blipFill>
+          <p:spPr>
+            <a:xfrm>
+              <a:off x="82700" y="5286821"/>
+              <a:ext cx="12026599" cy="191116"/>
+            </a:xfrm>
+            <a:prstGeom prst="rect">
+              <a:avLst/>
+            </a:prstGeom>
+            <a:ln w="12700">
+              <a:miter lim="400000"/>
+            </a:ln>
+          </p:spPr>
+        </p:pic>
+        <p:grpSp>
+          <p:nvGrpSpPr>
+            <p:cNvPr id="2" name="Group 1">
+              <a:extLst>
+                <a:ext uri="{FF2B5EF4-FFF2-40B4-BE49-F238E27FC236}">
+                  <a16:creationId xmlns:a16="http://schemas.microsoft.com/office/drawing/2014/main" id="{CF3EE22F-0334-A347-BE4D-A9740AB0D68D}"/>
+                </a:ext>
+              </a:extLst>
+            </p:cNvPr>
+            <p:cNvGrpSpPr/>
+            <p:nvPr/>
+          </p:nvGrpSpPr>
+          <p:grpSpPr>
+            <a:xfrm>
+              <a:off x="705685" y="4932393"/>
+              <a:ext cx="8285962" cy="1091087"/>
+              <a:chOff x="747693" y="4953397"/>
+              <a:chExt cx="8285962" cy="1091087"/>
+            </a:xfrm>
+          </p:grpSpPr>
+          <p:sp>
+            <p:nvSpPr>
+              <p:cNvPr id="408" name="3"/>
+              <p:cNvSpPr txBox="1"/>
+              <p:nvPr/>
+            </p:nvSpPr>
+            <p:spPr>
+              <a:xfrm>
+                <a:off x="3249767" y="4988273"/>
+                <a:ext cx="239119" cy="310214"/>
+              </a:xfrm>
+              <a:prstGeom prst="rect">
+                <a:avLst/>
+              </a:prstGeom>
+              <a:ln w="12700">
+                <a:miter lim="400000"/>
+              </a:ln>
+              <a:extLst>
+                <a:ext uri="{C572A759-6A51-4108-AA02-DFA0A04FC94B}">
+                  <ma14:wrappingTextBoxFlag xmlns="" xmlns:m="http://schemas.openxmlformats.org/officeDocument/2006/math" xmlns:a14="http://schemas.microsoft.com/office/drawing/2010/main" xmlns:ma14="http://schemas.microsoft.com/office/mac/drawingml/2011/main" val="1"/>
+                </a:ext>
+              </a:extLst>
+            </p:spPr>
+            <p:txBody>
+              <a:bodyPr lIns="35719" tIns="35719" rIns="35719" bIns="35719" anchor="ctr">
+                <a:spAutoFit/>
+              </a:bodyPr>
+              <a:lstStyle>
+                <a:lvl1pPr>
+                  <a:defRPr sz="2200"/>
+                </a:lvl1pPr>
+              </a:lstStyle>
+              <a:p>
+                <a:r>
+                  <a:rPr sz="1547" dirty="0"/>
+                  <a:t>3</a:t>
+                </a:r>
+              </a:p>
+            </p:txBody>
+          </p:sp>
+          <p:sp>
+            <p:nvSpPr>
+              <p:cNvPr id="411" name="2"/>
+              <p:cNvSpPr txBox="1"/>
+              <p:nvPr/>
+            </p:nvSpPr>
+            <p:spPr>
+              <a:xfrm>
+                <a:off x="2516017" y="4989430"/>
+                <a:ext cx="239119" cy="310214"/>
+              </a:xfrm>
+              <a:prstGeom prst="rect">
+                <a:avLst/>
+              </a:prstGeom>
+              <a:ln w="12700">
+                <a:miter lim="400000"/>
+              </a:ln>
+              <a:extLst>
+                <a:ext uri="{C572A759-6A51-4108-AA02-DFA0A04FC94B}">
+                  <ma14:wrappingTextBoxFlag xmlns="" xmlns:m="http://schemas.openxmlformats.org/officeDocument/2006/math" xmlns:a14="http://schemas.microsoft.com/office/drawing/2010/main" xmlns:ma14="http://schemas.microsoft.com/office/mac/drawingml/2011/main" val="1"/>
+                </a:ext>
+              </a:extLst>
+            </p:spPr>
+            <p:txBody>
+              <a:bodyPr lIns="35719" tIns="35719" rIns="35719" bIns="35719" anchor="ctr">
+                <a:spAutoFit/>
+              </a:bodyPr>
+              <a:lstStyle>
+                <a:lvl1pPr>
+                  <a:defRPr sz="2200"/>
+                </a:lvl1pPr>
+              </a:lstStyle>
+              <a:p>
+                <a:r>
+                  <a:rPr sz="1547" dirty="0"/>
+                  <a:t>2</a:t>
+                </a:r>
+              </a:p>
+            </p:txBody>
+          </p:sp>
+          <p:sp>
+            <p:nvSpPr>
+              <p:cNvPr id="412" name="1"/>
+              <p:cNvSpPr txBox="1"/>
+              <p:nvPr/>
+            </p:nvSpPr>
+            <p:spPr>
+              <a:xfrm>
+                <a:off x="747693" y="4953397"/>
+                <a:ext cx="239119" cy="310214"/>
+              </a:xfrm>
+              <a:prstGeom prst="rect">
+                <a:avLst/>
+              </a:prstGeom>
+              <a:ln w="12700">
+                <a:miter lim="400000"/>
+              </a:ln>
+              <a:extLst>
+                <a:ext uri="{C572A759-6A51-4108-AA02-DFA0A04FC94B}">
+                  <ma14:wrappingTextBoxFlag xmlns="" xmlns:m="http://schemas.openxmlformats.org/officeDocument/2006/math" xmlns:a14="http://schemas.microsoft.com/office/drawing/2010/main" xmlns:ma14="http://schemas.microsoft.com/office/mac/drawingml/2011/main" val="1"/>
+                </a:ext>
+              </a:extLst>
+            </p:spPr>
+            <p:txBody>
+              <a:bodyPr wrap="square" lIns="35719" tIns="35719" rIns="35719" bIns="35719" anchor="ctr">
+                <a:spAutoFit/>
+              </a:bodyPr>
+              <a:lstStyle>
+                <a:lvl1pPr>
+                  <a:defRPr sz="2200"/>
+                </a:lvl1pPr>
+              </a:lstStyle>
+              <a:p>
+                <a:r>
+                  <a:rPr sz="1547" dirty="0"/>
+                  <a:t>1</a:t>
+                </a:r>
+              </a:p>
+            </p:txBody>
+          </p:sp>
+          <p:sp>
+            <p:nvSpPr>
+              <p:cNvPr id="413" name="5"/>
+              <p:cNvSpPr txBox="1"/>
+              <p:nvPr/>
+            </p:nvSpPr>
+            <p:spPr>
+              <a:xfrm>
+                <a:off x="4778973" y="4989430"/>
+                <a:ext cx="239119" cy="310214"/>
+              </a:xfrm>
+              <a:prstGeom prst="rect">
+                <a:avLst/>
+              </a:prstGeom>
+              <a:ln w="12700">
+                <a:miter lim="400000"/>
+              </a:ln>
+              <a:extLst>
+                <a:ext uri="{C572A759-6A51-4108-AA02-DFA0A04FC94B}">
+                  <ma14:wrappingTextBoxFlag xmlns="" xmlns:m="http://schemas.openxmlformats.org/officeDocument/2006/math" xmlns:a14="http://schemas.microsoft.com/office/drawing/2010/main" xmlns:ma14="http://schemas.microsoft.com/office/mac/drawingml/2011/main" val="1"/>
+                </a:ext>
+              </a:extLst>
+            </p:spPr>
+            <p:txBody>
+              <a:bodyPr lIns="35719" tIns="35719" rIns="35719" bIns="35719" anchor="ctr">
+                <a:spAutoFit/>
+              </a:bodyPr>
+              <a:lstStyle>
+                <a:lvl1pPr>
+                  <a:defRPr sz="2200"/>
+                </a:lvl1pPr>
+              </a:lstStyle>
+              <a:p>
+                <a:r>
+                  <a:rPr sz="1547" dirty="0"/>
+                  <a:t>5</a:t>
+                </a:r>
+              </a:p>
+            </p:txBody>
+          </p:sp>
+          <p:sp>
+            <p:nvSpPr>
+              <p:cNvPr id="414" name="4"/>
+              <p:cNvSpPr txBox="1"/>
+              <p:nvPr/>
+            </p:nvSpPr>
+            <p:spPr>
+              <a:xfrm>
+                <a:off x="4167369" y="4979922"/>
+                <a:ext cx="239119" cy="310214"/>
+              </a:xfrm>
+              <a:prstGeom prst="rect">
+                <a:avLst/>
+              </a:prstGeom>
+              <a:ln w="12700">
+                <a:miter lim="400000"/>
+              </a:ln>
+              <a:extLst>
+                <a:ext uri="{C572A759-6A51-4108-AA02-DFA0A04FC94B}">
+                  <ma14:wrappingTextBoxFlag xmlns="" xmlns:m="http://schemas.openxmlformats.org/officeDocument/2006/math" xmlns:a14="http://schemas.microsoft.com/office/drawing/2010/main" xmlns:ma14="http://schemas.microsoft.com/office/mac/drawingml/2011/main" val="1"/>
+                </a:ext>
+              </a:extLst>
+            </p:spPr>
+            <p:txBody>
+              <a:bodyPr lIns="35719" tIns="35719" rIns="35719" bIns="35719" anchor="ctr">
+                <a:spAutoFit/>
+              </a:bodyPr>
+              <a:lstStyle>
+                <a:lvl1pPr>
+                  <a:defRPr sz="2200"/>
+                </a:lvl1pPr>
+              </a:lstStyle>
+              <a:p>
+                <a:r>
+                  <a:rPr sz="1547" dirty="0"/>
+                  <a:t>4</a:t>
+                </a:r>
+              </a:p>
+            </p:txBody>
+          </p:sp>
+          <p:sp>
+            <p:nvSpPr>
+              <p:cNvPr id="415" name="8"/>
+              <p:cNvSpPr txBox="1"/>
+              <p:nvPr/>
+            </p:nvSpPr>
+            <p:spPr>
+              <a:xfrm>
+                <a:off x="7158279" y="4988931"/>
+                <a:ext cx="239119" cy="310214"/>
+              </a:xfrm>
+              <a:prstGeom prst="rect">
+                <a:avLst/>
+              </a:prstGeom>
+              <a:ln w="12700">
+                <a:miter lim="400000"/>
+              </a:ln>
+              <a:extLst>
+                <a:ext uri="{C572A759-6A51-4108-AA02-DFA0A04FC94B}">
+                  <ma14:wrappingTextBoxFlag xmlns="" xmlns:m="http://schemas.openxmlformats.org/officeDocument/2006/math" xmlns:a14="http://schemas.microsoft.com/office/drawing/2010/main" xmlns:ma14="http://schemas.microsoft.com/office/mac/drawingml/2011/main" val="1"/>
+                </a:ext>
+              </a:extLst>
+            </p:spPr>
+            <p:txBody>
+              <a:bodyPr lIns="35719" tIns="35719" rIns="35719" bIns="35719" anchor="ctr">
+                <a:spAutoFit/>
+              </a:bodyPr>
+              <a:lstStyle>
+                <a:lvl1pPr>
+                  <a:defRPr sz="2200"/>
+                </a:lvl1pPr>
+              </a:lstStyle>
+              <a:p>
+                <a:r>
+                  <a:rPr sz="1547" dirty="0"/>
+                  <a:t>8</a:t>
+                </a:r>
+              </a:p>
+            </p:txBody>
+          </p:sp>
+          <p:sp>
+            <p:nvSpPr>
+              <p:cNvPr id="416" name="6"/>
+              <p:cNvSpPr txBox="1"/>
+              <p:nvPr/>
+            </p:nvSpPr>
+            <p:spPr>
+              <a:xfrm>
+                <a:off x="5613979" y="4962687"/>
+                <a:ext cx="239119" cy="310214"/>
+              </a:xfrm>
+              <a:prstGeom prst="rect">
+                <a:avLst/>
+              </a:prstGeom>
+              <a:ln w="12700">
+                <a:miter lim="400000"/>
+              </a:ln>
+              <a:extLst>
+                <a:ext uri="{C572A759-6A51-4108-AA02-DFA0A04FC94B}">
+                  <ma14:wrappingTextBoxFlag xmlns="" xmlns:m="http://schemas.openxmlformats.org/officeDocument/2006/math" xmlns:a14="http://schemas.microsoft.com/office/drawing/2010/main" xmlns:ma14="http://schemas.microsoft.com/office/mac/drawingml/2011/main" val="1"/>
+                </a:ext>
+              </a:extLst>
+            </p:spPr>
+            <p:txBody>
+              <a:bodyPr lIns="35719" tIns="35719" rIns="35719" bIns="35719" anchor="ctr">
+                <a:spAutoFit/>
+              </a:bodyPr>
+              <a:lstStyle>
+                <a:lvl1pPr>
+                  <a:defRPr sz="2200"/>
+                </a:lvl1pPr>
+              </a:lstStyle>
+              <a:p>
+                <a:r>
+                  <a:rPr sz="1547" dirty="0"/>
+                  <a:t>6</a:t>
+                </a:r>
+              </a:p>
+            </p:txBody>
+          </p:sp>
+          <p:sp>
+            <p:nvSpPr>
+              <p:cNvPr id="417" name="7"/>
+              <p:cNvSpPr txBox="1"/>
+              <p:nvPr/>
+            </p:nvSpPr>
+            <p:spPr>
+              <a:xfrm>
+                <a:off x="6228170" y="4971414"/>
+                <a:ext cx="239119" cy="310214"/>
+              </a:xfrm>
+              <a:prstGeom prst="rect">
+                <a:avLst/>
+              </a:prstGeom>
+              <a:ln w="12700">
+                <a:miter lim="400000"/>
+              </a:ln>
+              <a:extLst>
+                <a:ext uri="{C572A759-6A51-4108-AA02-DFA0A04FC94B}">
+                  <ma14:wrappingTextBoxFlag xmlns="" xmlns:m="http://schemas.openxmlformats.org/officeDocument/2006/math" xmlns:a14="http://schemas.microsoft.com/office/drawing/2010/main" xmlns:ma14="http://schemas.microsoft.com/office/mac/drawingml/2011/main" val="1"/>
+                </a:ext>
+              </a:extLst>
+            </p:spPr>
+            <p:txBody>
+              <a:bodyPr lIns="35719" tIns="35719" rIns="35719" bIns="35719" anchor="ctr">
+                <a:spAutoFit/>
+              </a:bodyPr>
+              <a:lstStyle>
+                <a:lvl1pPr>
+                  <a:defRPr sz="2200"/>
+                </a:lvl1pPr>
+              </a:lstStyle>
+              <a:p>
+                <a:r>
+                  <a:rPr sz="1547" dirty="0"/>
+                  <a:t>7</a:t>
+                </a:r>
+              </a:p>
+            </p:txBody>
+          </p:sp>
+          <p:sp>
+            <p:nvSpPr>
+              <p:cNvPr id="418" name="10"/>
+              <p:cNvSpPr txBox="1"/>
+              <p:nvPr/>
+            </p:nvSpPr>
+            <p:spPr>
+              <a:xfrm>
+                <a:off x="8642732" y="4971166"/>
+                <a:ext cx="390923" cy="310214"/>
+              </a:xfrm>
+              <a:prstGeom prst="rect">
+                <a:avLst/>
+              </a:prstGeom>
+              <a:ln w="12700">
+                <a:miter lim="400000"/>
+              </a:ln>
+              <a:extLst>
+                <a:ext uri="{C572A759-6A51-4108-AA02-DFA0A04FC94B}">
+                  <ma14:wrappingTextBoxFlag xmlns="" xmlns:m="http://schemas.openxmlformats.org/officeDocument/2006/math" xmlns:a14="http://schemas.microsoft.com/office/drawing/2010/main" xmlns:ma14="http://schemas.microsoft.com/office/mac/drawingml/2011/main" val="1"/>
+                </a:ext>
+              </a:extLst>
+            </p:spPr>
+            <p:txBody>
+              <a:bodyPr lIns="35719" tIns="35719" rIns="35719" bIns="35719" anchor="ctr">
+                <a:spAutoFit/>
+              </a:bodyPr>
+              <a:lstStyle>
+                <a:lvl1pPr>
+                  <a:defRPr sz="2200"/>
+                </a:lvl1pPr>
+              </a:lstStyle>
+              <a:p>
+                <a:r>
+                  <a:rPr sz="1547" dirty="0"/>
+                  <a:t>10</a:t>
+                </a:r>
+              </a:p>
+            </p:txBody>
+          </p:sp>
+          <p:sp>
+            <p:nvSpPr>
+              <p:cNvPr id="419" name="9"/>
+              <p:cNvSpPr txBox="1"/>
+              <p:nvPr/>
+            </p:nvSpPr>
+            <p:spPr>
+              <a:xfrm>
+                <a:off x="7858631" y="4988931"/>
+                <a:ext cx="239119" cy="310214"/>
+              </a:xfrm>
+              <a:prstGeom prst="rect">
+                <a:avLst/>
+              </a:prstGeom>
+              <a:ln w="12700">
+                <a:miter lim="400000"/>
+              </a:ln>
+              <a:extLst>
+                <a:ext uri="{C572A759-6A51-4108-AA02-DFA0A04FC94B}">
+                  <ma14:wrappingTextBoxFlag xmlns="" xmlns:m="http://schemas.openxmlformats.org/officeDocument/2006/math" xmlns:a14="http://schemas.microsoft.com/office/drawing/2010/main" xmlns:ma14="http://schemas.microsoft.com/office/mac/drawingml/2011/main" val="1"/>
+                </a:ext>
+              </a:extLst>
+            </p:spPr>
+            <p:txBody>
+              <a:bodyPr lIns="35719" tIns="35719" rIns="35719" bIns="35719" anchor="ctr">
+                <a:spAutoFit/>
+              </a:bodyPr>
+              <a:lstStyle>
+                <a:lvl1pPr>
+                  <a:defRPr sz="2200"/>
+                </a:lvl1pPr>
+              </a:lstStyle>
+              <a:p>
+                <a:r>
+                  <a:rPr sz="1547" dirty="0"/>
+                  <a:t>9</a:t>
+                </a:r>
+              </a:p>
+            </p:txBody>
+          </p:sp>
+          <p:pic>
+            <p:nvPicPr>
+              <p:cNvPr id="420" name="Question mark - red.png" descr="Question mark - red.png"/>
+              <p:cNvPicPr>
+                <a:picLocks noChangeAspect="1"/>
+              </p:cNvPicPr>
+              <p:nvPr/>
+            </p:nvPicPr>
+            <p:blipFill>
+              <a:blip r:embed="rId4"/>
+              <a:stretch>
+                <a:fillRect/>
+              </a:stretch>
+            </p:blipFill>
+            <p:spPr>
+              <a:xfrm>
+                <a:off x="5566288" y="5472140"/>
+                <a:ext cx="334499" cy="559280"/>
+              </a:xfrm>
+              <a:prstGeom prst="rect">
+                <a:avLst/>
+              </a:prstGeom>
+              <a:ln w="12700">
+                <a:miter lim="400000"/>
+              </a:ln>
+            </p:spPr>
+          </p:pic>
+          <p:pic>
+            <p:nvPicPr>
+              <p:cNvPr id="421" name="Question mark - red.png" descr="Question mark - red.png"/>
+              <p:cNvPicPr>
+                <a:picLocks noChangeAspect="1"/>
+              </p:cNvPicPr>
+              <p:nvPr/>
+            </p:nvPicPr>
+            <p:blipFill>
+              <a:blip r:embed="rId4"/>
+              <a:stretch>
+                <a:fillRect/>
+              </a:stretch>
+            </p:blipFill>
+            <p:spPr>
+              <a:xfrm>
+                <a:off x="2430949" y="5485204"/>
+                <a:ext cx="334499" cy="559280"/>
+              </a:xfrm>
+              <a:prstGeom prst="rect">
+                <a:avLst/>
+              </a:prstGeom>
+              <a:ln w="12700">
+                <a:miter lim="400000"/>
+              </a:ln>
+            </p:spPr>
+          </p:pic>
+        </p:grpSp>
+      </p:grpSp>
+      <p:sp>
+        <p:nvSpPr>
+          <p:cNvPr id="19" name="TextBox 18">
+            <a:extLst>
+              <a:ext uri="{FF2B5EF4-FFF2-40B4-BE49-F238E27FC236}">
+                <a16:creationId xmlns:a16="http://schemas.microsoft.com/office/drawing/2014/main" id="{04B37314-351D-8543-A3A5-53F9090FE0CA}"/>
+              </a:ext>
+            </a:extLst>
+          </p:cNvPr>
+          <p:cNvSpPr txBox="1"/>
+          <p:nvPr/>
+        </p:nvSpPr>
+        <p:spPr>
+          <a:xfrm>
+            <a:off x="1268775" y="6497956"/>
+            <a:ext cx="5994400" cy="318100"/>
+          </a:xfrm>
+          <a:prstGeom prst="rect">
+            <a:avLst/>
+          </a:prstGeom>
+          <a:noFill/>
+        </p:spPr>
+        <p:txBody>
+          <a:bodyPr wrap="square" rtlCol="0">
+            <a:spAutoFit/>
+          </a:bodyPr>
+          <a:lstStyle/>
+          <a:p>
+            <a:r>
+              <a:rPr lang="en-US" sz="1467" dirty="0"/>
+              <a:t>Slide courtesy of Andrew Farrell </a:t>
+            </a:r>
+          </a:p>
+        </p:txBody>
+      </p:sp>
+    </p:spTree>
+    <p:extLst>
+      <p:ext uri="{BB962C8B-B14F-4D97-AF65-F5344CB8AC3E}">
+        <p14:creationId xmlns:p14="http://schemas.microsoft.com/office/powerpoint/2010/main" val="2237978712"/>
+      </p:ext>
+    </p:extLst>
+  </p:cSld>
+  <p:clrMapOvr>
+    <a:masterClrMapping/>
+  </p:clrMapOvr>
+  <p:transition spd="med"/>
+</p:sld>
+</file>
+
+<file path=ppt/slides/slide9.xml><?xml version="1.0" encoding="utf-8"?>
 <p:sld xmlns:a="http://schemas.openxmlformats.org/drawingml/2006/main" xmlns:r="http://schemas.openxmlformats.org/officeDocument/2006/relationships" xmlns:p="http://schemas.openxmlformats.org/presentationml/2006/main">
   <p:cSld>
     <p:spTree>
@@ -11762,842 +15013,6 @@
     <p:extLst>
       <p:ext uri="{BB962C8B-B14F-4D97-AF65-F5344CB8AC3E}">
         <p14:creationId xmlns:p14="http://schemas.microsoft.com/office/powerpoint/2010/main" val="1648909167"/>
-      </p:ext>
-    </p:extLst>
-  </p:cSld>
-  <p:clrMapOvr>
-    <a:masterClrMapping/>
-  </p:clrMapOvr>
-</p:sld>
-</file>
-
-<file path=ppt/slides/slide7.xml><?xml version="1.0" encoding="utf-8"?>
-<p:sld xmlns:a="http://schemas.openxmlformats.org/drawingml/2006/main" xmlns:r="http://schemas.openxmlformats.org/officeDocument/2006/relationships" xmlns:p="http://schemas.openxmlformats.org/presentationml/2006/main">
-  <p:cSld>
-    <p:spTree>
-      <p:nvGrpSpPr>
-        <p:cNvPr id="1" name=""/>
-        <p:cNvGrpSpPr/>
-        <p:nvPr/>
-      </p:nvGrpSpPr>
-      <p:grpSpPr>
-        <a:xfrm>
-          <a:off x="0" y="0"/>
-          <a:ext cx="0" cy="0"/>
-          <a:chOff x="0" y="0"/>
-          <a:chExt cx="0" cy="0"/>
-        </a:xfrm>
-      </p:grpSpPr>
-      <p:sp>
-        <p:nvSpPr>
-          <p:cNvPr id="28673" name="Title 1"/>
-          <p:cNvSpPr>
-            <a:spLocks noGrp="1"/>
-          </p:cNvSpPr>
-          <p:nvPr>
-            <p:ph type="title"/>
-          </p:nvPr>
-        </p:nvSpPr>
-        <p:spPr>
-          <a:xfrm>
-            <a:off x="1676400" y="-100013"/>
-            <a:ext cx="8839200" cy="1143001"/>
-          </a:xfrm>
-        </p:spPr>
-        <p:txBody>
-          <a:bodyPr/>
-          <a:lstStyle/>
-          <a:p>
-            <a:pPr algn="ctr"/>
-            <a:r>
-              <a:rPr lang="en-US" b="1" dirty="0">
-                <a:latin typeface="Calibri" charset="0"/>
-                <a:ea typeface="ＭＳ Ｐゴシック" charset="0"/>
-              </a:rPr>
-              <a:t>CIGAR strings explained</a:t>
-            </a:r>
-          </a:p>
-        </p:txBody>
-      </p:sp>
-      <p:sp>
-        <p:nvSpPr>
-          <p:cNvPr id="3" name="Content Placeholder 2"/>
-          <p:cNvSpPr>
-            <a:spLocks noGrp="1"/>
-          </p:cNvSpPr>
-          <p:nvPr>
-            <p:ph idx="1"/>
-          </p:nvPr>
-        </p:nvSpPr>
-        <p:spPr>
-          <a:xfrm>
-            <a:off x="1676400" y="3934618"/>
-            <a:ext cx="8839200" cy="1728788"/>
-          </a:xfrm>
-        </p:spPr>
-        <p:txBody>
-          <a:bodyPr>
-            <a:noAutofit/>
-          </a:bodyPr>
-          <a:lstStyle/>
-          <a:p>
-            <a:pPr indent="0">
-              <a:lnSpc>
-                <a:spcPct val="120000"/>
-              </a:lnSpc>
-              <a:defRPr/>
-            </a:pPr>
-            <a:r>
-              <a:rPr lang="en-US" sz="2000" dirty="0">
-                <a:latin typeface="Calibri" panose="020F0502020204030204" pitchFamily="34" charset="0"/>
-                <a:cs typeface="Calibri" panose="020F0502020204030204" pitchFamily="34" charset="0"/>
-              </a:rPr>
-              <a:t>The CIGAR string is a sequence of base lengths and associated ‘operations’ that are used to indicate which bases align to the reference (either a match or mismatch), are deleted, are inserted, represent introns, etc.</a:t>
-            </a:r>
-          </a:p>
-          <a:p>
-            <a:pPr indent="0">
-              <a:lnSpc>
-                <a:spcPct val="120000"/>
-              </a:lnSpc>
-              <a:defRPr/>
-            </a:pPr>
-            <a:r>
-              <a:rPr lang="en-US" sz="2000" dirty="0">
-                <a:latin typeface="Calibri" panose="020F0502020204030204" pitchFamily="34" charset="0"/>
-                <a:cs typeface="Calibri" panose="020F0502020204030204" pitchFamily="34" charset="0"/>
-              </a:rPr>
-              <a:t>e.g. 81M859N19M</a:t>
-            </a:r>
-          </a:p>
-          <a:p>
-            <a:pPr lvl="1" indent="0">
-              <a:lnSpc>
-                <a:spcPct val="120000"/>
-              </a:lnSpc>
-              <a:defRPr/>
-            </a:pPr>
-            <a:r>
-              <a:rPr lang="en-US" sz="2000" dirty="0">
-                <a:latin typeface="Calibri" panose="020F0502020204030204" pitchFamily="34" charset="0"/>
-                <a:cs typeface="Calibri" panose="020F0502020204030204" pitchFamily="34" charset="0"/>
-              </a:rPr>
-              <a:t>A 100 bp read consists of:  81 bases of alignment to reference, 859 bases skipped (an intron), 19 bases of alignment</a:t>
-            </a:r>
-          </a:p>
-        </p:txBody>
-      </p:sp>
-      <p:pic>
-        <p:nvPicPr>
-          <p:cNvPr id="28675" name="Picture 4" descr="CIGAR operations.png"/>
-          <p:cNvPicPr>
-            <a:picLocks noChangeAspect="1"/>
-          </p:cNvPicPr>
-          <p:nvPr/>
-        </p:nvPicPr>
-        <p:blipFill>
-          <a:blip r:embed="rId2">
-            <a:extLst>
-              <a:ext uri="{28A0092B-C50C-407E-A947-70E740481C1C}">
-                <a14:useLocalDpi xmlns:a14="http://schemas.microsoft.com/office/drawing/2010/main" val="0"/>
-              </a:ext>
-            </a:extLst>
-          </a:blip>
-          <a:srcRect/>
-          <a:stretch>
-            <a:fillRect/>
-          </a:stretch>
-        </p:blipFill>
-        <p:spPr bwMode="auto">
-          <a:xfrm>
-            <a:off x="1998482" y="2216531"/>
-            <a:ext cx="7649917" cy="2856699"/>
-          </a:xfrm>
-          <a:prstGeom prst="rect">
-            <a:avLst/>
-          </a:prstGeom>
-          <a:noFill/>
-          <a:ln>
-            <a:noFill/>
-          </a:ln>
-          <a:extLst>
-            <a:ext uri="{909E8E84-426E-40dd-AFC4-6F175D3DCCD1}">
-              <a14:hiddenFill xmlns:a14="http://schemas.microsoft.com/office/drawing/2010/main" xmlns="">
-                <a:solidFill>
-                  <a:srgbClr val="FFFFFF"/>
-                </a:solidFill>
-              </a14:hiddenFill>
-            </a:ext>
-            <a:ext uri="{91240B29-F687-4f45-9708-019B960494DF}">
-              <a14:hiddenLine xmlns:a14="http://schemas.microsoft.com/office/drawing/2010/main" xmlns="" w="9525">
-                <a:solidFill>
-                  <a:srgbClr val="000000"/>
-                </a:solidFill>
-                <a:miter lim="800000"/>
-                <a:headEnd/>
-                <a:tailEnd/>
-              </a14:hiddenLine>
-            </a:ext>
-          </a:extLst>
-        </p:spPr>
-      </p:pic>
-      <p:sp>
-        <p:nvSpPr>
-          <p:cNvPr id="5" name="Content Placeholder 2">
-            <a:extLst>
-              <a:ext uri="{FF2B5EF4-FFF2-40B4-BE49-F238E27FC236}">
-                <a16:creationId xmlns:a16="http://schemas.microsoft.com/office/drawing/2014/main" id="{60648E99-9DA9-9644-9BCB-1340C971E48B}"/>
-              </a:ext>
-            </a:extLst>
-          </p:cNvPr>
-          <p:cNvSpPr txBox="1">
-            <a:spLocks/>
-          </p:cNvSpPr>
-          <p:nvPr/>
-        </p:nvSpPr>
-        <p:spPr>
-          <a:xfrm>
-            <a:off x="1281291" y="908040"/>
-            <a:ext cx="8839200" cy="1728788"/>
-          </a:xfrm>
-          <a:prstGeom prst="rect">
-            <a:avLst/>
-          </a:prstGeom>
-        </p:spPr>
-        <p:txBody>
-          <a:bodyPr vert="horz" lIns="91440" tIns="45720" rIns="91440" bIns="45720" rtlCol="0">
-            <a:noAutofit/>
-          </a:bodyPr>
-          <a:lstStyle>
-            <a:lvl1pPr marL="228600" indent="-228600" algn="l" defTabSz="914400" rtl="0" eaLnBrk="1" latinLnBrk="0" hangingPunct="1">
-              <a:lnSpc>
-                <a:spcPct val="90000"/>
-              </a:lnSpc>
-              <a:spcBef>
-                <a:spcPts val="1000"/>
-              </a:spcBef>
-              <a:buFont typeface="Arial" panose="020B0604020202020204" pitchFamily="34" charset="0"/>
-              <a:buChar char="•"/>
-              <a:defRPr sz="2800" kern="1200">
-                <a:solidFill>
-                  <a:schemeClr val="tx1"/>
-                </a:solidFill>
-                <a:latin typeface="+mn-lt"/>
-                <a:ea typeface="+mn-ea"/>
-                <a:cs typeface="+mn-cs"/>
-              </a:defRPr>
-            </a:lvl1pPr>
-            <a:lvl2pPr marL="685800" indent="-228600" algn="l" defTabSz="914400" rtl="0" eaLnBrk="1" latinLnBrk="0" hangingPunct="1">
-              <a:lnSpc>
-                <a:spcPct val="90000"/>
-              </a:lnSpc>
-              <a:spcBef>
-                <a:spcPts val="500"/>
-              </a:spcBef>
-              <a:buFont typeface="Arial" panose="020B0604020202020204" pitchFamily="34" charset="0"/>
-              <a:buChar char="•"/>
-              <a:defRPr sz="2400" kern="1200">
-                <a:solidFill>
-                  <a:schemeClr val="tx1"/>
-                </a:solidFill>
-                <a:latin typeface="+mn-lt"/>
-                <a:ea typeface="+mn-ea"/>
-                <a:cs typeface="+mn-cs"/>
-              </a:defRPr>
-            </a:lvl2pPr>
-            <a:lvl3pPr marL="1143000" indent="-228600" algn="l" defTabSz="914400" rtl="0" eaLnBrk="1" latinLnBrk="0" hangingPunct="1">
-              <a:lnSpc>
-                <a:spcPct val="90000"/>
-              </a:lnSpc>
-              <a:spcBef>
-                <a:spcPts val="500"/>
-              </a:spcBef>
-              <a:buFont typeface="Arial" panose="020B0604020202020204" pitchFamily="34" charset="0"/>
-              <a:buChar char="•"/>
-              <a:defRPr sz="2000" kern="1200">
-                <a:solidFill>
-                  <a:schemeClr val="tx1"/>
-                </a:solidFill>
-                <a:latin typeface="+mn-lt"/>
-                <a:ea typeface="+mn-ea"/>
-                <a:cs typeface="+mn-cs"/>
-              </a:defRPr>
-            </a:lvl3pPr>
-            <a:lvl4pPr marL="1600200" indent="-228600" algn="l" defTabSz="914400" rtl="0" eaLnBrk="1" latinLnBrk="0" hangingPunct="1">
-              <a:lnSpc>
-                <a:spcPct val="90000"/>
-              </a:lnSpc>
-              <a:spcBef>
-                <a:spcPts val="500"/>
-              </a:spcBef>
-              <a:buFont typeface="Arial" panose="020B0604020202020204" pitchFamily="34" charset="0"/>
-              <a:buChar char="•"/>
-              <a:defRPr sz="1800" kern="1200">
-                <a:solidFill>
-                  <a:schemeClr val="tx1"/>
-                </a:solidFill>
-                <a:latin typeface="+mn-lt"/>
-                <a:ea typeface="+mn-ea"/>
-                <a:cs typeface="+mn-cs"/>
-              </a:defRPr>
-            </a:lvl4pPr>
-            <a:lvl5pPr marL="2057400" indent="-228600" algn="l" defTabSz="914400" rtl="0" eaLnBrk="1" latinLnBrk="0" hangingPunct="1">
-              <a:lnSpc>
-                <a:spcPct val="90000"/>
-              </a:lnSpc>
-              <a:spcBef>
-                <a:spcPts val="500"/>
-              </a:spcBef>
-              <a:buFont typeface="Arial" panose="020B0604020202020204" pitchFamily="34" charset="0"/>
-              <a:buChar char="•"/>
-              <a:defRPr sz="1800" kern="1200">
-                <a:solidFill>
-                  <a:schemeClr val="tx1"/>
-                </a:solidFill>
-                <a:latin typeface="+mn-lt"/>
-                <a:ea typeface="+mn-ea"/>
-                <a:cs typeface="+mn-cs"/>
-              </a:defRPr>
-            </a:lvl5pPr>
-            <a:lvl6pPr marL="2514600" indent="-228600" algn="l" defTabSz="914400" rtl="0" eaLnBrk="1" latinLnBrk="0" hangingPunct="1">
-              <a:lnSpc>
-                <a:spcPct val="90000"/>
-              </a:lnSpc>
-              <a:spcBef>
-                <a:spcPts val="500"/>
-              </a:spcBef>
-              <a:buFont typeface="Arial" panose="020B0604020202020204" pitchFamily="34" charset="0"/>
-              <a:buChar char="•"/>
-              <a:defRPr sz="1800" kern="1200">
-                <a:solidFill>
-                  <a:schemeClr val="tx1"/>
-                </a:solidFill>
-                <a:latin typeface="+mn-lt"/>
-                <a:ea typeface="+mn-ea"/>
-                <a:cs typeface="+mn-cs"/>
-              </a:defRPr>
-            </a:lvl6pPr>
-            <a:lvl7pPr marL="2971800" indent="-228600" algn="l" defTabSz="914400" rtl="0" eaLnBrk="1" latinLnBrk="0" hangingPunct="1">
-              <a:lnSpc>
-                <a:spcPct val="90000"/>
-              </a:lnSpc>
-              <a:spcBef>
-                <a:spcPts val="500"/>
-              </a:spcBef>
-              <a:buFont typeface="Arial" panose="020B0604020202020204" pitchFamily="34" charset="0"/>
-              <a:buChar char="•"/>
-              <a:defRPr sz="1800" kern="1200">
-                <a:solidFill>
-                  <a:schemeClr val="tx1"/>
-                </a:solidFill>
-                <a:latin typeface="+mn-lt"/>
-                <a:ea typeface="+mn-ea"/>
-                <a:cs typeface="+mn-cs"/>
-              </a:defRPr>
-            </a:lvl7pPr>
-            <a:lvl8pPr marL="3429000" indent="-228600" algn="l" defTabSz="914400" rtl="0" eaLnBrk="1" latinLnBrk="0" hangingPunct="1">
-              <a:lnSpc>
-                <a:spcPct val="90000"/>
-              </a:lnSpc>
-              <a:spcBef>
-                <a:spcPts val="500"/>
-              </a:spcBef>
-              <a:buFont typeface="Arial" panose="020B0604020202020204" pitchFamily="34" charset="0"/>
-              <a:buChar char="•"/>
-              <a:defRPr sz="1800" kern="1200">
-                <a:solidFill>
-                  <a:schemeClr val="tx1"/>
-                </a:solidFill>
-                <a:latin typeface="+mn-lt"/>
-                <a:ea typeface="+mn-ea"/>
-                <a:cs typeface="+mn-cs"/>
-              </a:defRPr>
-            </a:lvl8pPr>
-            <a:lvl9pPr marL="3886200" indent="-228600" algn="l" defTabSz="914400" rtl="0" eaLnBrk="1" latinLnBrk="0" hangingPunct="1">
-              <a:lnSpc>
-                <a:spcPct val="90000"/>
-              </a:lnSpc>
-              <a:spcBef>
-                <a:spcPts val="500"/>
-              </a:spcBef>
-              <a:buFont typeface="Arial" panose="020B0604020202020204" pitchFamily="34" charset="0"/>
-              <a:buChar char="•"/>
-              <a:defRPr sz="1800" kern="1200">
-                <a:solidFill>
-                  <a:schemeClr val="tx1"/>
-                </a:solidFill>
-                <a:latin typeface="+mn-lt"/>
-                <a:ea typeface="+mn-ea"/>
-                <a:cs typeface="+mn-cs"/>
-              </a:defRPr>
-            </a:lvl9pPr>
-          </a:lstStyle>
-          <a:p>
-            <a:pPr indent="0">
-              <a:lnSpc>
-                <a:spcPct val="120000"/>
-              </a:lnSpc>
-              <a:defRPr/>
-            </a:pPr>
-            <a:r>
-              <a:rPr lang="en-US" sz="2000" dirty="0">
-                <a:latin typeface="Calibri" panose="020F0502020204030204" pitchFamily="34" charset="0"/>
-                <a:cs typeface="Calibri" panose="020F0502020204030204" pitchFamily="34" charset="0"/>
-              </a:rPr>
-              <a:t>  The CIGAR string is a sequence of base lengths and associated ‘operations’ indicating which bases align to the reference (either a match or mismatch), are deleted, are inserted, represent introns, etc.</a:t>
-            </a:r>
-          </a:p>
-        </p:txBody>
-      </p:sp>
-    </p:spTree>
-    <p:extLst>
-      <p:ext uri="{BB962C8B-B14F-4D97-AF65-F5344CB8AC3E}">
-        <p14:creationId xmlns:p14="http://schemas.microsoft.com/office/powerpoint/2010/main" val="2261935748"/>
-      </p:ext>
-    </p:extLst>
-  </p:cSld>
-  <p:clrMapOvr>
-    <a:masterClrMapping/>
-  </p:clrMapOvr>
-</p:sld>
-</file>
-
-<file path=ppt/slides/slide8.xml><?xml version="1.0" encoding="utf-8"?>
-<p:sld xmlns:a="http://schemas.openxmlformats.org/drawingml/2006/main" xmlns:r="http://schemas.openxmlformats.org/officeDocument/2006/relationships" xmlns:p="http://schemas.openxmlformats.org/presentationml/2006/main">
-  <p:cSld>
-    <p:spTree>
-      <p:nvGrpSpPr>
-        <p:cNvPr id="1" name=""/>
-        <p:cNvGrpSpPr/>
-        <p:nvPr/>
-      </p:nvGrpSpPr>
-      <p:grpSpPr>
-        <a:xfrm>
-          <a:off x="0" y="0"/>
-          <a:ext cx="0" cy="0"/>
-          <a:chOff x="0" y="0"/>
-          <a:chExt cx="0" cy="0"/>
-        </a:xfrm>
-      </p:grpSpPr>
-      <p:sp>
-        <p:nvSpPr>
-          <p:cNvPr id="24577" name="Title 1"/>
-          <p:cNvSpPr>
-            <a:spLocks noGrp="1"/>
-          </p:cNvSpPr>
-          <p:nvPr>
-            <p:ph type="title"/>
-          </p:nvPr>
-        </p:nvSpPr>
-        <p:spPr>
-          <a:xfrm>
-            <a:off x="1676400" y="-26988"/>
-            <a:ext cx="8839200" cy="1143001"/>
-          </a:xfrm>
-        </p:spPr>
-        <p:txBody>
-          <a:bodyPr>
-            <a:normAutofit/>
-          </a:bodyPr>
-          <a:lstStyle/>
-          <a:p>
-            <a:pPr algn="ctr"/>
-            <a:r>
-              <a:rPr lang="en-US" b="1" dirty="0">
-                <a:latin typeface="Calibri" charset="0"/>
-                <a:ea typeface="ＭＳ Ｐゴシック" charset="0"/>
-              </a:rPr>
-              <a:t>CRAM files</a:t>
-            </a:r>
-          </a:p>
-        </p:txBody>
-      </p:sp>
-      <p:sp>
-        <p:nvSpPr>
-          <p:cNvPr id="28674" name="Content Placeholder 2"/>
-          <p:cNvSpPr>
-            <a:spLocks noGrp="1"/>
-          </p:cNvSpPr>
-          <p:nvPr>
-            <p:ph idx="1"/>
-          </p:nvPr>
-        </p:nvSpPr>
-        <p:spPr>
-          <a:xfrm>
-            <a:off x="659567" y="1116013"/>
-            <a:ext cx="6405601" cy="5021262"/>
-          </a:xfrm>
-        </p:spPr>
-        <p:txBody>
-          <a:bodyPr>
-            <a:normAutofit lnSpcReduction="10000"/>
-          </a:bodyPr>
-          <a:lstStyle/>
-          <a:p>
-            <a:pPr>
-              <a:defRPr/>
-            </a:pPr>
-            <a:r>
-              <a:rPr lang="en-US" dirty="0">
-                <a:latin typeface="Calibri" panose="020F0502020204030204" pitchFamily="34" charset="0"/>
-                <a:ea typeface="ＭＳ Ｐゴシック" charset="0"/>
-                <a:cs typeface="Calibri" panose="020F0502020204030204" pitchFamily="34" charset="0"/>
-              </a:rPr>
-              <a:t>CRAM is an ultra-compressed version of a BAM file</a:t>
-            </a:r>
-          </a:p>
-          <a:p>
-            <a:pPr lvl="1">
-              <a:defRPr/>
-            </a:pPr>
-            <a:r>
-              <a:rPr lang="en-US" dirty="0">
-                <a:latin typeface="Calibri" panose="020F0502020204030204" pitchFamily="34" charset="0"/>
-                <a:ea typeface="ＭＳ Ｐゴシック" charset="0"/>
-                <a:cs typeface="Calibri" panose="020F0502020204030204" pitchFamily="34" charset="0"/>
-              </a:rPr>
-              <a:t>Usually between 30-60% smaller than the corresponding BAM</a:t>
-            </a:r>
-          </a:p>
-          <a:p>
-            <a:pPr lvl="1">
-              <a:defRPr/>
-            </a:pPr>
-            <a:endParaRPr lang="en-US" dirty="0">
-              <a:latin typeface="Calibri" panose="020F0502020204030204" pitchFamily="34" charset="0"/>
-              <a:ea typeface="ＭＳ Ｐゴシック" charset="0"/>
-              <a:cs typeface="Calibri" panose="020F0502020204030204" pitchFamily="34" charset="0"/>
-            </a:endParaRPr>
-          </a:p>
-          <a:p>
-            <a:pPr>
-              <a:defRPr/>
-            </a:pPr>
-            <a:r>
-              <a:rPr lang="en-US" dirty="0">
-                <a:latin typeface="Calibri" panose="020F0502020204030204" pitchFamily="34" charset="0"/>
-                <a:ea typeface="ＭＳ Ｐゴシック" charset="0"/>
-                <a:cs typeface="Calibri" panose="020F0502020204030204" pitchFamily="34" charset="0"/>
-              </a:rPr>
-              <a:t>Stores “diffs” from the reference genome </a:t>
-            </a:r>
-          </a:p>
-          <a:p>
-            <a:pPr lvl="1">
-              <a:defRPr/>
-            </a:pPr>
-            <a:r>
-              <a:rPr lang="en-US" dirty="0">
-                <a:latin typeface="Calibri" panose="020F0502020204030204" pitchFamily="34" charset="0"/>
-                <a:ea typeface="ＭＳ Ｐゴシック" charset="0"/>
-                <a:cs typeface="Calibri" panose="020F0502020204030204" pitchFamily="34" charset="0"/>
-              </a:rPr>
-              <a:t>requires the matching reference genome to restore original data!</a:t>
-            </a:r>
-          </a:p>
-          <a:p>
-            <a:pPr lvl="1">
-              <a:defRPr/>
-            </a:pPr>
-            <a:endParaRPr lang="en-US" dirty="0">
-              <a:latin typeface="Calibri" panose="020F0502020204030204" pitchFamily="34" charset="0"/>
-              <a:ea typeface="ＭＳ Ｐゴシック" charset="0"/>
-              <a:cs typeface="Calibri" panose="020F0502020204030204" pitchFamily="34" charset="0"/>
-            </a:endParaRPr>
-          </a:p>
-          <a:p>
-            <a:pPr>
-              <a:defRPr/>
-            </a:pPr>
-            <a:r>
-              <a:rPr lang="en-US" dirty="0">
-                <a:latin typeface="Calibri" panose="020F0502020204030204" pitchFamily="34" charset="0"/>
-                <a:ea typeface="ＭＳ Ｐゴシック" charset="0"/>
-                <a:cs typeface="Calibri" panose="020F0502020204030204" pitchFamily="34" charset="0"/>
-              </a:rPr>
-              <a:t>Base quality binning may be used as well</a:t>
-            </a:r>
-          </a:p>
-          <a:p>
-            <a:pPr>
-              <a:defRPr/>
-            </a:pPr>
-            <a:endParaRPr lang="en-US" dirty="0">
-              <a:latin typeface="Calibri" panose="020F0502020204030204" pitchFamily="34" charset="0"/>
-              <a:ea typeface="ＭＳ Ｐゴシック" charset="0"/>
-              <a:cs typeface="Calibri" panose="020F0502020204030204" pitchFamily="34" charset="0"/>
-            </a:endParaRPr>
-          </a:p>
-          <a:p>
-            <a:pPr>
-              <a:defRPr/>
-            </a:pPr>
-            <a:r>
-              <a:rPr lang="en-US" dirty="0">
-                <a:latin typeface="Calibri" panose="020F0502020204030204" pitchFamily="34" charset="0"/>
-                <a:ea typeface="ＭＳ Ｐゴシック" charset="0"/>
-                <a:cs typeface="Calibri" panose="020F0502020204030204" pitchFamily="34" charset="0"/>
-              </a:rPr>
-              <a:t>Some tools still require conversion back to bam</a:t>
-            </a:r>
-          </a:p>
-          <a:p>
-            <a:pPr lvl="1">
-              <a:defRPr/>
-            </a:pPr>
-            <a:endParaRPr lang="en-US" dirty="0">
-              <a:latin typeface="Calibri" panose="020F0502020204030204" pitchFamily="34" charset="0"/>
-              <a:ea typeface="ＭＳ Ｐゴシック" charset="0"/>
-              <a:cs typeface="Calibri" panose="020F0502020204030204" pitchFamily="34" charset="0"/>
-            </a:endParaRPr>
-          </a:p>
-        </p:txBody>
-      </p:sp>
-      <p:pic>
-        <p:nvPicPr>
-          <p:cNvPr id="3" name="Picture 2">
-            <a:extLst>
-              <a:ext uri="{FF2B5EF4-FFF2-40B4-BE49-F238E27FC236}">
-                <a16:creationId xmlns:a16="http://schemas.microsoft.com/office/drawing/2014/main" id="{E45101BB-88E9-BF42-96BB-482587C21F3A}"/>
-              </a:ext>
-            </a:extLst>
-          </p:cNvPr>
-          <p:cNvPicPr>
-            <a:picLocks noChangeAspect="1"/>
-          </p:cNvPicPr>
-          <p:nvPr/>
-        </p:nvPicPr>
-        <p:blipFill>
-          <a:blip r:embed="rId2"/>
-          <a:stretch>
-            <a:fillRect/>
-          </a:stretch>
-        </p:blipFill>
-        <p:spPr>
-          <a:xfrm>
-            <a:off x="7281069" y="1323182"/>
-            <a:ext cx="4816725" cy="4095750"/>
-          </a:xfrm>
-          <a:prstGeom prst="rect">
-            <a:avLst/>
-          </a:prstGeom>
-        </p:spPr>
-      </p:pic>
-    </p:spTree>
-    <p:extLst>
-      <p:ext uri="{BB962C8B-B14F-4D97-AF65-F5344CB8AC3E}">
-        <p14:creationId xmlns:p14="http://schemas.microsoft.com/office/powerpoint/2010/main" val="3943815810"/>
-      </p:ext>
-    </p:extLst>
-  </p:cSld>
-  <p:clrMapOvr>
-    <a:masterClrMapping/>
-  </p:clrMapOvr>
-</p:sld>
-</file>
-
-<file path=ppt/slides/slide9.xml><?xml version="1.0" encoding="utf-8"?>
-<p:sld xmlns:a="http://schemas.openxmlformats.org/drawingml/2006/main" xmlns:r="http://schemas.openxmlformats.org/officeDocument/2006/relationships" xmlns:p="http://schemas.openxmlformats.org/presentationml/2006/main">
-  <p:cSld>
-    <p:spTree>
-      <p:nvGrpSpPr>
-        <p:cNvPr id="1" name=""/>
-        <p:cNvGrpSpPr/>
-        <p:nvPr/>
-      </p:nvGrpSpPr>
-      <p:grpSpPr>
-        <a:xfrm>
-          <a:off x="0" y="0"/>
-          <a:ext cx="0" cy="0"/>
-          <a:chOff x="0" y="0"/>
-          <a:chExt cx="0" cy="0"/>
-        </a:xfrm>
-      </p:grpSpPr>
-      <p:sp>
-        <p:nvSpPr>
-          <p:cNvPr id="29697" name="Title 1"/>
-          <p:cNvSpPr>
-            <a:spLocks noGrp="1"/>
-          </p:cNvSpPr>
-          <p:nvPr>
-            <p:ph type="title"/>
-          </p:nvPr>
-        </p:nvSpPr>
-        <p:spPr>
-          <a:xfrm>
-            <a:off x="1676400" y="-17463"/>
-            <a:ext cx="8839200" cy="1143001"/>
-          </a:xfrm>
-        </p:spPr>
-        <p:txBody>
-          <a:bodyPr/>
-          <a:lstStyle/>
-          <a:p>
-            <a:pPr algn="ctr"/>
-            <a:r>
-              <a:rPr lang="en-US" b="1" dirty="0">
-                <a:latin typeface="Calibri" charset="0"/>
-                <a:ea typeface="ＭＳ Ｐゴシック" charset="0"/>
-              </a:rPr>
-              <a:t>Introduction to the BED format</a:t>
-            </a:r>
-          </a:p>
-        </p:txBody>
-      </p:sp>
-      <p:sp>
-        <p:nvSpPr>
-          <p:cNvPr id="28674" name="Content Placeholder 2"/>
-          <p:cNvSpPr>
-            <a:spLocks noGrp="1"/>
-          </p:cNvSpPr>
-          <p:nvPr>
-            <p:ph idx="1"/>
-          </p:nvPr>
-        </p:nvSpPr>
-        <p:spPr>
-          <a:xfrm>
-            <a:off x="1676400" y="1218405"/>
-            <a:ext cx="8839200" cy="4984431"/>
-          </a:xfrm>
-        </p:spPr>
-        <p:txBody>
-          <a:bodyPr>
-            <a:normAutofit lnSpcReduction="10000"/>
-          </a:bodyPr>
-          <a:lstStyle/>
-          <a:p>
-            <a:pPr>
-              <a:defRPr/>
-            </a:pPr>
-            <a:r>
-              <a:rPr lang="en-US" dirty="0">
-                <a:latin typeface="Calibri" charset="0"/>
-                <a:ea typeface="ＭＳ Ｐゴシック" charset="0"/>
-              </a:rPr>
-              <a:t>When working with BAM files, it is very common to want to examine a focused subset of the reference genome</a:t>
-            </a:r>
-          </a:p>
-          <a:p>
-            <a:pPr lvl="1">
-              <a:defRPr/>
-            </a:pPr>
-            <a:r>
-              <a:rPr lang="en-US" dirty="0">
-                <a:latin typeface="Calibri" charset="0"/>
-                <a:ea typeface="ＭＳ Ｐゴシック" charset="0"/>
-              </a:rPr>
-              <a:t>e.g. the exons of a gene</a:t>
-            </a:r>
-            <a:br>
-              <a:rPr lang="en-US" dirty="0">
-                <a:latin typeface="Calibri" charset="0"/>
-                <a:ea typeface="ＭＳ Ｐゴシック" charset="0"/>
-              </a:rPr>
-            </a:br>
-            <a:endParaRPr lang="en-US" dirty="0">
-              <a:latin typeface="Calibri" charset="0"/>
-              <a:ea typeface="ＭＳ Ｐゴシック" charset="0"/>
-            </a:endParaRPr>
-          </a:p>
-          <a:p>
-            <a:pPr>
-              <a:defRPr/>
-            </a:pPr>
-            <a:r>
-              <a:rPr lang="en-US" dirty="0">
-                <a:latin typeface="Calibri" charset="0"/>
-                <a:ea typeface="ＭＳ Ｐゴシック" charset="0"/>
-              </a:rPr>
-              <a:t>These subsets are commonly specified in ‘BED’ files</a:t>
-            </a:r>
-          </a:p>
-          <a:p>
-            <a:pPr lvl="1">
-              <a:defRPr/>
-            </a:pPr>
-            <a:r>
-              <a:rPr lang="en-US" dirty="0">
-                <a:latin typeface="Calibri" charset="0"/>
-                <a:ea typeface="ＭＳ Ｐゴシック" charset="0"/>
-                <a:hlinkClick r:id="rId2"/>
-              </a:rPr>
-              <a:t>https://genome.ucsc.edu/FAQ/FAQformat.html#format1</a:t>
-            </a:r>
-            <a:br>
-              <a:rPr lang="en-US" dirty="0">
-                <a:latin typeface="Calibri" charset="0"/>
-                <a:ea typeface="ＭＳ Ｐゴシック" charset="0"/>
-              </a:rPr>
-            </a:br>
-            <a:endParaRPr lang="en-US" dirty="0">
-              <a:latin typeface="Calibri" charset="0"/>
-              <a:ea typeface="ＭＳ Ｐゴシック" charset="0"/>
-            </a:endParaRPr>
-          </a:p>
-          <a:p>
-            <a:pPr>
-              <a:defRPr/>
-            </a:pPr>
-            <a:r>
-              <a:rPr lang="en-US" dirty="0">
-                <a:latin typeface="Calibri" charset="0"/>
-                <a:ea typeface="ＭＳ Ｐゴシック" charset="0"/>
-              </a:rPr>
-              <a:t>Many BAM manipulation tools accept regions of interest in BED format</a:t>
-            </a:r>
-            <a:br>
-              <a:rPr lang="en-US" dirty="0">
-                <a:latin typeface="Calibri" charset="0"/>
-                <a:ea typeface="ＭＳ Ｐゴシック" charset="0"/>
-              </a:rPr>
-            </a:br>
-            <a:endParaRPr lang="en-US" dirty="0">
-              <a:latin typeface="Calibri" charset="0"/>
-              <a:ea typeface="ＭＳ Ｐゴシック" charset="0"/>
-            </a:endParaRPr>
-          </a:p>
-          <a:p>
-            <a:pPr>
-              <a:defRPr/>
-            </a:pPr>
-            <a:r>
-              <a:rPr lang="en-US" dirty="0">
-                <a:latin typeface="Calibri" charset="0"/>
-                <a:ea typeface="ＭＳ Ｐゴシック" charset="0"/>
-              </a:rPr>
-              <a:t>Basic BED format (tab separated):</a:t>
-            </a:r>
-          </a:p>
-          <a:p>
-            <a:pPr lvl="1">
-              <a:defRPr/>
-            </a:pPr>
-            <a:r>
-              <a:rPr lang="en-US" dirty="0">
-                <a:latin typeface="Calibri" charset="0"/>
-                <a:ea typeface="ＭＳ Ｐゴシック" charset="0"/>
-              </a:rPr>
-              <a:t>Chromosome name, start position, end position (BED3)</a:t>
-            </a:r>
-          </a:p>
-          <a:p>
-            <a:pPr lvl="1">
-              <a:defRPr/>
-            </a:pPr>
-            <a:r>
-              <a:rPr lang="en-US" dirty="0">
-                <a:latin typeface="Calibri" charset="0"/>
-                <a:ea typeface="ＭＳ Ｐゴシック" charset="0"/>
-              </a:rPr>
-              <a:t>Coordinates in BED format are 0 based</a:t>
-            </a:r>
-          </a:p>
-        </p:txBody>
-      </p:sp>
-    </p:spTree>
-    <p:extLst>
-      <p:ext uri="{BB962C8B-B14F-4D97-AF65-F5344CB8AC3E}">
-        <p14:creationId xmlns:p14="http://schemas.microsoft.com/office/powerpoint/2010/main" val="1626480069"/>
       </p:ext>
     </p:extLst>
   </p:cSld>

</xml_diff>